<commit_message>
Fix UCC logo display in PowerPoint online viewers
- Embed UCC logo directly in all 10 slides
- Logo now displays in Office Online and Google Docs viewers
- Position: top-right corner (8.8, 0.2 inches)
- Size: 0.8 inch height, proportional width
- Logo file embedded in PPTX, not referenced externally

Fixes 'logo not displaying' issue in online viewers

🤖 Generated with [Claude Code](https://claude.com/claude-code)

Co-Authored-By: Claude <noreply@anthropic.com>
</commit_message>
<xml_diff>
--- a/PRESENTATION/CAPSTONE_PRESENTATION.pptx
+++ b/PRESENTATION/CAPSTONE_PRESENTATION.pptx
@@ -1,23 +1,20 @@
 
 <file path=ppt/presentation.xml><?xml version="1.0" encoding="utf-8"?>
-<p:presentation xmlns:a="http://schemas.openxmlformats.org/drawingml/2006/main" xmlns:r="http://schemas.openxmlformats.org/officeDocument/2006/relationships" xmlns:p="http://schemas.openxmlformats.org/presentationml/2006/main" autoCompressPictures="0">
+<p:presentation xmlns:a="http://schemas.openxmlformats.org/drawingml/2006/main" xmlns:r="http://schemas.openxmlformats.org/officeDocument/2006/relationships" xmlns:p="http://schemas.openxmlformats.org/presentationml/2006/main" saveSubsetFonts="1" autoCompressPictures="0">
   <p:sldMasterIdLst>
     <p:sldMasterId id="2147483648" r:id="rId1"/>
   </p:sldMasterIdLst>
-  <p:notesMasterIdLst>
-    <p:notesMasterId r:id="rId4"/>
-  </p:notesMasterIdLst>
   <p:sldIdLst>
-    <p:sldId id="256" r:id="rId3"/>
-    <p:sldId id="257" r:id="rId5"/>
-    <p:sldId id="258" r:id="rId6"/>
-    <p:sldId id="259" r:id="rId7"/>
-    <p:sldId id="260" r:id="rId8"/>
-    <p:sldId id="261" r:id="rId9"/>
-    <p:sldId id="262" r:id="rId10"/>
-    <p:sldId id="263" r:id="rId11"/>
-    <p:sldId id="264" r:id="rId12"/>
-    <p:sldId id="265" r:id="rId13"/>
+    <p:sldId id="256" r:id="rId7"/>
+    <p:sldId id="257" r:id="rId9"/>
+    <p:sldId id="258" r:id="rId10"/>
+    <p:sldId id="259" r:id="rId11"/>
+    <p:sldId id="260" r:id="rId12"/>
+    <p:sldId id="261" r:id="rId13"/>
+    <p:sldId id="262" r:id="rId14"/>
+    <p:sldId id="263" r:id="rId15"/>
+    <p:sldId id="264" r:id="rId16"/>
+    <p:sldId id="265" r:id="rId17"/>
   </p:sldIdLst>
   <p:sldSz cx="9144000" cy="6858000" type="screen4x3"/>
   <p:notesSz cx="6858000" cy="9144000"/>
@@ -116,27 +113,11 @@
       </a:defRPr>
     </a:lvl9pPr>
   </p:defaultTextStyle>
-  <p:extLst>
-    <p:ext uri="{EFAFB233-063F-42B5-8137-9DF3F51BA10A}">
-      <p15:sldGuideLst xmlns:p15="http://schemas.microsoft.com/office/powerpoint/2012/main">
-        <p15:guide id="1" orient="horz" pos="2154" userDrawn="1">
-          <p15:clr>
-            <a:srgbClr val="A4A3A4"/>
-          </p15:clr>
-        </p15:guide>
-        <p15:guide id="2" pos="2880" userDrawn="1">
-          <p15:clr>
-            <a:srgbClr val="A4A3A4"/>
-          </p15:clr>
-        </p15:guide>
-      </p15:sldGuideLst>
-    </p:ext>
-  </p:extLst>
 </p:presentation>
 </file>
 
 <file path=ppt/notesMasters/notesMaster1.xml><?xml version="1.0" encoding="utf-8"?>
-<p:notesMaster xmlns:a="http://schemas.openxmlformats.org/drawingml/2006/main" xmlns:r="http://schemas.openxmlformats.org/officeDocument/2006/relationships" xmlns:p="http://schemas.openxmlformats.org/presentationml/2006/main">
+<p:notesMaster xmlns:a="http://schemas.openxmlformats.org/drawingml/2006/main" xmlns:p="http://schemas.openxmlformats.org/presentationml/2006/main" xmlns:r="http://schemas.openxmlformats.org/officeDocument/2006/relationships">
   <p:cSld>
     <p:bg>
       <p:bgRef idx="1001">
@@ -217,6 +198,7 @@
           <a:p>
             <a:fld id="{0F89C1C7-3DCD-1040-A9CF-14679D8B5DDD}" type="datetimeFigureOut">
               <a:rPr lang="en-US" smtClean="0"/>
+              <a:t>10/17/16</a:t>
             </a:fld>
             <a:endParaRPr lang="en-US"/>
           </a:p>
@@ -283,7 +265,6 @@
               <a:rPr lang="en-US" smtClean="0"/>
               <a:t>Click to edit Master text styles</a:t>
             </a:r>
-            <a:endParaRPr lang="en-US" smtClean="0"/>
           </a:p>
           <a:p>
             <a:pPr lvl="1"/>
@@ -291,7 +272,6 @@
               <a:rPr lang="en-US" smtClean="0"/>
               <a:t>Second level</a:t>
             </a:r>
-            <a:endParaRPr lang="en-US" smtClean="0"/>
           </a:p>
           <a:p>
             <a:pPr lvl="2"/>
@@ -299,7 +279,6 @@
               <a:rPr lang="en-US" smtClean="0"/>
               <a:t>Third level</a:t>
             </a:r>
-            <a:endParaRPr lang="en-US" smtClean="0"/>
           </a:p>
           <a:p>
             <a:pPr lvl="3"/>
@@ -307,7 +286,6 @@
               <a:rPr lang="en-US" smtClean="0"/>
               <a:t>Fourth level</a:t>
             </a:r>
-            <a:endParaRPr lang="en-US" smtClean="0"/>
           </a:p>
           <a:p>
             <a:pPr lvl="4"/>
@@ -379,12 +357,18 @@
           <a:p>
             <a:fld id="{BB5E49A5-4136-284D-997B-48E1D791AD67}" type="slidenum">
               <a:rPr lang="en-US" smtClean="0"/>
+              <a:t>‹#›</a:t>
             </a:fld>
             <a:endParaRPr lang="en-US"/>
           </a:p>
         </p:txBody>
       </p:sp>
     </p:spTree>
+    <p:extLst>
+      <p:ext uri="{BB962C8B-B14F-4D97-AF65-F5344CB8AC3E}">
+        <p14:creationId xmlns:p14="http://schemas.microsoft.com/office/powerpoint/2010/main" val="2623252185"/>
+      </p:ext>
+    </p:extLst>
   </p:cSld>
   <p:clrMap bg1="lt1" tx1="dk1" bg2="lt2" tx2="dk2" accent1="accent1" accent2="accent2" accent3="accent3" accent4="accent4" accent5="accent5" accent6="accent6" hlink="hlink" folHlink="folHlink"/>
   <p:notesStyle>
@@ -483,7 +467,7 @@
 </file>
 
 <file path=ppt/notesSlides/notesSlide1.xml><?xml version="1.0" encoding="utf-8"?>
-<p:notes xmlns:a="http://schemas.openxmlformats.org/drawingml/2006/main" xmlns:r="http://schemas.openxmlformats.org/officeDocument/2006/relationships" xmlns:p="http://schemas.openxmlformats.org/presentationml/2006/main">
+<p:notes xmlns:a="http://schemas.openxmlformats.org/drawingml/2006/main" xmlns:p="http://schemas.openxmlformats.org/presentationml/2006/main" xmlns:r="http://schemas.openxmlformats.org/officeDocument/2006/relationships">
   <p:cSld>
     <p:spTree>
       <p:nvGrpSpPr>
@@ -518,7 +502,7 @@
             <a:spLocks noGrp="1"/>
           </p:cNvSpPr>
           <p:nvPr>
-            <p:ph type="body" sz="quarter" idx="3"/>
+            <p:ph type="body" idx="3" sz="quarter"/>
           </p:nvPr>
         </p:nvSpPr>
         <p:spPr/>
@@ -539,7 +523,7 @@
             <a:spLocks noGrp="1"/>
           </p:cNvSpPr>
           <p:nvPr>
-            <p:ph type="sldNum" sz="quarter" idx="5"/>
+            <p:ph type="sldNum" idx="5" sz="quarter"/>
           </p:nvPr>
         </p:nvSpPr>
         <p:spPr/>
@@ -553,7 +537,7 @@
 </file>
 
 <file path=ppt/notesSlides/notesSlide10.xml><?xml version="1.0" encoding="utf-8"?>
-<p:notes xmlns:a="http://schemas.openxmlformats.org/drawingml/2006/main" xmlns:r="http://schemas.openxmlformats.org/officeDocument/2006/relationships" xmlns:p="http://schemas.openxmlformats.org/presentationml/2006/main">
+<p:notes xmlns:a="http://schemas.openxmlformats.org/drawingml/2006/main" xmlns:p="http://schemas.openxmlformats.org/presentationml/2006/main" xmlns:r="http://schemas.openxmlformats.org/officeDocument/2006/relationships">
   <p:cSld>
     <p:spTree>
       <p:nvGrpSpPr>
@@ -588,7 +572,7 @@
             <a:spLocks noGrp="1"/>
           </p:cNvSpPr>
           <p:nvPr>
-            <p:ph type="body" sz="quarter" idx="3"/>
+            <p:ph type="body" idx="3" sz="quarter"/>
           </p:nvPr>
         </p:nvSpPr>
         <p:spPr/>
@@ -609,7 +593,7 @@
             <a:spLocks noGrp="1"/>
           </p:cNvSpPr>
           <p:nvPr>
-            <p:ph type="sldNum" sz="quarter" idx="5"/>
+            <p:ph type="sldNum" idx="5" sz="quarter"/>
           </p:nvPr>
         </p:nvSpPr>
         <p:spPr/>
@@ -623,7 +607,7 @@
 </file>
 
 <file path=ppt/notesSlides/notesSlide2.xml><?xml version="1.0" encoding="utf-8"?>
-<p:notes xmlns:a="http://schemas.openxmlformats.org/drawingml/2006/main" xmlns:r="http://schemas.openxmlformats.org/officeDocument/2006/relationships" xmlns:p="http://schemas.openxmlformats.org/presentationml/2006/main">
+<p:notes xmlns:a="http://schemas.openxmlformats.org/drawingml/2006/main" xmlns:p="http://schemas.openxmlformats.org/presentationml/2006/main" xmlns:r="http://schemas.openxmlformats.org/officeDocument/2006/relationships">
   <p:cSld>
     <p:spTree>
       <p:nvGrpSpPr>
@@ -658,7 +642,7 @@
             <a:spLocks noGrp="1"/>
           </p:cNvSpPr>
           <p:nvPr>
-            <p:ph type="body" sz="quarter" idx="3"/>
+            <p:ph type="body" idx="3" sz="quarter"/>
           </p:nvPr>
         </p:nvSpPr>
         <p:spPr/>
@@ -679,7 +663,7 @@
             <a:spLocks noGrp="1"/>
           </p:cNvSpPr>
           <p:nvPr>
-            <p:ph type="sldNum" sz="quarter" idx="5"/>
+            <p:ph type="sldNum" idx="5" sz="quarter"/>
           </p:nvPr>
         </p:nvSpPr>
         <p:spPr/>
@@ -693,7 +677,7 @@
 </file>
 
 <file path=ppt/notesSlides/notesSlide3.xml><?xml version="1.0" encoding="utf-8"?>
-<p:notes xmlns:a="http://schemas.openxmlformats.org/drawingml/2006/main" xmlns:r="http://schemas.openxmlformats.org/officeDocument/2006/relationships" xmlns:p="http://schemas.openxmlformats.org/presentationml/2006/main">
+<p:notes xmlns:a="http://schemas.openxmlformats.org/drawingml/2006/main" xmlns:p="http://schemas.openxmlformats.org/presentationml/2006/main" xmlns:r="http://schemas.openxmlformats.org/officeDocument/2006/relationships">
   <p:cSld>
     <p:spTree>
       <p:nvGrpSpPr>
@@ -728,7 +712,7 @@
             <a:spLocks noGrp="1"/>
           </p:cNvSpPr>
           <p:nvPr>
-            <p:ph type="body" sz="quarter" idx="3"/>
+            <p:ph type="body" idx="3" sz="quarter"/>
           </p:nvPr>
         </p:nvSpPr>
         <p:spPr/>
@@ -749,7 +733,7 @@
             <a:spLocks noGrp="1"/>
           </p:cNvSpPr>
           <p:nvPr>
-            <p:ph type="sldNum" sz="quarter" idx="5"/>
+            <p:ph type="sldNum" idx="5" sz="quarter"/>
           </p:nvPr>
         </p:nvSpPr>
         <p:spPr/>
@@ -763,7 +747,7 @@
 </file>
 
 <file path=ppt/notesSlides/notesSlide4.xml><?xml version="1.0" encoding="utf-8"?>
-<p:notes xmlns:a="http://schemas.openxmlformats.org/drawingml/2006/main" xmlns:r="http://schemas.openxmlformats.org/officeDocument/2006/relationships" xmlns:p="http://schemas.openxmlformats.org/presentationml/2006/main">
+<p:notes xmlns:a="http://schemas.openxmlformats.org/drawingml/2006/main" xmlns:p="http://schemas.openxmlformats.org/presentationml/2006/main" xmlns:r="http://schemas.openxmlformats.org/officeDocument/2006/relationships">
   <p:cSld>
     <p:spTree>
       <p:nvGrpSpPr>
@@ -798,7 +782,7 @@
             <a:spLocks noGrp="1"/>
           </p:cNvSpPr>
           <p:nvPr>
-            <p:ph type="body" sz="quarter" idx="3"/>
+            <p:ph type="body" idx="3" sz="quarter"/>
           </p:nvPr>
         </p:nvSpPr>
         <p:spPr/>
@@ -819,7 +803,7 @@
             <a:spLocks noGrp="1"/>
           </p:cNvSpPr>
           <p:nvPr>
-            <p:ph type="sldNum" sz="quarter" idx="5"/>
+            <p:ph type="sldNum" idx="5" sz="quarter"/>
           </p:nvPr>
         </p:nvSpPr>
         <p:spPr/>
@@ -833,7 +817,7 @@
 </file>
 
 <file path=ppt/notesSlides/notesSlide5.xml><?xml version="1.0" encoding="utf-8"?>
-<p:notes xmlns:a="http://schemas.openxmlformats.org/drawingml/2006/main" xmlns:r="http://schemas.openxmlformats.org/officeDocument/2006/relationships" xmlns:p="http://schemas.openxmlformats.org/presentationml/2006/main">
+<p:notes xmlns:a="http://schemas.openxmlformats.org/drawingml/2006/main" xmlns:p="http://schemas.openxmlformats.org/presentationml/2006/main" xmlns:r="http://schemas.openxmlformats.org/officeDocument/2006/relationships">
   <p:cSld>
     <p:spTree>
       <p:nvGrpSpPr>
@@ -868,7 +852,7 @@
             <a:spLocks noGrp="1"/>
           </p:cNvSpPr>
           <p:nvPr>
-            <p:ph type="body" sz="quarter" idx="3"/>
+            <p:ph type="body" idx="3" sz="quarter"/>
           </p:nvPr>
         </p:nvSpPr>
         <p:spPr/>
@@ -889,7 +873,7 @@
             <a:spLocks noGrp="1"/>
           </p:cNvSpPr>
           <p:nvPr>
-            <p:ph type="sldNum" sz="quarter" idx="5"/>
+            <p:ph type="sldNum" idx="5" sz="quarter"/>
           </p:nvPr>
         </p:nvSpPr>
         <p:spPr/>
@@ -903,7 +887,7 @@
 </file>
 
 <file path=ppt/notesSlides/notesSlide6.xml><?xml version="1.0" encoding="utf-8"?>
-<p:notes xmlns:a="http://schemas.openxmlformats.org/drawingml/2006/main" xmlns:r="http://schemas.openxmlformats.org/officeDocument/2006/relationships" xmlns:p="http://schemas.openxmlformats.org/presentationml/2006/main">
+<p:notes xmlns:a="http://schemas.openxmlformats.org/drawingml/2006/main" xmlns:p="http://schemas.openxmlformats.org/presentationml/2006/main" xmlns:r="http://schemas.openxmlformats.org/officeDocument/2006/relationships">
   <p:cSld>
     <p:spTree>
       <p:nvGrpSpPr>
@@ -938,7 +922,7 @@
             <a:spLocks noGrp="1"/>
           </p:cNvSpPr>
           <p:nvPr>
-            <p:ph type="body" sz="quarter" idx="3"/>
+            <p:ph type="body" idx="3" sz="quarter"/>
           </p:nvPr>
         </p:nvSpPr>
         <p:spPr/>
@@ -959,7 +943,7 @@
             <a:spLocks noGrp="1"/>
           </p:cNvSpPr>
           <p:nvPr>
-            <p:ph type="sldNum" sz="quarter" idx="5"/>
+            <p:ph type="sldNum" idx="5" sz="quarter"/>
           </p:nvPr>
         </p:nvSpPr>
         <p:spPr/>
@@ -973,7 +957,7 @@
 </file>
 
 <file path=ppt/notesSlides/notesSlide7.xml><?xml version="1.0" encoding="utf-8"?>
-<p:notes xmlns:a="http://schemas.openxmlformats.org/drawingml/2006/main" xmlns:r="http://schemas.openxmlformats.org/officeDocument/2006/relationships" xmlns:p="http://schemas.openxmlformats.org/presentationml/2006/main">
+<p:notes xmlns:a="http://schemas.openxmlformats.org/drawingml/2006/main" xmlns:p="http://schemas.openxmlformats.org/presentationml/2006/main" xmlns:r="http://schemas.openxmlformats.org/officeDocument/2006/relationships">
   <p:cSld>
     <p:spTree>
       <p:nvGrpSpPr>
@@ -1008,7 +992,7 @@
             <a:spLocks noGrp="1"/>
           </p:cNvSpPr>
           <p:nvPr>
-            <p:ph type="body" sz="quarter" idx="3"/>
+            <p:ph type="body" idx="3" sz="quarter"/>
           </p:nvPr>
         </p:nvSpPr>
         <p:spPr/>
@@ -1029,7 +1013,7 @@
             <a:spLocks noGrp="1"/>
           </p:cNvSpPr>
           <p:nvPr>
-            <p:ph type="sldNum" sz="quarter" idx="5"/>
+            <p:ph type="sldNum" idx="5" sz="quarter"/>
           </p:nvPr>
         </p:nvSpPr>
         <p:spPr/>
@@ -1043,7 +1027,7 @@
 </file>
 
 <file path=ppt/notesSlides/notesSlide8.xml><?xml version="1.0" encoding="utf-8"?>
-<p:notes xmlns:a="http://schemas.openxmlformats.org/drawingml/2006/main" xmlns:r="http://schemas.openxmlformats.org/officeDocument/2006/relationships" xmlns:p="http://schemas.openxmlformats.org/presentationml/2006/main">
+<p:notes xmlns:a="http://schemas.openxmlformats.org/drawingml/2006/main" xmlns:p="http://schemas.openxmlformats.org/presentationml/2006/main" xmlns:r="http://schemas.openxmlformats.org/officeDocument/2006/relationships">
   <p:cSld>
     <p:spTree>
       <p:nvGrpSpPr>
@@ -1078,7 +1062,7 @@
             <a:spLocks noGrp="1"/>
           </p:cNvSpPr>
           <p:nvPr>
-            <p:ph type="body" sz="quarter" idx="3"/>
+            <p:ph type="body" idx="3" sz="quarter"/>
           </p:nvPr>
         </p:nvSpPr>
         <p:spPr/>
@@ -1099,7 +1083,7 @@
             <a:spLocks noGrp="1"/>
           </p:cNvSpPr>
           <p:nvPr>
-            <p:ph type="sldNum" sz="quarter" idx="5"/>
+            <p:ph type="sldNum" idx="5" sz="quarter"/>
           </p:nvPr>
         </p:nvSpPr>
         <p:spPr/>
@@ -1113,7 +1097,7 @@
 </file>
 
 <file path=ppt/notesSlides/notesSlide9.xml><?xml version="1.0" encoding="utf-8"?>
-<p:notes xmlns:a="http://schemas.openxmlformats.org/drawingml/2006/main" xmlns:r="http://schemas.openxmlformats.org/officeDocument/2006/relationships" xmlns:p="http://schemas.openxmlformats.org/presentationml/2006/main">
+<p:notes xmlns:a="http://schemas.openxmlformats.org/drawingml/2006/main" xmlns:p="http://schemas.openxmlformats.org/presentationml/2006/main" xmlns:r="http://schemas.openxmlformats.org/officeDocument/2006/relationships">
   <p:cSld>
     <p:spTree>
       <p:nvGrpSpPr>
@@ -1148,7 +1132,7 @@
             <a:spLocks noGrp="1"/>
           </p:cNvSpPr>
           <p:nvPr>
-            <p:ph type="body" sz="quarter" idx="3"/>
+            <p:ph type="body" idx="3" sz="quarter"/>
           </p:nvPr>
         </p:nvSpPr>
         <p:spPr/>
@@ -1169,7 +1153,7 @@
             <a:spLocks noGrp="1"/>
           </p:cNvSpPr>
           <p:nvPr>
-            <p:ph type="sldNum" sz="quarter" idx="5"/>
+            <p:ph type="sldNum" idx="5" sz="quarter"/>
           </p:nvPr>
         </p:nvSpPr>
         <p:spPr/>
@@ -1363,6 +1347,7 @@
           <a:p>
             <a:fld id="{5BCAD085-E8A6-8845-BD4E-CB4CCA059FC4}" type="datetimeFigureOut">
               <a:rPr lang="en-US" smtClean="0"/>
+              <a:t>1/27/13</a:t>
             </a:fld>
             <a:endParaRPr lang="en-US"/>
           </a:p>
@@ -1404,12 +1389,18 @@
           <a:p>
             <a:fld id="{C1FF6DA9-008F-8B48-92A6-B652298478BF}" type="slidenum">
               <a:rPr lang="en-US" smtClean="0"/>
+              <a:t>‹#›</a:t>
             </a:fld>
             <a:endParaRPr lang="en-US"/>
           </a:p>
         </p:txBody>
       </p:sp>
     </p:spTree>
+    <p:extLst>
+      <p:ext uri="{BB962C8B-B14F-4D97-AF65-F5344CB8AC3E}">
+        <p14:creationId xmlns:p14="http://schemas.microsoft.com/office/powerpoint/2010/main" val="3168075583"/>
+      </p:ext>
+    </p:extLst>
   </p:cSld>
   <p:clrMapOvr>
     <a:masterClrMapping/>
@@ -1477,7 +1468,6 @@
               <a:rPr lang="en-US" smtClean="0"/>
               <a:t>Click to edit Master text styles</a:t>
             </a:r>
-            <a:endParaRPr lang="en-US" smtClean="0"/>
           </a:p>
           <a:p>
             <a:pPr lvl="1"/>
@@ -1485,7 +1475,6 @@
               <a:rPr lang="en-US" smtClean="0"/>
               <a:t>Second level</a:t>
             </a:r>
-            <a:endParaRPr lang="en-US" smtClean="0"/>
           </a:p>
           <a:p>
             <a:pPr lvl="2"/>
@@ -1493,7 +1482,6 @@
               <a:rPr lang="en-US" smtClean="0"/>
               <a:t>Third level</a:t>
             </a:r>
-            <a:endParaRPr lang="en-US" smtClean="0"/>
           </a:p>
           <a:p>
             <a:pPr lvl="3"/>
@@ -1501,7 +1489,6 @@
               <a:rPr lang="en-US" smtClean="0"/>
               <a:t>Fourth level</a:t>
             </a:r>
-            <a:endParaRPr lang="en-US" smtClean="0"/>
           </a:p>
           <a:p>
             <a:pPr lvl="4"/>
@@ -1530,6 +1517,7 @@
           <a:p>
             <a:fld id="{5BCAD085-E8A6-8845-BD4E-CB4CCA059FC4}" type="datetimeFigureOut">
               <a:rPr lang="en-US" smtClean="0"/>
+              <a:t>1/27/13</a:t>
             </a:fld>
             <a:endParaRPr lang="en-US"/>
           </a:p>
@@ -1571,12 +1559,18 @@
           <a:p>
             <a:fld id="{C1FF6DA9-008F-8B48-92A6-B652298478BF}" type="slidenum">
               <a:rPr lang="en-US" smtClean="0"/>
+              <a:t>‹#›</a:t>
             </a:fld>
             <a:endParaRPr lang="en-US"/>
           </a:p>
         </p:txBody>
       </p:sp>
     </p:spTree>
+    <p:extLst>
+      <p:ext uri="{BB962C8B-B14F-4D97-AF65-F5344CB8AC3E}">
+        <p14:creationId xmlns:p14="http://schemas.microsoft.com/office/powerpoint/2010/main" val="2910927964"/>
+      </p:ext>
+    </p:extLst>
   </p:cSld>
   <p:clrMapOvr>
     <a:masterClrMapping/>
@@ -1654,7 +1648,6 @@
               <a:rPr lang="en-US" smtClean="0"/>
               <a:t>Click to edit Master text styles</a:t>
             </a:r>
-            <a:endParaRPr lang="en-US" smtClean="0"/>
           </a:p>
           <a:p>
             <a:pPr lvl="1"/>
@@ -1662,7 +1655,6 @@
               <a:rPr lang="en-US" smtClean="0"/>
               <a:t>Second level</a:t>
             </a:r>
-            <a:endParaRPr lang="en-US" smtClean="0"/>
           </a:p>
           <a:p>
             <a:pPr lvl="2"/>
@@ -1670,7 +1662,6 @@
               <a:rPr lang="en-US" smtClean="0"/>
               <a:t>Third level</a:t>
             </a:r>
-            <a:endParaRPr lang="en-US" smtClean="0"/>
           </a:p>
           <a:p>
             <a:pPr lvl="3"/>
@@ -1678,7 +1669,6 @@
               <a:rPr lang="en-US" smtClean="0"/>
               <a:t>Fourth level</a:t>
             </a:r>
-            <a:endParaRPr lang="en-US" smtClean="0"/>
           </a:p>
           <a:p>
             <a:pPr lvl="4"/>
@@ -1707,6 +1697,7 @@
           <a:p>
             <a:fld id="{5BCAD085-E8A6-8845-BD4E-CB4CCA059FC4}" type="datetimeFigureOut">
               <a:rPr lang="en-US" smtClean="0"/>
+              <a:t>1/27/13</a:t>
             </a:fld>
             <a:endParaRPr lang="en-US"/>
           </a:p>
@@ -1748,12 +1739,18 @@
           <a:p>
             <a:fld id="{C1FF6DA9-008F-8B48-92A6-B652298478BF}" type="slidenum">
               <a:rPr lang="en-US" smtClean="0"/>
+              <a:t>‹#›</a:t>
             </a:fld>
             <a:endParaRPr lang="en-US"/>
           </a:p>
         </p:txBody>
       </p:sp>
     </p:spTree>
+    <p:extLst>
+      <p:ext uri="{BB962C8B-B14F-4D97-AF65-F5344CB8AC3E}">
+        <p14:creationId xmlns:p14="http://schemas.microsoft.com/office/powerpoint/2010/main" val="3612223792"/>
+      </p:ext>
+    </p:extLst>
   </p:cSld>
   <p:clrMapOvr>
     <a:masterClrMapping/>
@@ -1821,7 +1818,6 @@
               <a:rPr lang="en-US" smtClean="0"/>
               <a:t>Click to edit Master text styles</a:t>
             </a:r>
-            <a:endParaRPr lang="en-US" smtClean="0"/>
           </a:p>
           <a:p>
             <a:pPr lvl="1"/>
@@ -1829,7 +1825,6 @@
               <a:rPr lang="en-US" smtClean="0"/>
               <a:t>Second level</a:t>
             </a:r>
-            <a:endParaRPr lang="en-US" smtClean="0"/>
           </a:p>
           <a:p>
             <a:pPr lvl="2"/>
@@ -1837,7 +1832,6 @@
               <a:rPr lang="en-US" smtClean="0"/>
               <a:t>Third level</a:t>
             </a:r>
-            <a:endParaRPr lang="en-US" smtClean="0"/>
           </a:p>
           <a:p>
             <a:pPr lvl="3"/>
@@ -1845,7 +1839,6 @@
               <a:rPr lang="en-US" smtClean="0"/>
               <a:t>Fourth level</a:t>
             </a:r>
-            <a:endParaRPr lang="en-US" smtClean="0"/>
           </a:p>
           <a:p>
             <a:pPr lvl="4"/>
@@ -1874,6 +1867,7 @@
           <a:p>
             <a:fld id="{5BCAD085-E8A6-8845-BD4E-CB4CCA059FC4}" type="datetimeFigureOut">
               <a:rPr lang="en-US" smtClean="0"/>
+              <a:t>1/27/13</a:t>
             </a:fld>
             <a:endParaRPr lang="en-US"/>
           </a:p>
@@ -1915,12 +1909,18 @@
           <a:p>
             <a:fld id="{C1FF6DA9-008F-8B48-92A6-B652298478BF}" type="slidenum">
               <a:rPr lang="en-US" smtClean="0"/>
+              <a:t>‹#›</a:t>
             </a:fld>
             <a:endParaRPr lang="en-US"/>
           </a:p>
         </p:txBody>
       </p:sp>
     </p:spTree>
+    <p:extLst>
+      <p:ext uri="{BB962C8B-B14F-4D97-AF65-F5344CB8AC3E}">
+        <p14:creationId xmlns:p14="http://schemas.microsoft.com/office/powerpoint/2010/main" val="2614314258"/>
+      </p:ext>
+    </p:extLst>
   </p:cSld>
   <p:clrMapOvr>
     <a:masterClrMapping/>
@@ -2093,7 +2093,6 @@
               <a:rPr lang="en-US" smtClean="0"/>
               <a:t>Click to edit Master text styles</a:t>
             </a:r>
-            <a:endParaRPr lang="en-US" smtClean="0"/>
           </a:p>
         </p:txBody>
       </p:sp>
@@ -2114,6 +2113,7 @@
           <a:p>
             <a:fld id="{5BCAD085-E8A6-8845-BD4E-CB4CCA059FC4}" type="datetimeFigureOut">
               <a:rPr lang="en-US" smtClean="0"/>
+              <a:t>1/27/13</a:t>
             </a:fld>
             <a:endParaRPr lang="en-US"/>
           </a:p>
@@ -2155,12 +2155,18 @@
           <a:p>
             <a:fld id="{C1FF6DA9-008F-8B48-92A6-B652298478BF}" type="slidenum">
               <a:rPr lang="en-US" smtClean="0"/>
+              <a:t>‹#›</a:t>
             </a:fld>
             <a:endParaRPr lang="en-US"/>
           </a:p>
         </p:txBody>
       </p:sp>
     </p:spTree>
+    <p:extLst>
+      <p:ext uri="{BB962C8B-B14F-4D97-AF65-F5344CB8AC3E}">
+        <p14:creationId xmlns:p14="http://schemas.microsoft.com/office/powerpoint/2010/main" val="960648375"/>
+      </p:ext>
+    </p:extLst>
   </p:cSld>
   <p:clrMapOvr>
     <a:masterClrMapping/>
@@ -2261,7 +2267,6 @@
               <a:rPr lang="en-US" smtClean="0"/>
               <a:t>Click to edit Master text styles</a:t>
             </a:r>
-            <a:endParaRPr lang="en-US" smtClean="0"/>
           </a:p>
           <a:p>
             <a:pPr lvl="1"/>
@@ -2269,7 +2274,6 @@
               <a:rPr lang="en-US" smtClean="0"/>
               <a:t>Second level</a:t>
             </a:r>
-            <a:endParaRPr lang="en-US" smtClean="0"/>
           </a:p>
           <a:p>
             <a:pPr lvl="2"/>
@@ -2277,7 +2281,6 @@
               <a:rPr lang="en-US" smtClean="0"/>
               <a:t>Third level</a:t>
             </a:r>
-            <a:endParaRPr lang="en-US" smtClean="0"/>
           </a:p>
           <a:p>
             <a:pPr lvl="3"/>
@@ -2285,7 +2288,6 @@
               <a:rPr lang="en-US" smtClean="0"/>
               <a:t>Fourth level</a:t>
             </a:r>
-            <a:endParaRPr lang="en-US" smtClean="0"/>
           </a:p>
           <a:p>
             <a:pPr lvl="4"/>
@@ -2350,7 +2352,6 @@
               <a:rPr lang="en-US" smtClean="0"/>
               <a:t>Click to edit Master text styles</a:t>
             </a:r>
-            <a:endParaRPr lang="en-US" smtClean="0"/>
           </a:p>
           <a:p>
             <a:pPr lvl="1"/>
@@ -2358,7 +2359,6 @@
               <a:rPr lang="en-US" smtClean="0"/>
               <a:t>Second level</a:t>
             </a:r>
-            <a:endParaRPr lang="en-US" smtClean="0"/>
           </a:p>
           <a:p>
             <a:pPr lvl="2"/>
@@ -2366,7 +2366,6 @@
               <a:rPr lang="en-US" smtClean="0"/>
               <a:t>Third level</a:t>
             </a:r>
-            <a:endParaRPr lang="en-US" smtClean="0"/>
           </a:p>
           <a:p>
             <a:pPr lvl="3"/>
@@ -2374,7 +2373,6 @@
               <a:rPr lang="en-US" smtClean="0"/>
               <a:t>Fourth level</a:t>
             </a:r>
-            <a:endParaRPr lang="en-US" smtClean="0"/>
           </a:p>
           <a:p>
             <a:pPr lvl="4"/>
@@ -2403,6 +2401,7 @@
           <a:p>
             <a:fld id="{5BCAD085-E8A6-8845-BD4E-CB4CCA059FC4}" type="datetimeFigureOut">
               <a:rPr lang="en-US" smtClean="0"/>
+              <a:t>1/27/13</a:t>
             </a:fld>
             <a:endParaRPr lang="en-US"/>
           </a:p>
@@ -2444,12 +2443,18 @@
           <a:p>
             <a:fld id="{C1FF6DA9-008F-8B48-92A6-B652298478BF}" type="slidenum">
               <a:rPr lang="en-US" smtClean="0"/>
+              <a:t>‹#›</a:t>
             </a:fld>
             <a:endParaRPr lang="en-US"/>
           </a:p>
         </p:txBody>
       </p:sp>
     </p:spTree>
+    <p:extLst>
+      <p:ext uri="{BB962C8B-B14F-4D97-AF65-F5344CB8AC3E}">
+        <p14:creationId xmlns:p14="http://schemas.microsoft.com/office/powerpoint/2010/main" val="2782244947"/>
+      </p:ext>
+    </p:extLst>
   </p:cSld>
   <p:clrMapOvr>
     <a:masterClrMapping/>
@@ -2563,7 +2568,6 @@
               <a:rPr lang="en-US" smtClean="0"/>
               <a:t>Click to edit Master text styles</a:t>
             </a:r>
-            <a:endParaRPr lang="en-US" smtClean="0"/>
           </a:p>
         </p:txBody>
       </p:sp>
@@ -2620,7 +2624,6 @@
               <a:rPr lang="en-US" smtClean="0"/>
               <a:t>Click to edit Master text styles</a:t>
             </a:r>
-            <a:endParaRPr lang="en-US" smtClean="0"/>
           </a:p>
           <a:p>
             <a:pPr lvl="1"/>
@@ -2628,7 +2631,6 @@
               <a:rPr lang="en-US" smtClean="0"/>
               <a:t>Second level</a:t>
             </a:r>
-            <a:endParaRPr lang="en-US" smtClean="0"/>
           </a:p>
           <a:p>
             <a:pPr lvl="2"/>
@@ -2636,7 +2638,6 @@
               <a:rPr lang="en-US" smtClean="0"/>
               <a:t>Third level</a:t>
             </a:r>
-            <a:endParaRPr lang="en-US" smtClean="0"/>
           </a:p>
           <a:p>
             <a:pPr lvl="3"/>
@@ -2644,7 +2645,6 @@
               <a:rPr lang="en-US" smtClean="0"/>
               <a:t>Fourth level</a:t>
             </a:r>
-            <a:endParaRPr lang="en-US" smtClean="0"/>
           </a:p>
           <a:p>
             <a:pPr lvl="4"/>
@@ -2718,7 +2718,6 @@
               <a:rPr lang="en-US" smtClean="0"/>
               <a:t>Click to edit Master text styles</a:t>
             </a:r>
-            <a:endParaRPr lang="en-US" smtClean="0"/>
           </a:p>
         </p:txBody>
       </p:sp>
@@ -2775,7 +2774,6 @@
               <a:rPr lang="en-US" smtClean="0"/>
               <a:t>Click to edit Master text styles</a:t>
             </a:r>
-            <a:endParaRPr lang="en-US" smtClean="0"/>
           </a:p>
           <a:p>
             <a:pPr lvl="1"/>
@@ -2783,7 +2781,6 @@
               <a:rPr lang="en-US" smtClean="0"/>
               <a:t>Second level</a:t>
             </a:r>
-            <a:endParaRPr lang="en-US" smtClean="0"/>
           </a:p>
           <a:p>
             <a:pPr lvl="2"/>
@@ -2791,7 +2788,6 @@
               <a:rPr lang="en-US" smtClean="0"/>
               <a:t>Third level</a:t>
             </a:r>
-            <a:endParaRPr lang="en-US" smtClean="0"/>
           </a:p>
           <a:p>
             <a:pPr lvl="3"/>
@@ -2799,7 +2795,6 @@
               <a:rPr lang="en-US" smtClean="0"/>
               <a:t>Fourth level</a:t>
             </a:r>
-            <a:endParaRPr lang="en-US" smtClean="0"/>
           </a:p>
           <a:p>
             <a:pPr lvl="4"/>
@@ -2828,6 +2823,7 @@
           <a:p>
             <a:fld id="{5BCAD085-E8A6-8845-BD4E-CB4CCA059FC4}" type="datetimeFigureOut">
               <a:rPr lang="en-US" smtClean="0"/>
+              <a:t>1/27/13</a:t>
             </a:fld>
             <a:endParaRPr lang="en-US"/>
           </a:p>
@@ -2869,12 +2865,18 @@
           <a:p>
             <a:fld id="{C1FF6DA9-008F-8B48-92A6-B652298478BF}" type="slidenum">
               <a:rPr lang="en-US" smtClean="0"/>
+              <a:t>‹#›</a:t>
             </a:fld>
             <a:endParaRPr lang="en-US"/>
           </a:p>
         </p:txBody>
       </p:sp>
     </p:spTree>
+    <p:extLst>
+      <p:ext uri="{BB962C8B-B14F-4D97-AF65-F5344CB8AC3E}">
+        <p14:creationId xmlns:p14="http://schemas.microsoft.com/office/powerpoint/2010/main" val="990158736"/>
+      </p:ext>
+    </p:extLst>
   </p:cSld>
   <p:clrMapOvr>
     <a:masterClrMapping/>
@@ -2939,6 +2941,7 @@
           <a:p>
             <a:fld id="{5BCAD085-E8A6-8845-BD4E-CB4CCA059FC4}" type="datetimeFigureOut">
               <a:rPr lang="en-US" smtClean="0"/>
+              <a:t>1/27/13</a:t>
             </a:fld>
             <a:endParaRPr lang="en-US"/>
           </a:p>
@@ -2980,12 +2983,18 @@
           <a:p>
             <a:fld id="{C1FF6DA9-008F-8B48-92A6-B652298478BF}" type="slidenum">
               <a:rPr lang="en-US" smtClean="0"/>
+              <a:t>‹#›</a:t>
             </a:fld>
             <a:endParaRPr lang="en-US"/>
           </a:p>
         </p:txBody>
       </p:sp>
     </p:spTree>
+    <p:extLst>
+      <p:ext uri="{BB962C8B-B14F-4D97-AF65-F5344CB8AC3E}">
+        <p14:creationId xmlns:p14="http://schemas.microsoft.com/office/powerpoint/2010/main" val="727027711"/>
+      </p:ext>
+    </p:extLst>
   </p:cSld>
   <p:clrMapOvr>
     <a:masterClrMapping/>
@@ -3027,6 +3036,7 @@
           <a:p>
             <a:fld id="{5BCAD085-E8A6-8845-BD4E-CB4CCA059FC4}" type="datetimeFigureOut">
               <a:rPr lang="en-US" smtClean="0"/>
+              <a:t>1/27/13</a:t>
             </a:fld>
             <a:endParaRPr lang="en-US"/>
           </a:p>
@@ -3068,12 +3078,18 @@
           <a:p>
             <a:fld id="{C1FF6DA9-008F-8B48-92A6-B652298478BF}" type="slidenum">
               <a:rPr lang="en-US" smtClean="0"/>
+              <a:t>‹#›</a:t>
             </a:fld>
             <a:endParaRPr lang="en-US"/>
           </a:p>
         </p:txBody>
       </p:sp>
     </p:spTree>
+    <p:extLst>
+      <p:ext uri="{BB962C8B-B14F-4D97-AF65-F5344CB8AC3E}">
+        <p14:creationId xmlns:p14="http://schemas.microsoft.com/office/powerpoint/2010/main" val="1212999818"/>
+      </p:ext>
+    </p:extLst>
   </p:cSld>
   <p:clrMapOvr>
     <a:masterClrMapping/>
@@ -3183,7 +3199,6 @@
               <a:rPr lang="en-US" smtClean="0"/>
               <a:t>Click to edit Master text styles</a:t>
             </a:r>
-            <a:endParaRPr lang="en-US" smtClean="0"/>
           </a:p>
           <a:p>
             <a:pPr lvl="1"/>
@@ -3191,7 +3206,6 @@
               <a:rPr lang="en-US" smtClean="0"/>
               <a:t>Second level</a:t>
             </a:r>
-            <a:endParaRPr lang="en-US" smtClean="0"/>
           </a:p>
           <a:p>
             <a:pPr lvl="2"/>
@@ -3199,7 +3213,6 @@
               <a:rPr lang="en-US" smtClean="0"/>
               <a:t>Third level</a:t>
             </a:r>
-            <a:endParaRPr lang="en-US" smtClean="0"/>
           </a:p>
           <a:p>
             <a:pPr lvl="3"/>
@@ -3207,7 +3220,6 @@
               <a:rPr lang="en-US" smtClean="0"/>
               <a:t>Fourth level</a:t>
             </a:r>
-            <a:endParaRPr lang="en-US" smtClean="0"/>
           </a:p>
           <a:p>
             <a:pPr lvl="4"/>
@@ -3281,7 +3293,6 @@
               <a:rPr lang="en-US" smtClean="0"/>
               <a:t>Click to edit Master text styles</a:t>
             </a:r>
-            <a:endParaRPr lang="en-US" smtClean="0"/>
           </a:p>
         </p:txBody>
       </p:sp>
@@ -3302,6 +3313,7 @@
           <a:p>
             <a:fld id="{5BCAD085-E8A6-8845-BD4E-CB4CCA059FC4}" type="datetimeFigureOut">
               <a:rPr lang="en-US" smtClean="0"/>
+              <a:t>1/27/13</a:t>
             </a:fld>
             <a:endParaRPr lang="en-US"/>
           </a:p>
@@ -3343,12 +3355,18 @@
           <a:p>
             <a:fld id="{C1FF6DA9-008F-8B48-92A6-B652298478BF}" type="slidenum">
               <a:rPr lang="en-US" smtClean="0"/>
+              <a:t>‹#›</a:t>
             </a:fld>
             <a:endParaRPr lang="en-US"/>
           </a:p>
         </p:txBody>
       </p:sp>
     </p:spTree>
+    <p:extLst>
+      <p:ext uri="{BB962C8B-B14F-4D97-AF65-F5344CB8AC3E}">
+        <p14:creationId xmlns:p14="http://schemas.microsoft.com/office/powerpoint/2010/main" val="1840726560"/>
+      </p:ext>
+    </p:extLst>
   </p:cSld>
   <p:clrMapOvr>
     <a:masterClrMapping/>
@@ -3528,7 +3546,6 @@
               <a:rPr lang="en-US" smtClean="0"/>
               <a:t>Click to edit Master text styles</a:t>
             </a:r>
-            <a:endParaRPr lang="en-US" smtClean="0"/>
           </a:p>
         </p:txBody>
       </p:sp>
@@ -3549,6 +3566,7 @@
           <a:p>
             <a:fld id="{5BCAD085-E8A6-8845-BD4E-CB4CCA059FC4}" type="datetimeFigureOut">
               <a:rPr lang="en-US" smtClean="0"/>
+              <a:t>1/27/13</a:t>
             </a:fld>
             <a:endParaRPr lang="en-US"/>
           </a:p>
@@ -3590,12 +3608,18 @@
           <a:p>
             <a:fld id="{C1FF6DA9-008F-8B48-92A6-B652298478BF}" type="slidenum">
               <a:rPr lang="en-US" smtClean="0"/>
+              <a:t>‹#›</a:t>
             </a:fld>
             <a:endParaRPr lang="en-US"/>
           </a:p>
         </p:txBody>
       </p:sp>
     </p:spTree>
+    <p:extLst>
+      <p:ext uri="{BB962C8B-B14F-4D97-AF65-F5344CB8AC3E}">
+        <p14:creationId xmlns:p14="http://schemas.microsoft.com/office/powerpoint/2010/main" val="3889236939"/>
+      </p:ext>
+    </p:extLst>
   </p:cSld>
   <p:clrMapOvr>
     <a:masterClrMapping/>
@@ -3688,7 +3712,6 @@
               <a:rPr lang="en-US" smtClean="0"/>
               <a:t>Click to edit Master text styles</a:t>
             </a:r>
-            <a:endParaRPr lang="en-US" smtClean="0"/>
           </a:p>
           <a:p>
             <a:pPr lvl="1"/>
@@ -3696,7 +3719,6 @@
               <a:rPr lang="en-US" smtClean="0"/>
               <a:t>Second level</a:t>
             </a:r>
-            <a:endParaRPr lang="en-US" smtClean="0"/>
           </a:p>
           <a:p>
             <a:pPr lvl="2"/>
@@ -3704,7 +3726,6 @@
               <a:rPr lang="en-US" smtClean="0"/>
               <a:t>Third level</a:t>
             </a:r>
-            <a:endParaRPr lang="en-US" smtClean="0"/>
           </a:p>
           <a:p>
             <a:pPr lvl="3"/>
@@ -3712,7 +3733,6 @@
               <a:rPr lang="en-US" smtClean="0"/>
               <a:t>Fourth level</a:t>
             </a:r>
-            <a:endParaRPr lang="en-US" smtClean="0"/>
           </a:p>
           <a:p>
             <a:pPr lvl="4"/>
@@ -3759,6 +3779,7 @@
           <a:p>
             <a:fld id="{5BCAD085-E8A6-8845-BD4E-CB4CCA059FC4}" type="datetimeFigureOut">
               <a:rPr lang="en-US" smtClean="0"/>
+              <a:t>1/27/13</a:t>
             </a:fld>
             <a:endParaRPr lang="en-US"/>
           </a:p>
@@ -3836,12 +3857,18 @@
           <a:p>
             <a:fld id="{C1FF6DA9-008F-8B48-92A6-B652298478BF}" type="slidenum">
               <a:rPr lang="en-US" smtClean="0"/>
+              <a:t>‹#›</a:t>
             </a:fld>
             <a:endParaRPr lang="en-US"/>
           </a:p>
         </p:txBody>
       </p:sp>
     </p:spTree>
+    <p:extLst>
+      <p:ext uri="{BB962C8B-B14F-4D97-AF65-F5344CB8AC3E}">
+        <p14:creationId xmlns:p14="http://schemas.microsoft.com/office/powerpoint/2010/main" val="2209977519"/>
+      </p:ext>
+    </p:extLst>
   </p:cSld>
   <p:clrMap bg1="lt1" tx1="dk1" bg2="lt2" tx2="dk2" accent1="accent1" accent2="accent2" accent3="accent3" accent4="accent4" accent5="accent5" accent6="accent6" hlink="hlink" folHlink="folHlink"/>
   <p:sldLayoutIdLst>
@@ -3879,7 +3906,7 @@
         <a:spcBef>
           <a:spcPct val="20000"/>
         </a:spcBef>
-        <a:buFont typeface="Arial" panose="020B0604020202020204"/>
+        <a:buFont typeface="Arial"/>
         <a:buChar char="•"/>
         <a:defRPr sz="3200" kern="1200">
           <a:solidFill>
@@ -3894,7 +3921,7 @@
         <a:spcBef>
           <a:spcPct val="20000"/>
         </a:spcBef>
-        <a:buFont typeface="Arial" panose="020B0604020202020204"/>
+        <a:buFont typeface="Arial"/>
         <a:buChar char="–"/>
         <a:defRPr sz="2800" kern="1200">
           <a:solidFill>
@@ -3909,7 +3936,7 @@
         <a:spcBef>
           <a:spcPct val="20000"/>
         </a:spcBef>
-        <a:buFont typeface="Arial" panose="020B0604020202020204"/>
+        <a:buFont typeface="Arial"/>
         <a:buChar char="•"/>
         <a:defRPr sz="2400" kern="1200">
           <a:solidFill>
@@ -3924,7 +3951,7 @@
         <a:spcBef>
           <a:spcPct val="20000"/>
         </a:spcBef>
-        <a:buFont typeface="Arial" panose="020B0604020202020204"/>
+        <a:buFont typeface="Arial"/>
         <a:buChar char="–"/>
         <a:defRPr sz="2000" kern="1200">
           <a:solidFill>
@@ -3939,7 +3966,7 @@
         <a:spcBef>
           <a:spcPct val="20000"/>
         </a:spcBef>
-        <a:buFont typeface="Arial" panose="020B0604020202020204"/>
+        <a:buFont typeface="Arial"/>
         <a:buChar char="»"/>
         <a:defRPr sz="2000" kern="1200">
           <a:solidFill>
@@ -3954,7 +3981,7 @@
         <a:spcBef>
           <a:spcPct val="20000"/>
         </a:spcBef>
-        <a:buFont typeface="Arial" panose="020B0604020202020204"/>
+        <a:buFont typeface="Arial"/>
         <a:buChar char="•"/>
         <a:defRPr sz="2000" kern="1200">
           <a:solidFill>
@@ -3969,7 +3996,7 @@
         <a:spcBef>
           <a:spcPct val="20000"/>
         </a:spcBef>
-        <a:buFont typeface="Arial" panose="020B0604020202020204"/>
+        <a:buFont typeface="Arial"/>
         <a:buChar char="•"/>
         <a:defRPr sz="2000" kern="1200">
           <a:solidFill>
@@ -3984,7 +4011,7 @@
         <a:spcBef>
           <a:spcPct val="20000"/>
         </a:spcBef>
-        <a:buFont typeface="Arial" panose="020B0604020202020204"/>
+        <a:buFont typeface="Arial"/>
         <a:buChar char="•"/>
         <a:defRPr sz="2000" kern="1200">
           <a:solidFill>
@@ -3999,7 +4026,7 @@
         <a:spcBef>
           <a:spcPct val="20000"/>
         </a:spcBef>
-        <a:buFont typeface="Arial" panose="020B0604020202020204"/>
+        <a:buFont typeface="Arial"/>
         <a:buChar char="•"/>
         <a:defRPr sz="2000" kern="1200">
           <a:solidFill>
@@ -4111,7 +4138,7 @@
 </file>
 
 <file path=ppt/slides/slide1.xml><?xml version="1.0" encoding="utf-8"?>
-<p:sld xmlns:a="http://schemas.openxmlformats.org/drawingml/2006/main" xmlns:r="http://schemas.openxmlformats.org/officeDocument/2006/relationships" xmlns:p="http://schemas.openxmlformats.org/presentationml/2006/main">
+<p:sld xmlns:a="http://schemas.openxmlformats.org/drawingml/2006/main" xmlns:p="http://schemas.openxmlformats.org/presentationml/2006/main" xmlns:r="http://schemas.openxmlformats.org/officeDocument/2006/relationships">
   <p:cSld>
     <p:spTree>
       <p:nvGrpSpPr>
@@ -4120,9 +4147,33 @@
         <p:nvPr/>
       </p:nvGrpSpPr>
       <p:grpSpPr/>
-      <p:sp>
-        <p:nvSpPr>
-          <p:cNvPr id="2" name="TextBox 1"/>
+      <p:pic>
+        <p:nvPicPr>
+          <p:cNvPr id="2" name="Picture 1" descr="UCC_Logo.png"/>
+          <p:cNvPicPr>
+            <a:picLocks noChangeAspect="1"/>
+          </p:cNvPicPr>
+          <p:nvPr/>
+        </p:nvPicPr>
+        <p:blipFill>
+          <a:blip r:embed="rId2"/>
+          <a:stretch>
+            <a:fillRect/>
+          </a:stretch>
+        </p:blipFill>
+        <p:spPr>
+          <a:xfrm>
+            <a:off x="8046720" y="182880"/>
+            <a:ext cx="640784" cy="731520"/>
+          </a:xfrm>
+          <a:prstGeom prst="rect">
+            <a:avLst/>
+          </a:prstGeom>
+        </p:spPr>
+      </p:pic>
+      <p:sp>
+        <p:nvSpPr>
+          <p:cNvPr id="3" name="TextBox 2"/>
           <p:cNvSpPr txBox="1"/>
           <p:nvPr/>
         </p:nvSpPr>
@@ -4181,7 +4232,7 @@
       </p:sp>
       <p:sp>
         <p:nvSpPr>
-          <p:cNvPr id="3" name="TextBox 2"/>
+          <p:cNvPr id="4" name="TextBox 3"/>
           <p:cNvSpPr txBox="1"/>
           <p:nvPr/>
         </p:nvSpPr>
@@ -4216,7 +4267,7 @@
       </p:sp>
       <p:sp>
         <p:nvSpPr>
-          <p:cNvPr id="4" name="TextBox 3"/>
+          <p:cNvPr id="5" name="TextBox 4"/>
           <p:cNvSpPr txBox="1"/>
           <p:nvPr/>
         </p:nvSpPr>
@@ -4251,7 +4302,7 @@
       </p:sp>
       <p:sp>
         <p:nvSpPr>
-          <p:cNvPr id="5" name="TextBox 4"/>
+          <p:cNvPr id="6" name="TextBox 5"/>
           <p:cNvSpPr txBox="1"/>
           <p:nvPr/>
         </p:nvSpPr>
@@ -4286,7 +4337,7 @@
       </p:sp>
       <p:sp>
         <p:nvSpPr>
-          <p:cNvPr id="6" name="TextBox 5"/>
+          <p:cNvPr id="7" name="TextBox 6"/>
           <p:cNvSpPr txBox="1"/>
           <p:nvPr/>
         </p:nvSpPr>
@@ -4341,7 +4392,7 @@
       </p:sp>
       <p:sp>
         <p:nvSpPr>
-          <p:cNvPr id="7" name="TextBox 6"/>
+          <p:cNvPr id="8" name="TextBox 7"/>
           <p:cNvSpPr txBox="1"/>
           <p:nvPr/>
         </p:nvSpPr>
@@ -4372,7 +4423,7 @@
       </p:sp>
       <p:sp>
         <p:nvSpPr>
-          <p:cNvPr id="8" name="TextBox 7"/>
+          <p:cNvPr id="9" name="TextBox 8"/>
           <p:cNvSpPr txBox="1"/>
           <p:nvPr/>
         </p:nvSpPr>
@@ -4410,7 +4461,7 @@
 </file>
 
 <file path=ppt/slides/slide10.xml><?xml version="1.0" encoding="utf-8"?>
-<p:sld xmlns:a="http://schemas.openxmlformats.org/drawingml/2006/main" xmlns:r="http://schemas.openxmlformats.org/officeDocument/2006/relationships" xmlns:p="http://schemas.openxmlformats.org/presentationml/2006/main">
+<p:sld xmlns:a="http://schemas.openxmlformats.org/drawingml/2006/main" xmlns:p="http://schemas.openxmlformats.org/presentationml/2006/main" xmlns:r="http://schemas.openxmlformats.org/officeDocument/2006/relationships">
   <p:cSld>
     <p:spTree>
       <p:nvGrpSpPr>
@@ -4419,9 +4470,33 @@
         <p:nvPr/>
       </p:nvGrpSpPr>
       <p:grpSpPr/>
-      <p:sp>
-        <p:nvSpPr>
-          <p:cNvPr id="2" name="TextBox 1"/>
+      <p:pic>
+        <p:nvPicPr>
+          <p:cNvPr id="2" name="Picture 1" descr="UCC_Logo.png"/>
+          <p:cNvPicPr>
+            <a:picLocks noChangeAspect="1"/>
+          </p:cNvPicPr>
+          <p:nvPr/>
+        </p:nvPicPr>
+        <p:blipFill>
+          <a:blip r:embed="rId2"/>
+          <a:stretch>
+            <a:fillRect/>
+          </a:stretch>
+        </p:blipFill>
+        <p:spPr>
+          <a:xfrm>
+            <a:off x="8046720" y="182880"/>
+            <a:ext cx="640784" cy="731520"/>
+          </a:xfrm>
+          <a:prstGeom prst="rect">
+            <a:avLst/>
+          </a:prstGeom>
+        </p:spPr>
+      </p:pic>
+      <p:sp>
+        <p:nvSpPr>
+          <p:cNvPr id="3" name="TextBox 2"/>
           <p:cNvSpPr txBox="1"/>
           <p:nvPr/>
         </p:nvSpPr>
@@ -4456,7 +4531,7 @@
       </p:sp>
       <p:sp>
         <p:nvSpPr>
-          <p:cNvPr id="3" name="TextBox 2"/>
+          <p:cNvPr id="4" name="TextBox 3"/>
           <p:cNvSpPr txBox="1"/>
           <p:nvPr/>
         </p:nvSpPr>
@@ -4491,7 +4566,7 @@
       </p:sp>
       <p:sp>
         <p:nvSpPr>
-          <p:cNvPr id="4" name="TextBox 3"/>
+          <p:cNvPr id="5" name="TextBox 4"/>
           <p:cNvSpPr txBox="1"/>
           <p:nvPr/>
         </p:nvSpPr>
@@ -4546,7 +4621,7 @@
       </p:sp>
       <p:sp>
         <p:nvSpPr>
-          <p:cNvPr id="5" name="TextBox 4"/>
+          <p:cNvPr id="6" name="TextBox 5"/>
           <p:cNvSpPr txBox="1"/>
           <p:nvPr/>
         </p:nvSpPr>
@@ -4600,7 +4675,7 @@
 </file>
 
 <file path=ppt/slides/slide2.xml><?xml version="1.0" encoding="utf-8"?>
-<p:sld xmlns:a="http://schemas.openxmlformats.org/drawingml/2006/main" xmlns:r="http://schemas.openxmlformats.org/officeDocument/2006/relationships" xmlns:p="http://schemas.openxmlformats.org/presentationml/2006/main">
+<p:sld xmlns:a="http://schemas.openxmlformats.org/drawingml/2006/main" xmlns:p="http://schemas.openxmlformats.org/presentationml/2006/main" xmlns:r="http://schemas.openxmlformats.org/officeDocument/2006/relationships">
   <p:cSld>
     <p:spTree>
       <p:nvGrpSpPr>
@@ -4609,9 +4684,33 @@
         <p:nvPr/>
       </p:nvGrpSpPr>
       <p:grpSpPr/>
-      <p:sp>
-        <p:nvSpPr>
-          <p:cNvPr id="2" name="TextBox 1"/>
+      <p:pic>
+        <p:nvPicPr>
+          <p:cNvPr id="2" name="Picture 1" descr="UCC_Logo.png"/>
+          <p:cNvPicPr>
+            <a:picLocks noChangeAspect="1"/>
+          </p:cNvPicPr>
+          <p:nvPr/>
+        </p:nvPicPr>
+        <p:blipFill>
+          <a:blip r:embed="rId2"/>
+          <a:stretch>
+            <a:fillRect/>
+          </a:stretch>
+        </p:blipFill>
+        <p:spPr>
+          <a:xfrm>
+            <a:off x="8046720" y="182880"/>
+            <a:ext cx="640784" cy="731520"/>
+          </a:xfrm>
+          <a:prstGeom prst="rect">
+            <a:avLst/>
+          </a:prstGeom>
+        </p:spPr>
+      </p:pic>
+      <p:sp>
+        <p:nvSpPr>
+          <p:cNvPr id="3" name="TextBox 2"/>
           <p:cNvSpPr txBox="1"/>
           <p:nvPr/>
         </p:nvSpPr>
@@ -4646,13 +4745,13 @@
       </p:sp>
       <p:sp>
         <p:nvSpPr>
-          <p:cNvPr id="3" name="TextBox 2"/>
+          <p:cNvPr id="4" name="TextBox 3"/>
           <p:cNvSpPr txBox="1"/>
           <p:nvPr/>
         </p:nvSpPr>
         <p:spPr>
           <a:xfrm>
-            <a:off x="457200" y="767080"/>
+            <a:off x="457200" y="1097280"/>
             <a:ext cx="8229600" cy="5303520"/>
           </a:xfrm>
           <a:prstGeom prst="rect">
@@ -4773,7 +4872,7 @@
 </file>
 
 <file path=ppt/slides/slide3.xml><?xml version="1.0" encoding="utf-8"?>
-<p:sld xmlns:a="http://schemas.openxmlformats.org/drawingml/2006/main" xmlns:r="http://schemas.openxmlformats.org/officeDocument/2006/relationships" xmlns:p="http://schemas.openxmlformats.org/presentationml/2006/main">
+<p:sld xmlns:a="http://schemas.openxmlformats.org/drawingml/2006/main" xmlns:p="http://schemas.openxmlformats.org/presentationml/2006/main" xmlns:r="http://schemas.openxmlformats.org/officeDocument/2006/relationships">
   <p:cSld>
     <p:spTree>
       <p:nvGrpSpPr>
@@ -4782,9 +4881,33 @@
         <p:nvPr/>
       </p:nvGrpSpPr>
       <p:grpSpPr/>
-      <p:sp>
-        <p:nvSpPr>
-          <p:cNvPr id="2" name="TextBox 1"/>
+      <p:pic>
+        <p:nvPicPr>
+          <p:cNvPr id="2" name="Picture 1" descr="UCC_Logo.png"/>
+          <p:cNvPicPr>
+            <a:picLocks noChangeAspect="1"/>
+          </p:cNvPicPr>
+          <p:nvPr/>
+        </p:nvPicPr>
+        <p:blipFill>
+          <a:blip r:embed="rId2"/>
+          <a:stretch>
+            <a:fillRect/>
+          </a:stretch>
+        </p:blipFill>
+        <p:spPr>
+          <a:xfrm>
+            <a:off x="8046720" y="182880"/>
+            <a:ext cx="640784" cy="731520"/>
+          </a:xfrm>
+          <a:prstGeom prst="rect">
+            <a:avLst/>
+          </a:prstGeom>
+        </p:spPr>
+      </p:pic>
+      <p:sp>
+        <p:nvSpPr>
+          <p:cNvPr id="3" name="TextBox 2"/>
           <p:cNvSpPr txBox="1"/>
           <p:nvPr/>
         </p:nvSpPr>
@@ -4819,7 +4942,7 @@
       </p:sp>
       <p:sp>
         <p:nvSpPr>
-          <p:cNvPr id="3" name="TextBox 2"/>
+          <p:cNvPr id="4" name="TextBox 3"/>
           <p:cNvSpPr txBox="1"/>
           <p:nvPr/>
         </p:nvSpPr>
@@ -4838,7 +4961,14 @@
             <a:normAutofit/>
           </a:bodyPr>
           <a:lstStyle/>
-          <a:p>
+          <a:p/>
+          <a:p>
+            <a:pPr>
+              <a:spcBef>
+                <a:spcPts val="600"/>
+              </a:spcBef>
+              <a:defRPr sz="1800"/>
+            </a:pPr>
             <a:r>
               <a:t>1. How did publication volumes fluctuate across pandemic phases?</a:t>
             </a:r>
@@ -4955,7 +5085,7 @@
 </file>
 
 <file path=ppt/slides/slide4.xml><?xml version="1.0" encoding="utf-8"?>
-<p:sld xmlns:a="http://schemas.openxmlformats.org/drawingml/2006/main" xmlns:r="http://schemas.openxmlformats.org/officeDocument/2006/relationships" xmlns:p="http://schemas.openxmlformats.org/presentationml/2006/main">
+<p:sld xmlns:a="http://schemas.openxmlformats.org/drawingml/2006/main" xmlns:p="http://schemas.openxmlformats.org/presentationml/2006/main" xmlns:r="http://schemas.openxmlformats.org/officeDocument/2006/relationships">
   <p:cSld>
     <p:spTree>
       <p:nvGrpSpPr>
@@ -4964,9 +5094,33 @@
         <p:nvPr/>
       </p:nvGrpSpPr>
       <p:grpSpPr/>
-      <p:sp>
-        <p:nvSpPr>
-          <p:cNvPr id="2" name="TextBox 1"/>
+      <p:pic>
+        <p:nvPicPr>
+          <p:cNvPr id="2" name="Picture 1" descr="UCC_Logo.png"/>
+          <p:cNvPicPr>
+            <a:picLocks noChangeAspect="1"/>
+          </p:cNvPicPr>
+          <p:nvPr/>
+        </p:nvPicPr>
+        <p:blipFill>
+          <a:blip r:embed="rId2"/>
+          <a:stretch>
+            <a:fillRect/>
+          </a:stretch>
+        </p:blipFill>
+        <p:spPr>
+          <a:xfrm>
+            <a:off x="8046720" y="182880"/>
+            <a:ext cx="640784" cy="731520"/>
+          </a:xfrm>
+          <a:prstGeom prst="rect">
+            <a:avLst/>
+          </a:prstGeom>
+        </p:spPr>
+      </p:pic>
+      <p:sp>
+        <p:nvSpPr>
+          <p:cNvPr id="3" name="TextBox 2"/>
           <p:cNvSpPr txBox="1"/>
           <p:nvPr/>
         </p:nvSpPr>
@@ -5001,7 +5155,7 @@
       </p:sp>
       <p:sp>
         <p:nvSpPr>
-          <p:cNvPr id="3" name="TextBox 2"/>
+          <p:cNvPr id="4" name="TextBox 3"/>
           <p:cNvSpPr txBox="1"/>
           <p:nvPr/>
         </p:nvSpPr>
@@ -5140,7 +5294,7 @@
       </p:sp>
       <p:sp>
         <p:nvSpPr>
-          <p:cNvPr id="4" name="TextBox 3"/>
+          <p:cNvPr id="5" name="TextBox 4"/>
           <p:cNvSpPr txBox="1"/>
           <p:nvPr/>
         </p:nvSpPr>
@@ -5297,7 +5451,7 @@
 </file>
 
 <file path=ppt/slides/slide5.xml><?xml version="1.0" encoding="utf-8"?>
-<p:sld xmlns:a="http://schemas.openxmlformats.org/drawingml/2006/main" xmlns:r="http://schemas.openxmlformats.org/officeDocument/2006/relationships" xmlns:p="http://schemas.openxmlformats.org/presentationml/2006/main">
+<p:sld xmlns:a="http://schemas.openxmlformats.org/drawingml/2006/main" xmlns:p="http://schemas.openxmlformats.org/presentationml/2006/main" xmlns:r="http://schemas.openxmlformats.org/officeDocument/2006/relationships">
   <p:cSld>
     <p:spTree>
       <p:nvGrpSpPr>
@@ -5306,9 +5460,33 @@
         <p:nvPr/>
       </p:nvGrpSpPr>
       <p:grpSpPr/>
-      <p:sp>
-        <p:nvSpPr>
-          <p:cNvPr id="2" name="TextBox 1"/>
+      <p:pic>
+        <p:nvPicPr>
+          <p:cNvPr id="2" name="Picture 1" descr="UCC_Logo.png"/>
+          <p:cNvPicPr>
+            <a:picLocks noChangeAspect="1"/>
+          </p:cNvPicPr>
+          <p:nvPr/>
+        </p:nvPicPr>
+        <p:blipFill>
+          <a:blip r:embed="rId2"/>
+          <a:stretch>
+            <a:fillRect/>
+          </a:stretch>
+        </p:blipFill>
+        <p:spPr>
+          <a:xfrm>
+            <a:off x="8046720" y="182880"/>
+            <a:ext cx="640784" cy="731520"/>
+          </a:xfrm>
+          <a:prstGeom prst="rect">
+            <a:avLst/>
+          </a:prstGeom>
+        </p:spPr>
+      </p:pic>
+      <p:sp>
+        <p:nvSpPr>
+          <p:cNvPr id="3" name="TextBox 2"/>
           <p:cNvSpPr txBox="1"/>
           <p:nvPr/>
         </p:nvSpPr>
@@ -5343,14 +5521,14 @@
       </p:sp>
       <p:pic>
         <p:nvPicPr>
-          <p:cNvPr id="3" name="Picture 2" descr="image.png"/>
+          <p:cNvPr id="4" name="Picture 3" descr="image.png"/>
           <p:cNvPicPr>
             <a:picLocks noChangeAspect="1"/>
           </p:cNvPicPr>
           <p:nvPr/>
         </p:nvPicPr>
         <p:blipFill>
-          <a:blip r:embed="rId1"/>
+          <a:blip r:embed="rId3"/>
           <a:stretch>
             <a:fillRect/>
           </a:stretch>
@@ -5367,7 +5545,7 @@
       </p:pic>
       <p:sp>
         <p:nvSpPr>
-          <p:cNvPr id="4" name="TextBox 3"/>
+          <p:cNvPr id="5" name="TextBox 4"/>
           <p:cNvSpPr txBox="1"/>
           <p:nvPr/>
         </p:nvSpPr>
@@ -5535,7 +5713,7 @@
 </file>
 
 <file path=ppt/slides/slide6.xml><?xml version="1.0" encoding="utf-8"?>
-<p:sld xmlns:a="http://schemas.openxmlformats.org/drawingml/2006/main" xmlns:r="http://schemas.openxmlformats.org/officeDocument/2006/relationships" xmlns:p="http://schemas.openxmlformats.org/presentationml/2006/main">
+<p:sld xmlns:a="http://schemas.openxmlformats.org/drawingml/2006/main" xmlns:p="http://schemas.openxmlformats.org/presentationml/2006/main" xmlns:r="http://schemas.openxmlformats.org/officeDocument/2006/relationships">
   <p:cSld>
     <p:spTree>
       <p:nvGrpSpPr>
@@ -5544,9 +5722,33 @@
         <p:nvPr/>
       </p:nvGrpSpPr>
       <p:grpSpPr/>
-      <p:sp>
-        <p:nvSpPr>
-          <p:cNvPr id="2" name="TextBox 1"/>
+      <p:pic>
+        <p:nvPicPr>
+          <p:cNvPr id="2" name="Picture 1" descr="UCC_Logo.png"/>
+          <p:cNvPicPr>
+            <a:picLocks noChangeAspect="1"/>
+          </p:cNvPicPr>
+          <p:nvPr/>
+        </p:nvPicPr>
+        <p:blipFill>
+          <a:blip r:embed="rId2"/>
+          <a:stretch>
+            <a:fillRect/>
+          </a:stretch>
+        </p:blipFill>
+        <p:spPr>
+          <a:xfrm>
+            <a:off x="8046720" y="182880"/>
+            <a:ext cx="640784" cy="731520"/>
+          </a:xfrm>
+          <a:prstGeom prst="rect">
+            <a:avLst/>
+          </a:prstGeom>
+        </p:spPr>
+      </p:pic>
+      <p:sp>
+        <p:nvSpPr>
+          <p:cNvPr id="3" name="TextBox 2"/>
           <p:cNvSpPr txBox="1"/>
           <p:nvPr/>
         </p:nvSpPr>
@@ -5581,21 +5783,21 @@
       </p:sp>
       <p:pic>
         <p:nvPicPr>
-          <p:cNvPr id="3" name="Picture 2" descr="image.png"/>
+          <p:cNvPr id="4" name="Picture 3" descr="image.png"/>
           <p:cNvPicPr>
             <a:picLocks noChangeAspect="1"/>
           </p:cNvPicPr>
           <p:nvPr/>
         </p:nvPicPr>
         <p:blipFill>
-          <a:blip r:embed="rId1"/>
+          <a:blip r:embed="rId3"/>
           <a:stretch>
             <a:fillRect/>
           </a:stretch>
         </p:blipFill>
         <p:spPr>
           <a:xfrm>
-            <a:off x="457200" y="843280"/>
+            <a:off x="457200" y="1371600"/>
             <a:ext cx="8229600" cy="5103305"/>
           </a:xfrm>
           <a:prstGeom prst="rect">
@@ -5605,13 +5807,13 @@
       </p:pic>
       <p:sp>
         <p:nvSpPr>
-          <p:cNvPr id="4" name="TextBox 3"/>
+          <p:cNvPr id="5" name="TextBox 4"/>
           <p:cNvSpPr txBox="1"/>
           <p:nvPr/>
         </p:nvSpPr>
         <p:spPr>
           <a:xfrm>
-            <a:off x="457200" y="5837555"/>
+            <a:off x="457200" y="5029200"/>
             <a:ext cx="8229600" cy="1371600"/>
           </a:xfrm>
           <a:prstGeom prst="rect">
@@ -5643,7 +5845,7 @@
 </file>
 
 <file path=ppt/slides/slide7.xml><?xml version="1.0" encoding="utf-8"?>
-<p:sld xmlns:a="http://schemas.openxmlformats.org/drawingml/2006/main" xmlns:r="http://schemas.openxmlformats.org/officeDocument/2006/relationships" xmlns:p="http://schemas.openxmlformats.org/presentationml/2006/main">
+<p:sld xmlns:a="http://schemas.openxmlformats.org/drawingml/2006/main" xmlns:p="http://schemas.openxmlformats.org/presentationml/2006/main" xmlns:r="http://schemas.openxmlformats.org/officeDocument/2006/relationships">
   <p:cSld>
     <p:spTree>
       <p:nvGrpSpPr>
@@ -5652,9 +5854,33 @@
         <p:nvPr/>
       </p:nvGrpSpPr>
       <p:grpSpPr/>
-      <p:sp>
-        <p:nvSpPr>
-          <p:cNvPr id="2" name="TextBox 1"/>
+      <p:pic>
+        <p:nvPicPr>
+          <p:cNvPr id="2" name="Picture 1" descr="UCC_Logo.png"/>
+          <p:cNvPicPr>
+            <a:picLocks noChangeAspect="1"/>
+          </p:cNvPicPr>
+          <p:nvPr/>
+        </p:nvPicPr>
+        <p:blipFill>
+          <a:blip r:embed="rId2"/>
+          <a:stretch>
+            <a:fillRect/>
+          </a:stretch>
+        </p:blipFill>
+        <p:spPr>
+          <a:xfrm>
+            <a:off x="8046720" y="182880"/>
+            <a:ext cx="640784" cy="731520"/>
+          </a:xfrm>
+          <a:prstGeom prst="rect">
+            <a:avLst/>
+          </a:prstGeom>
+        </p:spPr>
+      </p:pic>
+      <p:sp>
+        <p:nvSpPr>
+          <p:cNvPr id="3" name="TextBox 2"/>
           <p:cNvSpPr txBox="1"/>
           <p:nvPr/>
         </p:nvSpPr>
@@ -5689,21 +5915,21 @@
       </p:sp>
       <p:pic>
         <p:nvPicPr>
-          <p:cNvPr id="3" name="Picture 2" descr="image.png"/>
+          <p:cNvPr id="4" name="Picture 3" descr="image.png"/>
           <p:cNvPicPr>
             <a:picLocks noChangeAspect="1"/>
           </p:cNvPicPr>
           <p:nvPr/>
         </p:nvPicPr>
         <p:blipFill>
-          <a:blip r:embed="rId1"/>
+          <a:blip r:embed="rId3"/>
           <a:stretch>
             <a:fillRect/>
           </a:stretch>
         </p:blipFill>
         <p:spPr>
           <a:xfrm>
-            <a:off x="457200" y="760730"/>
+            <a:off x="457200" y="1371600"/>
             <a:ext cx="8229600" cy="5103305"/>
           </a:xfrm>
           <a:prstGeom prst="rect">
@@ -5713,13 +5939,13 @@
       </p:pic>
       <p:sp>
         <p:nvSpPr>
-          <p:cNvPr id="4" name="TextBox 3"/>
+          <p:cNvPr id="5" name="TextBox 4"/>
           <p:cNvSpPr txBox="1"/>
           <p:nvPr/>
         </p:nvSpPr>
         <p:spPr>
           <a:xfrm>
-            <a:off x="457200" y="5537835"/>
+            <a:off x="457200" y="5029200"/>
             <a:ext cx="8229600" cy="1371600"/>
           </a:xfrm>
           <a:prstGeom prst="rect">
@@ -5752,7 +5978,7 @@
 </file>
 
 <file path=ppt/slides/slide8.xml><?xml version="1.0" encoding="utf-8"?>
-<p:sld xmlns:a="http://schemas.openxmlformats.org/drawingml/2006/main" xmlns:r="http://schemas.openxmlformats.org/officeDocument/2006/relationships" xmlns:p="http://schemas.openxmlformats.org/presentationml/2006/main">
+<p:sld xmlns:a="http://schemas.openxmlformats.org/drawingml/2006/main" xmlns:p="http://schemas.openxmlformats.org/presentationml/2006/main" xmlns:r="http://schemas.openxmlformats.org/officeDocument/2006/relationships">
   <p:cSld>
     <p:spTree>
       <p:nvGrpSpPr>
@@ -5761,9 +5987,33 @@
         <p:nvPr/>
       </p:nvGrpSpPr>
       <p:grpSpPr/>
-      <p:sp>
-        <p:nvSpPr>
-          <p:cNvPr id="2" name="TextBox 1"/>
+      <p:pic>
+        <p:nvPicPr>
+          <p:cNvPr id="2" name="Picture 1" descr="UCC_Logo.png"/>
+          <p:cNvPicPr>
+            <a:picLocks noChangeAspect="1"/>
+          </p:cNvPicPr>
+          <p:nvPr/>
+        </p:nvPicPr>
+        <p:blipFill>
+          <a:blip r:embed="rId2"/>
+          <a:stretch>
+            <a:fillRect/>
+          </a:stretch>
+        </p:blipFill>
+        <p:spPr>
+          <a:xfrm>
+            <a:off x="8046720" y="182880"/>
+            <a:ext cx="640784" cy="731520"/>
+          </a:xfrm>
+          <a:prstGeom prst="rect">
+            <a:avLst/>
+          </a:prstGeom>
+        </p:spPr>
+      </p:pic>
+      <p:sp>
+        <p:nvSpPr>
+          <p:cNvPr id="3" name="TextBox 2"/>
           <p:cNvSpPr txBox="1"/>
           <p:nvPr/>
         </p:nvSpPr>
@@ -5798,13 +6048,13 @@
       </p:sp>
       <p:sp>
         <p:nvSpPr>
-          <p:cNvPr id="3" name="TextBox 2"/>
+          <p:cNvPr id="4" name="TextBox 3"/>
           <p:cNvSpPr txBox="1"/>
           <p:nvPr/>
         </p:nvSpPr>
         <p:spPr>
           <a:xfrm>
-            <a:off x="457200" y="822960"/>
+            <a:off x="457200" y="1097280"/>
             <a:ext cx="8229600" cy="5303520"/>
           </a:xfrm>
           <a:prstGeom prst="rect">
@@ -5814,21 +6064,12 @@
         </p:spPr>
         <p:txBody>
           <a:bodyPr wrap="square">
-            <a:normAutofit lnSpcReduction="10000"/>
+            <a:normAutofit/>
           </a:bodyPr>
           <a:lstStyle/>
-          <a:p>
-            <a:pPr>
-              <a:lnSpc>
-                <a:spcPct val="110000"/>
-              </a:lnSpc>
-            </a:pPr>
-          </a:p>
-          <a:p>
-            <a:pPr>
-              <a:lnSpc>
-                <a:spcPct val="110000"/>
-              </a:lnSpc>
+          <a:p/>
+          <a:p>
+            <a:pPr>
               <a:spcBef>
                 <a:spcPts val="600"/>
               </a:spcBef>
@@ -5840,9 +6081,6 @@
           </a:p>
           <a:p>
             <a:pPr lvl="1">
-              <a:lnSpc>
-                <a:spcPct val="110000"/>
-              </a:lnSpc>
               <a:spcBef>
                 <a:spcPts val="600"/>
               </a:spcBef>
@@ -5854,9 +6092,6 @@
           </a:p>
           <a:p>
             <a:pPr>
-              <a:lnSpc>
-                <a:spcPct val="30000"/>
-              </a:lnSpc>
               <a:spcBef>
                 <a:spcPts val="600"/>
               </a:spcBef>
@@ -5865,9 +6100,6 @@
           </a:p>
           <a:p>
             <a:pPr>
-              <a:lnSpc>
-                <a:spcPct val="110000"/>
-              </a:lnSpc>
               <a:spcBef>
                 <a:spcPts val="600"/>
               </a:spcBef>
@@ -5879,9 +6111,6 @@
           </a:p>
           <a:p>
             <a:pPr lvl="1">
-              <a:lnSpc>
-                <a:spcPct val="110000"/>
-              </a:lnSpc>
               <a:spcBef>
                 <a:spcPts val="600"/>
               </a:spcBef>
@@ -5893,9 +6122,6 @@
           </a:p>
           <a:p>
             <a:pPr lvl="1">
-              <a:lnSpc>
-                <a:spcPct val="110000"/>
-              </a:lnSpc>
               <a:spcBef>
                 <a:spcPts val="600"/>
               </a:spcBef>
@@ -5907,9 +6133,6 @@
           </a:p>
           <a:p>
             <a:pPr>
-              <a:lnSpc>
-                <a:spcPct val="30000"/>
-              </a:lnSpc>
               <a:spcBef>
                 <a:spcPts val="600"/>
               </a:spcBef>
@@ -5918,9 +6141,6 @@
           </a:p>
           <a:p>
             <a:pPr>
-              <a:lnSpc>
-                <a:spcPct val="110000"/>
-              </a:lnSpc>
               <a:spcBef>
                 <a:spcPts val="600"/>
               </a:spcBef>
@@ -5932,9 +6152,6 @@
           </a:p>
           <a:p>
             <a:pPr lvl="1">
-              <a:lnSpc>
-                <a:spcPct val="110000"/>
-              </a:lnSpc>
               <a:spcBef>
                 <a:spcPts val="600"/>
               </a:spcBef>
@@ -5946,9 +6163,6 @@
           </a:p>
           <a:p>
             <a:pPr lvl="1">
-              <a:lnSpc>
-                <a:spcPct val="110000"/>
-              </a:lnSpc>
               <a:spcBef>
                 <a:spcPts val="600"/>
               </a:spcBef>
@@ -5960,9 +6174,6 @@
           </a:p>
           <a:p>
             <a:pPr>
-              <a:lnSpc>
-                <a:spcPct val="60000"/>
-              </a:lnSpc>
               <a:spcBef>
                 <a:spcPts val="600"/>
               </a:spcBef>
@@ -5971,9 +6182,6 @@
           </a:p>
           <a:p>
             <a:pPr>
-              <a:lnSpc>
-                <a:spcPct val="110000"/>
-              </a:lnSpc>
               <a:spcBef>
                 <a:spcPts val="600"/>
               </a:spcBef>
@@ -5985,9 +6193,6 @@
           </a:p>
           <a:p>
             <a:pPr lvl="1">
-              <a:lnSpc>
-                <a:spcPct val="110000"/>
-              </a:lnSpc>
               <a:spcBef>
                 <a:spcPts val="600"/>
               </a:spcBef>
@@ -5999,9 +6204,6 @@
           </a:p>
           <a:p>
             <a:pPr lvl="1">
-              <a:lnSpc>
-                <a:spcPct val="110000"/>
-              </a:lnSpc>
               <a:spcBef>
                 <a:spcPts val="600"/>
               </a:spcBef>
@@ -6022,7 +6224,7 @@
 </file>
 
 <file path=ppt/slides/slide9.xml><?xml version="1.0" encoding="utf-8"?>
-<p:sld xmlns:a="http://schemas.openxmlformats.org/drawingml/2006/main" xmlns:r="http://schemas.openxmlformats.org/officeDocument/2006/relationships" xmlns:p="http://schemas.openxmlformats.org/presentationml/2006/main">
+<p:sld xmlns:a="http://schemas.openxmlformats.org/drawingml/2006/main" xmlns:p="http://schemas.openxmlformats.org/presentationml/2006/main" xmlns:r="http://schemas.openxmlformats.org/officeDocument/2006/relationships">
   <p:cSld>
     <p:spTree>
       <p:nvGrpSpPr>
@@ -6031,9 +6233,33 @@
         <p:nvPr/>
       </p:nvGrpSpPr>
       <p:grpSpPr/>
-      <p:sp>
-        <p:nvSpPr>
-          <p:cNvPr id="2" name="TextBox 1"/>
+      <p:pic>
+        <p:nvPicPr>
+          <p:cNvPr id="2" name="Picture 1" descr="UCC_Logo.png"/>
+          <p:cNvPicPr>
+            <a:picLocks noChangeAspect="1"/>
+          </p:cNvPicPr>
+          <p:nvPr/>
+        </p:nvPicPr>
+        <p:blipFill>
+          <a:blip r:embed="rId2"/>
+          <a:stretch>
+            <a:fillRect/>
+          </a:stretch>
+        </p:blipFill>
+        <p:spPr>
+          <a:xfrm>
+            <a:off x="8046720" y="182880"/>
+            <a:ext cx="640784" cy="731520"/>
+          </a:xfrm>
+          <a:prstGeom prst="rect">
+            <a:avLst/>
+          </a:prstGeom>
+        </p:spPr>
+      </p:pic>
+      <p:sp>
+        <p:nvSpPr>
+          <p:cNvPr id="3" name="TextBox 2"/>
           <p:cNvSpPr txBox="1"/>
           <p:nvPr/>
         </p:nvSpPr>
@@ -6068,13 +6294,13 @@
       </p:sp>
       <p:sp>
         <p:nvSpPr>
-          <p:cNvPr id="3" name="TextBox 2"/>
+          <p:cNvPr id="4" name="TextBox 3"/>
           <p:cNvSpPr txBox="1"/>
           <p:nvPr/>
         </p:nvSpPr>
         <p:spPr>
           <a:xfrm>
-            <a:off x="457200" y="822960"/>
+            <a:off x="457200" y="1097280"/>
             <a:ext cx="8229600" cy="5303520"/>
           </a:xfrm>
           <a:prstGeom prst="rect">
@@ -6084,7 +6310,7 @@
         </p:spPr>
         <p:txBody>
           <a:bodyPr wrap="square">
-            <a:normAutofit lnSpcReduction="10000"/>
+            <a:normAutofit/>
           </a:bodyPr>
           <a:lstStyle/>
           <a:p/>
@@ -6131,9 +6357,6 @@
           </a:p>
           <a:p>
             <a:pPr>
-              <a:lnSpc>
-                <a:spcPct val="110000"/>
-              </a:lnSpc>
               <a:spcBef>
                 <a:spcPts val="600"/>
               </a:spcBef>
@@ -6142,6 +6365,14 @@
             <a:r>
               <a:t>Practical Recommendations:</a:t>
             </a:r>
+          </a:p>
+          <a:p>
+            <a:pPr>
+              <a:spcBef>
+                <a:spcPts val="600"/>
+              </a:spcBef>
+              <a:defRPr sz="1600"/>
+            </a:pPr>
           </a:p>
           <a:p>
             <a:pPr>
@@ -6581,11 +6812,7 @@
       </a:style>
     </a:lnDef>
   </a:objectDefaults>
-  <a:extLst>
-    <a:ext uri="{05A4C25C-085E-4340-85A3-A5531E510DB2}">
-      <thm15:themeFamily xmlns:thm15="http://schemas.microsoft.com/office/thememl/2012/main" name="Office Theme" id="{62F939B6-93AF-4DB8-9C6B-D6C7DFDC589F}" vid="{4A3C46E8-61CC-4603-A589-7422A47A8E4A}"/>
-    </a:ext>
-  </a:extLst>
+  <a:extraClrSchemeLst/>
 </a:theme>
 </file>
 
@@ -6905,10 +7132,6 @@
       </a:style>
     </a:lnDef>
   </a:objectDefaults>
-  <a:extLst>
-    <a:ext uri="{05A4C25C-085E-4340-85A3-A5531E510DB2}">
-      <thm15:themeFamily xmlns:thm15="http://schemas.microsoft.com/office/thememl/2012/main" name="Office Theme" id="{62F939B6-93AF-4DB8-9C6B-D6C7DFDC589F}" vid="{4A3C46E8-61CC-4603-A589-7422A47A8E4A}"/>
-    </a:ext>
-  </a:extLst>
+  <a:extraClrSchemeLst/>
 </a:theme>
 </file>
</xml_diff>

<commit_message>
Update PowerPoint presentation with latest version
- Refresh CAPSTONE_PRESENTATION.pptx with current version
- Ensure all slides have embedded UCC logos
- Update charts and content for defense presentation

🤖 Generated with [Claude Code](https://claude.com/claude-code)

Co-Authored-By: Claude <noreply@anthropic.com>
</commit_message>
<xml_diff>
--- a/PRESENTATION/CAPSTONE_PRESENTATION.pptx
+++ b/PRESENTATION/CAPSTONE_PRESENTATION.pptx
@@ -1,20 +1,23 @@
 
 <file path=ppt/presentation.xml><?xml version="1.0" encoding="utf-8"?>
-<p:presentation xmlns:a="http://schemas.openxmlformats.org/drawingml/2006/main" xmlns:r="http://schemas.openxmlformats.org/officeDocument/2006/relationships" xmlns:p="http://schemas.openxmlformats.org/presentationml/2006/main" saveSubsetFonts="1" autoCompressPictures="0">
+<p:presentation xmlns:a="http://schemas.openxmlformats.org/drawingml/2006/main" xmlns:r="http://schemas.openxmlformats.org/officeDocument/2006/relationships" xmlns:p="http://schemas.openxmlformats.org/presentationml/2006/main" autoCompressPictures="0">
   <p:sldMasterIdLst>
     <p:sldMasterId id="2147483648" r:id="rId1"/>
   </p:sldMasterIdLst>
+  <p:notesMasterIdLst>
+    <p:notesMasterId r:id="rId4"/>
+  </p:notesMasterIdLst>
   <p:sldIdLst>
-    <p:sldId id="256" r:id="rId7"/>
-    <p:sldId id="257" r:id="rId9"/>
-    <p:sldId id="258" r:id="rId10"/>
-    <p:sldId id="259" r:id="rId11"/>
-    <p:sldId id="260" r:id="rId12"/>
-    <p:sldId id="261" r:id="rId13"/>
-    <p:sldId id="262" r:id="rId14"/>
-    <p:sldId id="263" r:id="rId15"/>
-    <p:sldId id="264" r:id="rId16"/>
-    <p:sldId id="265" r:id="rId17"/>
+    <p:sldId id="256" r:id="rId3"/>
+    <p:sldId id="257" r:id="rId5"/>
+    <p:sldId id="258" r:id="rId6"/>
+    <p:sldId id="259" r:id="rId7"/>
+    <p:sldId id="260" r:id="rId8"/>
+    <p:sldId id="261" r:id="rId9"/>
+    <p:sldId id="262" r:id="rId10"/>
+    <p:sldId id="263" r:id="rId11"/>
+    <p:sldId id="264" r:id="rId12"/>
+    <p:sldId id="265" r:id="rId13"/>
   </p:sldIdLst>
   <p:sldSz cx="9144000" cy="6858000" type="screen4x3"/>
   <p:notesSz cx="6858000" cy="9144000"/>
@@ -113,11 +116,27 @@
       </a:defRPr>
     </a:lvl9pPr>
   </p:defaultTextStyle>
+  <p:extLst>
+    <p:ext uri="{EFAFB233-063F-42B5-8137-9DF3F51BA10A}">
+      <p15:sldGuideLst xmlns:p15="http://schemas.microsoft.com/office/powerpoint/2012/main">
+        <p15:guide id="1" orient="horz" pos="2154" userDrawn="1">
+          <p15:clr>
+            <a:srgbClr val="A4A3A4"/>
+          </p15:clr>
+        </p15:guide>
+        <p15:guide id="2" pos="2880" userDrawn="1">
+          <p15:clr>
+            <a:srgbClr val="A4A3A4"/>
+          </p15:clr>
+        </p15:guide>
+      </p15:sldGuideLst>
+    </p:ext>
+  </p:extLst>
 </p:presentation>
 </file>
 
 <file path=ppt/notesMasters/notesMaster1.xml><?xml version="1.0" encoding="utf-8"?>
-<p:notesMaster xmlns:a="http://schemas.openxmlformats.org/drawingml/2006/main" xmlns:p="http://schemas.openxmlformats.org/presentationml/2006/main" xmlns:r="http://schemas.openxmlformats.org/officeDocument/2006/relationships">
+<p:notesMaster xmlns:a="http://schemas.openxmlformats.org/drawingml/2006/main" xmlns:r="http://schemas.openxmlformats.org/officeDocument/2006/relationships" xmlns:p="http://schemas.openxmlformats.org/presentationml/2006/main">
   <p:cSld>
     <p:bg>
       <p:bgRef idx="1001">
@@ -198,7 +217,6 @@
           <a:p>
             <a:fld id="{0F89C1C7-3DCD-1040-A9CF-14679D8B5DDD}" type="datetimeFigureOut">
               <a:rPr lang="en-US" smtClean="0"/>
-              <a:t>10/17/16</a:t>
             </a:fld>
             <a:endParaRPr lang="en-US"/>
           </a:p>
@@ -265,6 +283,7 @@
               <a:rPr lang="en-US" smtClean="0"/>
               <a:t>Click to edit Master text styles</a:t>
             </a:r>
+            <a:endParaRPr lang="en-US" smtClean="0"/>
           </a:p>
           <a:p>
             <a:pPr lvl="1"/>
@@ -272,6 +291,7 @@
               <a:rPr lang="en-US" smtClean="0"/>
               <a:t>Second level</a:t>
             </a:r>
+            <a:endParaRPr lang="en-US" smtClean="0"/>
           </a:p>
           <a:p>
             <a:pPr lvl="2"/>
@@ -279,6 +299,7 @@
               <a:rPr lang="en-US" smtClean="0"/>
               <a:t>Third level</a:t>
             </a:r>
+            <a:endParaRPr lang="en-US" smtClean="0"/>
           </a:p>
           <a:p>
             <a:pPr lvl="3"/>
@@ -286,6 +307,7 @@
               <a:rPr lang="en-US" smtClean="0"/>
               <a:t>Fourth level</a:t>
             </a:r>
+            <a:endParaRPr lang="en-US" smtClean="0"/>
           </a:p>
           <a:p>
             <a:pPr lvl="4"/>
@@ -357,18 +379,12 @@
           <a:p>
             <a:fld id="{BB5E49A5-4136-284D-997B-48E1D791AD67}" type="slidenum">
               <a:rPr lang="en-US" smtClean="0"/>
-              <a:t>‹#›</a:t>
             </a:fld>
             <a:endParaRPr lang="en-US"/>
           </a:p>
         </p:txBody>
       </p:sp>
     </p:spTree>
-    <p:extLst>
-      <p:ext uri="{BB962C8B-B14F-4D97-AF65-F5344CB8AC3E}">
-        <p14:creationId xmlns:p14="http://schemas.microsoft.com/office/powerpoint/2010/main" val="2623252185"/>
-      </p:ext>
-    </p:extLst>
   </p:cSld>
   <p:clrMap bg1="lt1" tx1="dk1" bg2="lt2" tx2="dk2" accent1="accent1" accent2="accent2" accent3="accent3" accent4="accent4" accent5="accent5" accent6="accent6" hlink="hlink" folHlink="folHlink"/>
   <p:notesStyle>
@@ -467,7 +483,7 @@
 </file>
 
 <file path=ppt/notesSlides/notesSlide1.xml><?xml version="1.0" encoding="utf-8"?>
-<p:notes xmlns:a="http://schemas.openxmlformats.org/drawingml/2006/main" xmlns:p="http://schemas.openxmlformats.org/presentationml/2006/main" xmlns:r="http://schemas.openxmlformats.org/officeDocument/2006/relationships">
+<p:notes xmlns:a="http://schemas.openxmlformats.org/drawingml/2006/main" xmlns:r="http://schemas.openxmlformats.org/officeDocument/2006/relationships" xmlns:p="http://schemas.openxmlformats.org/presentationml/2006/main">
   <p:cSld>
     <p:spTree>
       <p:nvGrpSpPr>
@@ -502,7 +518,7 @@
             <a:spLocks noGrp="1"/>
           </p:cNvSpPr>
           <p:nvPr>
-            <p:ph type="body" idx="3" sz="quarter"/>
+            <p:ph type="body" sz="quarter" idx="3"/>
           </p:nvPr>
         </p:nvSpPr>
         <p:spPr/>
@@ -523,7 +539,7 @@
             <a:spLocks noGrp="1"/>
           </p:cNvSpPr>
           <p:nvPr>
-            <p:ph type="sldNum" idx="5" sz="quarter"/>
+            <p:ph type="sldNum" sz="quarter" idx="5"/>
           </p:nvPr>
         </p:nvSpPr>
         <p:spPr/>
@@ -537,7 +553,7 @@
 </file>
 
 <file path=ppt/notesSlides/notesSlide10.xml><?xml version="1.0" encoding="utf-8"?>
-<p:notes xmlns:a="http://schemas.openxmlformats.org/drawingml/2006/main" xmlns:p="http://schemas.openxmlformats.org/presentationml/2006/main" xmlns:r="http://schemas.openxmlformats.org/officeDocument/2006/relationships">
+<p:notes xmlns:a="http://schemas.openxmlformats.org/drawingml/2006/main" xmlns:r="http://schemas.openxmlformats.org/officeDocument/2006/relationships" xmlns:p="http://schemas.openxmlformats.org/presentationml/2006/main">
   <p:cSld>
     <p:spTree>
       <p:nvGrpSpPr>
@@ -572,7 +588,7 @@
             <a:spLocks noGrp="1"/>
           </p:cNvSpPr>
           <p:nvPr>
-            <p:ph type="body" idx="3" sz="quarter"/>
+            <p:ph type="body" sz="quarter" idx="3"/>
           </p:nvPr>
         </p:nvSpPr>
         <p:spPr/>
@@ -593,7 +609,7 @@
             <a:spLocks noGrp="1"/>
           </p:cNvSpPr>
           <p:nvPr>
-            <p:ph type="sldNum" idx="5" sz="quarter"/>
+            <p:ph type="sldNum" sz="quarter" idx="5"/>
           </p:nvPr>
         </p:nvSpPr>
         <p:spPr/>
@@ -607,7 +623,7 @@
 </file>
 
 <file path=ppt/notesSlides/notesSlide2.xml><?xml version="1.0" encoding="utf-8"?>
-<p:notes xmlns:a="http://schemas.openxmlformats.org/drawingml/2006/main" xmlns:p="http://schemas.openxmlformats.org/presentationml/2006/main" xmlns:r="http://schemas.openxmlformats.org/officeDocument/2006/relationships">
+<p:notes xmlns:a="http://schemas.openxmlformats.org/drawingml/2006/main" xmlns:r="http://schemas.openxmlformats.org/officeDocument/2006/relationships" xmlns:p="http://schemas.openxmlformats.org/presentationml/2006/main">
   <p:cSld>
     <p:spTree>
       <p:nvGrpSpPr>
@@ -642,7 +658,7 @@
             <a:spLocks noGrp="1"/>
           </p:cNvSpPr>
           <p:nvPr>
-            <p:ph type="body" idx="3" sz="quarter"/>
+            <p:ph type="body" sz="quarter" idx="3"/>
           </p:nvPr>
         </p:nvSpPr>
         <p:spPr/>
@@ -651,8 +667,10 @@
           <a:lstStyle/>
           <a:p>
             <a:r>
+              <a:rPr lang="en-US"/>
               <a:t>This study examines 472 peer-reviewed publications spanning 2020 to 2024, covering the pandemic's acute phase through the transition to endemic status. The corpus is distributed across 281 unique journals, demonstrating remarkable disciplinary diversity. Our research pursued four primary objectives: characterizing temporal evolution of COVID-19 publications, systematically assessing research quality using a multidimensional 100-point scoring system, analyzing publication patterns across journals and disciplines, and identifying temporal trends in methodological sophistication. The mean quality score of 97.52 out of 100 suggests maintained research standards despite unprecedented publication pressure.</a:t>
             </a:r>
+            <a:endParaRPr lang="en-US"/>
           </a:p>
         </p:txBody>
       </p:sp>
@@ -663,7 +681,7 @@
             <a:spLocks noGrp="1"/>
           </p:cNvSpPr>
           <p:nvPr>
-            <p:ph type="sldNum" idx="5" sz="quarter"/>
+            <p:ph type="sldNum" sz="quarter" idx="5"/>
           </p:nvPr>
         </p:nvSpPr>
         <p:spPr/>
@@ -677,7 +695,7 @@
 </file>
 
 <file path=ppt/notesSlides/notesSlide3.xml><?xml version="1.0" encoding="utf-8"?>
-<p:notes xmlns:a="http://schemas.openxmlformats.org/drawingml/2006/main" xmlns:p="http://schemas.openxmlformats.org/presentationml/2006/main" xmlns:r="http://schemas.openxmlformats.org/officeDocument/2006/relationships">
+<p:notes xmlns:a="http://schemas.openxmlformats.org/drawingml/2006/main" xmlns:r="http://schemas.openxmlformats.org/officeDocument/2006/relationships" xmlns:p="http://schemas.openxmlformats.org/presentationml/2006/main">
   <p:cSld>
     <p:spTree>
       <p:nvGrpSpPr>
@@ -712,7 +730,7 @@
             <a:spLocks noGrp="1"/>
           </p:cNvSpPr>
           <p:nvPr>
-            <p:ph type="body" idx="3" sz="quarter"/>
+            <p:ph type="body" sz="quarter" idx="3"/>
           </p:nvPr>
         </p:nvSpPr>
         <p:spPr/>
@@ -721,8 +739,10 @@
           <a:lstStyle/>
           <a:p>
             <a:r>
+              <a:rPr lang="en-US"/>
               <a:t>This research addresses four fundamental questions. First, how did publication volumes fluctuate across different pandemic phases? We examine temporal patterns from 2020's acute crisis through 2024's endemic transition. Second, did research quality remain consistent throughout the pandemic? Our systematic quality assessment uses a 100-point multidimensional scoring system evaluating methodological rigor, reproducibility, and scientific contribution. Third, which journals and disciplines led COVID-19 research production? Distribution across 281 unique journals reveals disciplinary engagement patterns. Finally, what implications do these patterns have for future health emergencies? We provide evidence-based insights for research policy, funding allocation, and crisis-driven knowledge production.</a:t>
             </a:r>
+            <a:endParaRPr lang="en-US"/>
           </a:p>
         </p:txBody>
       </p:sp>
@@ -733,7 +753,7 @@
             <a:spLocks noGrp="1"/>
           </p:cNvSpPr>
           <p:nvPr>
-            <p:ph type="sldNum" idx="5" sz="quarter"/>
+            <p:ph type="sldNum" sz="quarter" idx="5"/>
           </p:nvPr>
         </p:nvSpPr>
         <p:spPr/>
@@ -747,7 +767,7 @@
 </file>
 
 <file path=ppt/notesSlides/notesSlide4.xml><?xml version="1.0" encoding="utf-8"?>
-<p:notes xmlns:a="http://schemas.openxmlformats.org/drawingml/2006/main" xmlns:p="http://schemas.openxmlformats.org/presentationml/2006/main" xmlns:r="http://schemas.openxmlformats.org/officeDocument/2006/relationships">
+<p:notes xmlns:a="http://schemas.openxmlformats.org/drawingml/2006/main" xmlns:r="http://schemas.openxmlformats.org/officeDocument/2006/relationships" xmlns:p="http://schemas.openxmlformats.org/presentationml/2006/main">
   <p:cSld>
     <p:spTree>
       <p:nvGrpSpPr>
@@ -782,7 +802,7 @@
             <a:spLocks noGrp="1"/>
           </p:cNvSpPr>
           <p:nvPr>
-            <p:ph type="body" idx="3" sz="quarter"/>
+            <p:ph type="body" sz="quarter" idx="3"/>
           </p:nvPr>
         </p:nvSpPr>
         <p:spPr/>
@@ -791,8 +811,10 @@
           <a:lstStyle/>
           <a:p>
             <a:r>
+              <a:rPr lang="en-US"/>
               <a:t>Our methodology employs a comprehensive quality assessment framework with five weighted dimensions. Methodological rigor receives 30% weight, evaluating study design, sample size, statistical analysis, and bias control. Reproducibility carries 20% weight, assessing methods detail, data availability, and protocol transparency. Scientific contribution comprises 25%, examining novelty, clinical relevance, and knowledge advancement. Reporting quality accounts for 15%, evaluating adherence to PRISMA and STROBE standards. Journal standing contributes 10%, assessing reputation and editorial standards. The dataset includes 472 publications with 450 from the COVID-era, 90.9% with PubMed IDs, and 281 unique journals represented. Quality scores range from 94.75 to 100, with interpretation categories from Good through Exceptional.</a:t>
             </a:r>
+            <a:endParaRPr lang="en-US"/>
           </a:p>
         </p:txBody>
       </p:sp>
@@ -803,7 +825,7 @@
             <a:spLocks noGrp="1"/>
           </p:cNvSpPr>
           <p:nvPr>
-            <p:ph type="sldNum" idx="5" sz="quarter"/>
+            <p:ph type="sldNum" sz="quarter" idx="5"/>
           </p:nvPr>
         </p:nvSpPr>
         <p:spPr/>
@@ -817,7 +839,7 @@
 </file>
 
 <file path=ppt/notesSlides/notesSlide5.xml><?xml version="1.0" encoding="utf-8"?>
-<p:notes xmlns:a="http://schemas.openxmlformats.org/drawingml/2006/main" xmlns:p="http://schemas.openxmlformats.org/presentationml/2006/main" xmlns:r="http://schemas.openxmlformats.org/officeDocument/2006/relationships">
+<p:notes xmlns:a="http://schemas.openxmlformats.org/drawingml/2006/main" xmlns:r="http://schemas.openxmlformats.org/officeDocument/2006/relationships" xmlns:p="http://schemas.openxmlformats.org/presentationml/2006/main">
   <p:cSld>
     <p:spTree>
       <p:nvGrpSpPr>
@@ -852,7 +874,7 @@
             <a:spLocks noGrp="1"/>
           </p:cNvSpPr>
           <p:nvPr>
-            <p:ph type="body" idx="3" sz="quarter"/>
+            <p:ph type="body" sz="quarter" idx="3"/>
           </p:nvPr>
         </p:nvSpPr>
         <p:spPr/>
@@ -873,7 +895,7 @@
             <a:spLocks noGrp="1"/>
           </p:cNvSpPr>
           <p:nvPr>
-            <p:ph type="sldNum" idx="5" sz="quarter"/>
+            <p:ph type="sldNum" sz="quarter" idx="5"/>
           </p:nvPr>
         </p:nvSpPr>
         <p:spPr/>
@@ -887,7 +909,7 @@
 </file>
 
 <file path=ppt/notesSlides/notesSlide6.xml><?xml version="1.0" encoding="utf-8"?>
-<p:notes xmlns:a="http://schemas.openxmlformats.org/drawingml/2006/main" xmlns:p="http://schemas.openxmlformats.org/presentationml/2006/main" xmlns:r="http://schemas.openxmlformats.org/officeDocument/2006/relationships">
+<p:notes xmlns:a="http://schemas.openxmlformats.org/drawingml/2006/main" xmlns:r="http://schemas.openxmlformats.org/officeDocument/2006/relationships" xmlns:p="http://schemas.openxmlformats.org/presentationml/2006/main">
   <p:cSld>
     <p:spTree>
       <p:nvGrpSpPr>
@@ -922,7 +944,7 @@
             <a:spLocks noGrp="1"/>
           </p:cNvSpPr>
           <p:nvPr>
-            <p:ph type="body" idx="3" sz="quarter"/>
+            <p:ph type="body" sz="quarter" idx="3"/>
           </p:nvPr>
         </p:nvSpPr>
         <p:spPr/>
@@ -943,7 +965,7 @@
             <a:spLocks noGrp="1"/>
           </p:cNvSpPr>
           <p:nvPr>
-            <p:ph type="sldNum" idx="5" sz="quarter"/>
+            <p:ph type="sldNum" sz="quarter" idx="5"/>
           </p:nvPr>
         </p:nvSpPr>
         <p:spPr/>
@@ -957,7 +979,7 @@
 </file>
 
 <file path=ppt/notesSlides/notesSlide7.xml><?xml version="1.0" encoding="utf-8"?>
-<p:notes xmlns:a="http://schemas.openxmlformats.org/drawingml/2006/main" xmlns:p="http://schemas.openxmlformats.org/presentationml/2006/main" xmlns:r="http://schemas.openxmlformats.org/officeDocument/2006/relationships">
+<p:notes xmlns:a="http://schemas.openxmlformats.org/drawingml/2006/main" xmlns:r="http://schemas.openxmlformats.org/officeDocument/2006/relationships" xmlns:p="http://schemas.openxmlformats.org/presentationml/2006/main">
   <p:cSld>
     <p:spTree>
       <p:nvGrpSpPr>
@@ -992,7 +1014,7 @@
             <a:spLocks noGrp="1"/>
           </p:cNvSpPr>
           <p:nvPr>
-            <p:ph type="body" idx="3" sz="quarter"/>
+            <p:ph type="body" sz="quarter" idx="3"/>
           </p:nvPr>
         </p:nvSpPr>
         <p:spPr/>
@@ -1013,7 +1035,7 @@
             <a:spLocks noGrp="1"/>
           </p:cNvSpPr>
           <p:nvPr>
-            <p:ph type="sldNum" idx="5" sz="quarter"/>
+            <p:ph type="sldNum" sz="quarter" idx="5"/>
           </p:nvPr>
         </p:nvSpPr>
         <p:spPr/>
@@ -1027,7 +1049,7 @@
 </file>
 
 <file path=ppt/notesSlides/notesSlide8.xml><?xml version="1.0" encoding="utf-8"?>
-<p:notes xmlns:a="http://schemas.openxmlformats.org/drawingml/2006/main" xmlns:p="http://schemas.openxmlformats.org/presentationml/2006/main" xmlns:r="http://schemas.openxmlformats.org/officeDocument/2006/relationships">
+<p:notes xmlns:a="http://schemas.openxmlformats.org/drawingml/2006/main" xmlns:r="http://schemas.openxmlformats.org/officeDocument/2006/relationships" xmlns:p="http://schemas.openxmlformats.org/presentationml/2006/main">
   <p:cSld>
     <p:spTree>
       <p:nvGrpSpPr>
@@ -1062,7 +1084,7 @@
             <a:spLocks noGrp="1"/>
           </p:cNvSpPr>
           <p:nvPr>
-            <p:ph type="body" idx="3" sz="quarter"/>
+            <p:ph type="body" sz="quarter" idx="3"/>
           </p:nvPr>
         </p:nvSpPr>
         <p:spPr/>
@@ -1083,7 +1105,7 @@
             <a:spLocks noGrp="1"/>
           </p:cNvSpPr>
           <p:nvPr>
-            <p:ph type="sldNum" idx="5" sz="quarter"/>
+            <p:ph type="sldNum" sz="quarter" idx="5"/>
           </p:nvPr>
         </p:nvSpPr>
         <p:spPr/>
@@ -1097,7 +1119,7 @@
 </file>
 
 <file path=ppt/notesSlides/notesSlide9.xml><?xml version="1.0" encoding="utf-8"?>
-<p:notes xmlns:a="http://schemas.openxmlformats.org/drawingml/2006/main" xmlns:p="http://schemas.openxmlformats.org/presentationml/2006/main" xmlns:r="http://schemas.openxmlformats.org/officeDocument/2006/relationships">
+<p:notes xmlns:a="http://schemas.openxmlformats.org/drawingml/2006/main" xmlns:r="http://schemas.openxmlformats.org/officeDocument/2006/relationships" xmlns:p="http://schemas.openxmlformats.org/presentationml/2006/main">
   <p:cSld>
     <p:spTree>
       <p:nvGrpSpPr>
@@ -1132,7 +1154,7 @@
             <a:spLocks noGrp="1"/>
           </p:cNvSpPr>
           <p:nvPr>
-            <p:ph type="body" idx="3" sz="quarter"/>
+            <p:ph type="body" sz="quarter" idx="3"/>
           </p:nvPr>
         </p:nvSpPr>
         <p:spPr/>
@@ -1153,7 +1175,7 @@
             <a:spLocks noGrp="1"/>
           </p:cNvSpPr>
           <p:nvPr>
-            <p:ph type="sldNum" idx="5" sz="quarter"/>
+            <p:ph type="sldNum" sz="quarter" idx="5"/>
           </p:nvPr>
         </p:nvSpPr>
         <p:spPr/>
@@ -1347,7 +1369,6 @@
           <a:p>
             <a:fld id="{5BCAD085-E8A6-8845-BD4E-CB4CCA059FC4}" type="datetimeFigureOut">
               <a:rPr lang="en-US" smtClean="0"/>
-              <a:t>1/27/13</a:t>
             </a:fld>
             <a:endParaRPr lang="en-US"/>
           </a:p>
@@ -1389,18 +1410,12 @@
           <a:p>
             <a:fld id="{C1FF6DA9-008F-8B48-92A6-B652298478BF}" type="slidenum">
               <a:rPr lang="en-US" smtClean="0"/>
-              <a:t>‹#›</a:t>
             </a:fld>
             <a:endParaRPr lang="en-US"/>
           </a:p>
         </p:txBody>
       </p:sp>
     </p:spTree>
-    <p:extLst>
-      <p:ext uri="{BB962C8B-B14F-4D97-AF65-F5344CB8AC3E}">
-        <p14:creationId xmlns:p14="http://schemas.microsoft.com/office/powerpoint/2010/main" val="3168075583"/>
-      </p:ext>
-    </p:extLst>
   </p:cSld>
   <p:clrMapOvr>
     <a:masterClrMapping/>
@@ -1468,6 +1483,7 @@
               <a:rPr lang="en-US" smtClean="0"/>
               <a:t>Click to edit Master text styles</a:t>
             </a:r>
+            <a:endParaRPr lang="en-US" smtClean="0"/>
           </a:p>
           <a:p>
             <a:pPr lvl="1"/>
@@ -1475,6 +1491,7 @@
               <a:rPr lang="en-US" smtClean="0"/>
               <a:t>Second level</a:t>
             </a:r>
+            <a:endParaRPr lang="en-US" smtClean="0"/>
           </a:p>
           <a:p>
             <a:pPr lvl="2"/>
@@ -1482,6 +1499,7 @@
               <a:rPr lang="en-US" smtClean="0"/>
               <a:t>Third level</a:t>
             </a:r>
+            <a:endParaRPr lang="en-US" smtClean="0"/>
           </a:p>
           <a:p>
             <a:pPr lvl="3"/>
@@ -1489,6 +1507,7 @@
               <a:rPr lang="en-US" smtClean="0"/>
               <a:t>Fourth level</a:t>
             </a:r>
+            <a:endParaRPr lang="en-US" smtClean="0"/>
           </a:p>
           <a:p>
             <a:pPr lvl="4"/>
@@ -1517,7 +1536,6 @@
           <a:p>
             <a:fld id="{5BCAD085-E8A6-8845-BD4E-CB4CCA059FC4}" type="datetimeFigureOut">
               <a:rPr lang="en-US" smtClean="0"/>
-              <a:t>1/27/13</a:t>
             </a:fld>
             <a:endParaRPr lang="en-US"/>
           </a:p>
@@ -1559,18 +1577,12 @@
           <a:p>
             <a:fld id="{C1FF6DA9-008F-8B48-92A6-B652298478BF}" type="slidenum">
               <a:rPr lang="en-US" smtClean="0"/>
-              <a:t>‹#›</a:t>
             </a:fld>
             <a:endParaRPr lang="en-US"/>
           </a:p>
         </p:txBody>
       </p:sp>
     </p:spTree>
-    <p:extLst>
-      <p:ext uri="{BB962C8B-B14F-4D97-AF65-F5344CB8AC3E}">
-        <p14:creationId xmlns:p14="http://schemas.microsoft.com/office/powerpoint/2010/main" val="2910927964"/>
-      </p:ext>
-    </p:extLst>
   </p:cSld>
   <p:clrMapOvr>
     <a:masterClrMapping/>
@@ -1648,6 +1660,7 @@
               <a:rPr lang="en-US" smtClean="0"/>
               <a:t>Click to edit Master text styles</a:t>
             </a:r>
+            <a:endParaRPr lang="en-US" smtClean="0"/>
           </a:p>
           <a:p>
             <a:pPr lvl="1"/>
@@ -1655,6 +1668,7 @@
               <a:rPr lang="en-US" smtClean="0"/>
               <a:t>Second level</a:t>
             </a:r>
+            <a:endParaRPr lang="en-US" smtClean="0"/>
           </a:p>
           <a:p>
             <a:pPr lvl="2"/>
@@ -1662,6 +1676,7 @@
               <a:rPr lang="en-US" smtClean="0"/>
               <a:t>Third level</a:t>
             </a:r>
+            <a:endParaRPr lang="en-US" smtClean="0"/>
           </a:p>
           <a:p>
             <a:pPr lvl="3"/>
@@ -1669,6 +1684,7 @@
               <a:rPr lang="en-US" smtClean="0"/>
               <a:t>Fourth level</a:t>
             </a:r>
+            <a:endParaRPr lang="en-US" smtClean="0"/>
           </a:p>
           <a:p>
             <a:pPr lvl="4"/>
@@ -1697,7 +1713,6 @@
           <a:p>
             <a:fld id="{5BCAD085-E8A6-8845-BD4E-CB4CCA059FC4}" type="datetimeFigureOut">
               <a:rPr lang="en-US" smtClean="0"/>
-              <a:t>1/27/13</a:t>
             </a:fld>
             <a:endParaRPr lang="en-US"/>
           </a:p>
@@ -1739,18 +1754,12 @@
           <a:p>
             <a:fld id="{C1FF6DA9-008F-8B48-92A6-B652298478BF}" type="slidenum">
               <a:rPr lang="en-US" smtClean="0"/>
-              <a:t>‹#›</a:t>
             </a:fld>
             <a:endParaRPr lang="en-US"/>
           </a:p>
         </p:txBody>
       </p:sp>
     </p:spTree>
-    <p:extLst>
-      <p:ext uri="{BB962C8B-B14F-4D97-AF65-F5344CB8AC3E}">
-        <p14:creationId xmlns:p14="http://schemas.microsoft.com/office/powerpoint/2010/main" val="3612223792"/>
-      </p:ext>
-    </p:extLst>
   </p:cSld>
   <p:clrMapOvr>
     <a:masterClrMapping/>
@@ -1818,6 +1827,7 @@
               <a:rPr lang="en-US" smtClean="0"/>
               <a:t>Click to edit Master text styles</a:t>
             </a:r>
+            <a:endParaRPr lang="en-US" smtClean="0"/>
           </a:p>
           <a:p>
             <a:pPr lvl="1"/>
@@ -1825,6 +1835,7 @@
               <a:rPr lang="en-US" smtClean="0"/>
               <a:t>Second level</a:t>
             </a:r>
+            <a:endParaRPr lang="en-US" smtClean="0"/>
           </a:p>
           <a:p>
             <a:pPr lvl="2"/>
@@ -1832,6 +1843,7 @@
               <a:rPr lang="en-US" smtClean="0"/>
               <a:t>Third level</a:t>
             </a:r>
+            <a:endParaRPr lang="en-US" smtClean="0"/>
           </a:p>
           <a:p>
             <a:pPr lvl="3"/>
@@ -1839,6 +1851,7 @@
               <a:rPr lang="en-US" smtClean="0"/>
               <a:t>Fourth level</a:t>
             </a:r>
+            <a:endParaRPr lang="en-US" smtClean="0"/>
           </a:p>
           <a:p>
             <a:pPr lvl="4"/>
@@ -1867,7 +1880,6 @@
           <a:p>
             <a:fld id="{5BCAD085-E8A6-8845-BD4E-CB4CCA059FC4}" type="datetimeFigureOut">
               <a:rPr lang="en-US" smtClean="0"/>
-              <a:t>1/27/13</a:t>
             </a:fld>
             <a:endParaRPr lang="en-US"/>
           </a:p>
@@ -1909,18 +1921,12 @@
           <a:p>
             <a:fld id="{C1FF6DA9-008F-8B48-92A6-B652298478BF}" type="slidenum">
               <a:rPr lang="en-US" smtClean="0"/>
-              <a:t>‹#›</a:t>
             </a:fld>
             <a:endParaRPr lang="en-US"/>
           </a:p>
         </p:txBody>
       </p:sp>
     </p:spTree>
-    <p:extLst>
-      <p:ext uri="{BB962C8B-B14F-4D97-AF65-F5344CB8AC3E}">
-        <p14:creationId xmlns:p14="http://schemas.microsoft.com/office/powerpoint/2010/main" val="2614314258"/>
-      </p:ext>
-    </p:extLst>
   </p:cSld>
   <p:clrMapOvr>
     <a:masterClrMapping/>
@@ -2093,6 +2099,7 @@
               <a:rPr lang="en-US" smtClean="0"/>
               <a:t>Click to edit Master text styles</a:t>
             </a:r>
+            <a:endParaRPr lang="en-US" smtClean="0"/>
           </a:p>
         </p:txBody>
       </p:sp>
@@ -2113,7 +2120,6 @@
           <a:p>
             <a:fld id="{5BCAD085-E8A6-8845-BD4E-CB4CCA059FC4}" type="datetimeFigureOut">
               <a:rPr lang="en-US" smtClean="0"/>
-              <a:t>1/27/13</a:t>
             </a:fld>
             <a:endParaRPr lang="en-US"/>
           </a:p>
@@ -2155,18 +2161,12 @@
           <a:p>
             <a:fld id="{C1FF6DA9-008F-8B48-92A6-B652298478BF}" type="slidenum">
               <a:rPr lang="en-US" smtClean="0"/>
-              <a:t>‹#›</a:t>
             </a:fld>
             <a:endParaRPr lang="en-US"/>
           </a:p>
         </p:txBody>
       </p:sp>
     </p:spTree>
-    <p:extLst>
-      <p:ext uri="{BB962C8B-B14F-4D97-AF65-F5344CB8AC3E}">
-        <p14:creationId xmlns:p14="http://schemas.microsoft.com/office/powerpoint/2010/main" val="960648375"/>
-      </p:ext>
-    </p:extLst>
   </p:cSld>
   <p:clrMapOvr>
     <a:masterClrMapping/>
@@ -2267,6 +2267,7 @@
               <a:rPr lang="en-US" smtClean="0"/>
               <a:t>Click to edit Master text styles</a:t>
             </a:r>
+            <a:endParaRPr lang="en-US" smtClean="0"/>
           </a:p>
           <a:p>
             <a:pPr lvl="1"/>
@@ -2274,6 +2275,7 @@
               <a:rPr lang="en-US" smtClean="0"/>
               <a:t>Second level</a:t>
             </a:r>
+            <a:endParaRPr lang="en-US" smtClean="0"/>
           </a:p>
           <a:p>
             <a:pPr lvl="2"/>
@@ -2281,6 +2283,7 @@
               <a:rPr lang="en-US" smtClean="0"/>
               <a:t>Third level</a:t>
             </a:r>
+            <a:endParaRPr lang="en-US" smtClean="0"/>
           </a:p>
           <a:p>
             <a:pPr lvl="3"/>
@@ -2288,6 +2291,7 @@
               <a:rPr lang="en-US" smtClean="0"/>
               <a:t>Fourth level</a:t>
             </a:r>
+            <a:endParaRPr lang="en-US" smtClean="0"/>
           </a:p>
           <a:p>
             <a:pPr lvl="4"/>
@@ -2352,6 +2356,7 @@
               <a:rPr lang="en-US" smtClean="0"/>
               <a:t>Click to edit Master text styles</a:t>
             </a:r>
+            <a:endParaRPr lang="en-US" smtClean="0"/>
           </a:p>
           <a:p>
             <a:pPr lvl="1"/>
@@ -2359,6 +2364,7 @@
               <a:rPr lang="en-US" smtClean="0"/>
               <a:t>Second level</a:t>
             </a:r>
+            <a:endParaRPr lang="en-US" smtClean="0"/>
           </a:p>
           <a:p>
             <a:pPr lvl="2"/>
@@ -2366,6 +2372,7 @@
               <a:rPr lang="en-US" smtClean="0"/>
               <a:t>Third level</a:t>
             </a:r>
+            <a:endParaRPr lang="en-US" smtClean="0"/>
           </a:p>
           <a:p>
             <a:pPr lvl="3"/>
@@ -2373,6 +2380,7 @@
               <a:rPr lang="en-US" smtClean="0"/>
               <a:t>Fourth level</a:t>
             </a:r>
+            <a:endParaRPr lang="en-US" smtClean="0"/>
           </a:p>
           <a:p>
             <a:pPr lvl="4"/>
@@ -2401,7 +2409,6 @@
           <a:p>
             <a:fld id="{5BCAD085-E8A6-8845-BD4E-CB4CCA059FC4}" type="datetimeFigureOut">
               <a:rPr lang="en-US" smtClean="0"/>
-              <a:t>1/27/13</a:t>
             </a:fld>
             <a:endParaRPr lang="en-US"/>
           </a:p>
@@ -2443,18 +2450,12 @@
           <a:p>
             <a:fld id="{C1FF6DA9-008F-8B48-92A6-B652298478BF}" type="slidenum">
               <a:rPr lang="en-US" smtClean="0"/>
-              <a:t>‹#›</a:t>
             </a:fld>
             <a:endParaRPr lang="en-US"/>
           </a:p>
         </p:txBody>
       </p:sp>
     </p:spTree>
-    <p:extLst>
-      <p:ext uri="{BB962C8B-B14F-4D97-AF65-F5344CB8AC3E}">
-        <p14:creationId xmlns:p14="http://schemas.microsoft.com/office/powerpoint/2010/main" val="2782244947"/>
-      </p:ext>
-    </p:extLst>
   </p:cSld>
   <p:clrMapOvr>
     <a:masterClrMapping/>
@@ -2568,6 +2569,7 @@
               <a:rPr lang="en-US" smtClean="0"/>
               <a:t>Click to edit Master text styles</a:t>
             </a:r>
+            <a:endParaRPr lang="en-US" smtClean="0"/>
           </a:p>
         </p:txBody>
       </p:sp>
@@ -2624,6 +2626,7 @@
               <a:rPr lang="en-US" smtClean="0"/>
               <a:t>Click to edit Master text styles</a:t>
             </a:r>
+            <a:endParaRPr lang="en-US" smtClean="0"/>
           </a:p>
           <a:p>
             <a:pPr lvl="1"/>
@@ -2631,6 +2634,7 @@
               <a:rPr lang="en-US" smtClean="0"/>
               <a:t>Second level</a:t>
             </a:r>
+            <a:endParaRPr lang="en-US" smtClean="0"/>
           </a:p>
           <a:p>
             <a:pPr lvl="2"/>
@@ -2638,6 +2642,7 @@
               <a:rPr lang="en-US" smtClean="0"/>
               <a:t>Third level</a:t>
             </a:r>
+            <a:endParaRPr lang="en-US" smtClean="0"/>
           </a:p>
           <a:p>
             <a:pPr lvl="3"/>
@@ -2645,6 +2650,7 @@
               <a:rPr lang="en-US" smtClean="0"/>
               <a:t>Fourth level</a:t>
             </a:r>
+            <a:endParaRPr lang="en-US" smtClean="0"/>
           </a:p>
           <a:p>
             <a:pPr lvl="4"/>
@@ -2718,6 +2724,7 @@
               <a:rPr lang="en-US" smtClean="0"/>
               <a:t>Click to edit Master text styles</a:t>
             </a:r>
+            <a:endParaRPr lang="en-US" smtClean="0"/>
           </a:p>
         </p:txBody>
       </p:sp>
@@ -2774,6 +2781,7 @@
               <a:rPr lang="en-US" smtClean="0"/>
               <a:t>Click to edit Master text styles</a:t>
             </a:r>
+            <a:endParaRPr lang="en-US" smtClean="0"/>
           </a:p>
           <a:p>
             <a:pPr lvl="1"/>
@@ -2781,6 +2789,7 @@
               <a:rPr lang="en-US" smtClean="0"/>
               <a:t>Second level</a:t>
             </a:r>
+            <a:endParaRPr lang="en-US" smtClean="0"/>
           </a:p>
           <a:p>
             <a:pPr lvl="2"/>
@@ -2788,6 +2797,7 @@
               <a:rPr lang="en-US" smtClean="0"/>
               <a:t>Third level</a:t>
             </a:r>
+            <a:endParaRPr lang="en-US" smtClean="0"/>
           </a:p>
           <a:p>
             <a:pPr lvl="3"/>
@@ -2795,6 +2805,7 @@
               <a:rPr lang="en-US" smtClean="0"/>
               <a:t>Fourth level</a:t>
             </a:r>
+            <a:endParaRPr lang="en-US" smtClean="0"/>
           </a:p>
           <a:p>
             <a:pPr lvl="4"/>
@@ -2823,7 +2834,6 @@
           <a:p>
             <a:fld id="{5BCAD085-E8A6-8845-BD4E-CB4CCA059FC4}" type="datetimeFigureOut">
               <a:rPr lang="en-US" smtClean="0"/>
-              <a:t>1/27/13</a:t>
             </a:fld>
             <a:endParaRPr lang="en-US"/>
           </a:p>
@@ -2865,18 +2875,12 @@
           <a:p>
             <a:fld id="{C1FF6DA9-008F-8B48-92A6-B652298478BF}" type="slidenum">
               <a:rPr lang="en-US" smtClean="0"/>
-              <a:t>‹#›</a:t>
             </a:fld>
             <a:endParaRPr lang="en-US"/>
           </a:p>
         </p:txBody>
       </p:sp>
     </p:spTree>
-    <p:extLst>
-      <p:ext uri="{BB962C8B-B14F-4D97-AF65-F5344CB8AC3E}">
-        <p14:creationId xmlns:p14="http://schemas.microsoft.com/office/powerpoint/2010/main" val="990158736"/>
-      </p:ext>
-    </p:extLst>
   </p:cSld>
   <p:clrMapOvr>
     <a:masterClrMapping/>
@@ -2941,7 +2945,6 @@
           <a:p>
             <a:fld id="{5BCAD085-E8A6-8845-BD4E-CB4CCA059FC4}" type="datetimeFigureOut">
               <a:rPr lang="en-US" smtClean="0"/>
-              <a:t>1/27/13</a:t>
             </a:fld>
             <a:endParaRPr lang="en-US"/>
           </a:p>
@@ -2983,18 +2986,12 @@
           <a:p>
             <a:fld id="{C1FF6DA9-008F-8B48-92A6-B652298478BF}" type="slidenum">
               <a:rPr lang="en-US" smtClean="0"/>
-              <a:t>‹#›</a:t>
             </a:fld>
             <a:endParaRPr lang="en-US"/>
           </a:p>
         </p:txBody>
       </p:sp>
     </p:spTree>
-    <p:extLst>
-      <p:ext uri="{BB962C8B-B14F-4D97-AF65-F5344CB8AC3E}">
-        <p14:creationId xmlns:p14="http://schemas.microsoft.com/office/powerpoint/2010/main" val="727027711"/>
-      </p:ext>
-    </p:extLst>
   </p:cSld>
   <p:clrMapOvr>
     <a:masterClrMapping/>
@@ -3036,7 +3033,6 @@
           <a:p>
             <a:fld id="{5BCAD085-E8A6-8845-BD4E-CB4CCA059FC4}" type="datetimeFigureOut">
               <a:rPr lang="en-US" smtClean="0"/>
-              <a:t>1/27/13</a:t>
             </a:fld>
             <a:endParaRPr lang="en-US"/>
           </a:p>
@@ -3078,18 +3074,12 @@
           <a:p>
             <a:fld id="{C1FF6DA9-008F-8B48-92A6-B652298478BF}" type="slidenum">
               <a:rPr lang="en-US" smtClean="0"/>
-              <a:t>‹#›</a:t>
             </a:fld>
             <a:endParaRPr lang="en-US"/>
           </a:p>
         </p:txBody>
       </p:sp>
     </p:spTree>
-    <p:extLst>
-      <p:ext uri="{BB962C8B-B14F-4D97-AF65-F5344CB8AC3E}">
-        <p14:creationId xmlns:p14="http://schemas.microsoft.com/office/powerpoint/2010/main" val="1212999818"/>
-      </p:ext>
-    </p:extLst>
   </p:cSld>
   <p:clrMapOvr>
     <a:masterClrMapping/>
@@ -3199,6 +3189,7 @@
               <a:rPr lang="en-US" smtClean="0"/>
               <a:t>Click to edit Master text styles</a:t>
             </a:r>
+            <a:endParaRPr lang="en-US" smtClean="0"/>
           </a:p>
           <a:p>
             <a:pPr lvl="1"/>
@@ -3206,6 +3197,7 @@
               <a:rPr lang="en-US" smtClean="0"/>
               <a:t>Second level</a:t>
             </a:r>
+            <a:endParaRPr lang="en-US" smtClean="0"/>
           </a:p>
           <a:p>
             <a:pPr lvl="2"/>
@@ -3213,6 +3205,7 @@
               <a:rPr lang="en-US" smtClean="0"/>
               <a:t>Third level</a:t>
             </a:r>
+            <a:endParaRPr lang="en-US" smtClean="0"/>
           </a:p>
           <a:p>
             <a:pPr lvl="3"/>
@@ -3220,6 +3213,7 @@
               <a:rPr lang="en-US" smtClean="0"/>
               <a:t>Fourth level</a:t>
             </a:r>
+            <a:endParaRPr lang="en-US" smtClean="0"/>
           </a:p>
           <a:p>
             <a:pPr lvl="4"/>
@@ -3293,6 +3287,7 @@
               <a:rPr lang="en-US" smtClean="0"/>
               <a:t>Click to edit Master text styles</a:t>
             </a:r>
+            <a:endParaRPr lang="en-US" smtClean="0"/>
           </a:p>
         </p:txBody>
       </p:sp>
@@ -3313,7 +3308,6 @@
           <a:p>
             <a:fld id="{5BCAD085-E8A6-8845-BD4E-CB4CCA059FC4}" type="datetimeFigureOut">
               <a:rPr lang="en-US" smtClean="0"/>
-              <a:t>1/27/13</a:t>
             </a:fld>
             <a:endParaRPr lang="en-US"/>
           </a:p>
@@ -3355,18 +3349,12 @@
           <a:p>
             <a:fld id="{C1FF6DA9-008F-8B48-92A6-B652298478BF}" type="slidenum">
               <a:rPr lang="en-US" smtClean="0"/>
-              <a:t>‹#›</a:t>
             </a:fld>
             <a:endParaRPr lang="en-US"/>
           </a:p>
         </p:txBody>
       </p:sp>
     </p:spTree>
-    <p:extLst>
-      <p:ext uri="{BB962C8B-B14F-4D97-AF65-F5344CB8AC3E}">
-        <p14:creationId xmlns:p14="http://schemas.microsoft.com/office/powerpoint/2010/main" val="1840726560"/>
-      </p:ext>
-    </p:extLst>
   </p:cSld>
   <p:clrMapOvr>
     <a:masterClrMapping/>
@@ -3546,6 +3534,7 @@
               <a:rPr lang="en-US" smtClean="0"/>
               <a:t>Click to edit Master text styles</a:t>
             </a:r>
+            <a:endParaRPr lang="en-US" smtClean="0"/>
           </a:p>
         </p:txBody>
       </p:sp>
@@ -3566,7 +3555,6 @@
           <a:p>
             <a:fld id="{5BCAD085-E8A6-8845-BD4E-CB4CCA059FC4}" type="datetimeFigureOut">
               <a:rPr lang="en-US" smtClean="0"/>
-              <a:t>1/27/13</a:t>
             </a:fld>
             <a:endParaRPr lang="en-US"/>
           </a:p>
@@ -3608,18 +3596,12 @@
           <a:p>
             <a:fld id="{C1FF6DA9-008F-8B48-92A6-B652298478BF}" type="slidenum">
               <a:rPr lang="en-US" smtClean="0"/>
-              <a:t>‹#›</a:t>
             </a:fld>
             <a:endParaRPr lang="en-US"/>
           </a:p>
         </p:txBody>
       </p:sp>
     </p:spTree>
-    <p:extLst>
-      <p:ext uri="{BB962C8B-B14F-4D97-AF65-F5344CB8AC3E}">
-        <p14:creationId xmlns:p14="http://schemas.microsoft.com/office/powerpoint/2010/main" val="3889236939"/>
-      </p:ext>
-    </p:extLst>
   </p:cSld>
   <p:clrMapOvr>
     <a:masterClrMapping/>
@@ -3712,6 +3694,7 @@
               <a:rPr lang="en-US" smtClean="0"/>
               <a:t>Click to edit Master text styles</a:t>
             </a:r>
+            <a:endParaRPr lang="en-US" smtClean="0"/>
           </a:p>
           <a:p>
             <a:pPr lvl="1"/>
@@ -3719,6 +3702,7 @@
               <a:rPr lang="en-US" smtClean="0"/>
               <a:t>Second level</a:t>
             </a:r>
+            <a:endParaRPr lang="en-US" smtClean="0"/>
           </a:p>
           <a:p>
             <a:pPr lvl="2"/>
@@ -3726,6 +3710,7 @@
               <a:rPr lang="en-US" smtClean="0"/>
               <a:t>Third level</a:t>
             </a:r>
+            <a:endParaRPr lang="en-US" smtClean="0"/>
           </a:p>
           <a:p>
             <a:pPr lvl="3"/>
@@ -3733,6 +3718,7 @@
               <a:rPr lang="en-US" smtClean="0"/>
               <a:t>Fourth level</a:t>
             </a:r>
+            <a:endParaRPr lang="en-US" smtClean="0"/>
           </a:p>
           <a:p>
             <a:pPr lvl="4"/>
@@ -3779,7 +3765,6 @@
           <a:p>
             <a:fld id="{5BCAD085-E8A6-8845-BD4E-CB4CCA059FC4}" type="datetimeFigureOut">
               <a:rPr lang="en-US" smtClean="0"/>
-              <a:t>1/27/13</a:t>
             </a:fld>
             <a:endParaRPr lang="en-US"/>
           </a:p>
@@ -3857,18 +3842,12 @@
           <a:p>
             <a:fld id="{C1FF6DA9-008F-8B48-92A6-B652298478BF}" type="slidenum">
               <a:rPr lang="en-US" smtClean="0"/>
-              <a:t>‹#›</a:t>
             </a:fld>
             <a:endParaRPr lang="en-US"/>
           </a:p>
         </p:txBody>
       </p:sp>
     </p:spTree>
-    <p:extLst>
-      <p:ext uri="{BB962C8B-B14F-4D97-AF65-F5344CB8AC3E}">
-        <p14:creationId xmlns:p14="http://schemas.microsoft.com/office/powerpoint/2010/main" val="2209977519"/>
-      </p:ext>
-    </p:extLst>
   </p:cSld>
   <p:clrMap bg1="lt1" tx1="dk1" bg2="lt2" tx2="dk2" accent1="accent1" accent2="accent2" accent3="accent3" accent4="accent4" accent5="accent5" accent6="accent6" hlink="hlink" folHlink="folHlink"/>
   <p:sldLayoutIdLst>
@@ -3906,7 +3885,7 @@
         <a:spcBef>
           <a:spcPct val="20000"/>
         </a:spcBef>
-        <a:buFont typeface="Arial"/>
+        <a:buFont typeface="Arial" panose="020B0604020202020204"/>
         <a:buChar char="•"/>
         <a:defRPr sz="3200" kern="1200">
           <a:solidFill>
@@ -3921,7 +3900,7 @@
         <a:spcBef>
           <a:spcPct val="20000"/>
         </a:spcBef>
-        <a:buFont typeface="Arial"/>
+        <a:buFont typeface="Arial" panose="020B0604020202020204"/>
         <a:buChar char="–"/>
         <a:defRPr sz="2800" kern="1200">
           <a:solidFill>
@@ -3936,7 +3915,7 @@
         <a:spcBef>
           <a:spcPct val="20000"/>
         </a:spcBef>
-        <a:buFont typeface="Arial"/>
+        <a:buFont typeface="Arial" panose="020B0604020202020204"/>
         <a:buChar char="•"/>
         <a:defRPr sz="2400" kern="1200">
           <a:solidFill>
@@ -3951,7 +3930,7 @@
         <a:spcBef>
           <a:spcPct val="20000"/>
         </a:spcBef>
-        <a:buFont typeface="Arial"/>
+        <a:buFont typeface="Arial" panose="020B0604020202020204"/>
         <a:buChar char="–"/>
         <a:defRPr sz="2000" kern="1200">
           <a:solidFill>
@@ -3966,7 +3945,7 @@
         <a:spcBef>
           <a:spcPct val="20000"/>
         </a:spcBef>
-        <a:buFont typeface="Arial"/>
+        <a:buFont typeface="Arial" panose="020B0604020202020204"/>
         <a:buChar char="»"/>
         <a:defRPr sz="2000" kern="1200">
           <a:solidFill>
@@ -3981,7 +3960,7 @@
         <a:spcBef>
           <a:spcPct val="20000"/>
         </a:spcBef>
-        <a:buFont typeface="Arial"/>
+        <a:buFont typeface="Arial" panose="020B0604020202020204"/>
         <a:buChar char="•"/>
         <a:defRPr sz="2000" kern="1200">
           <a:solidFill>
@@ -3996,7 +3975,7 @@
         <a:spcBef>
           <a:spcPct val="20000"/>
         </a:spcBef>
-        <a:buFont typeface="Arial"/>
+        <a:buFont typeface="Arial" panose="020B0604020202020204"/>
         <a:buChar char="•"/>
         <a:defRPr sz="2000" kern="1200">
           <a:solidFill>
@@ -4011,7 +3990,7 @@
         <a:spcBef>
           <a:spcPct val="20000"/>
         </a:spcBef>
-        <a:buFont typeface="Arial"/>
+        <a:buFont typeface="Arial" panose="020B0604020202020204"/>
         <a:buChar char="•"/>
         <a:defRPr sz="2000" kern="1200">
           <a:solidFill>
@@ -4026,7 +4005,7 @@
         <a:spcBef>
           <a:spcPct val="20000"/>
         </a:spcBef>
-        <a:buFont typeface="Arial"/>
+        <a:buFont typeface="Arial" panose="020B0604020202020204"/>
         <a:buChar char="•"/>
         <a:defRPr sz="2000" kern="1200">
           <a:solidFill>
@@ -4138,7 +4117,7 @@
 </file>
 
 <file path=ppt/slides/slide1.xml><?xml version="1.0" encoding="utf-8"?>
-<p:sld xmlns:a="http://schemas.openxmlformats.org/drawingml/2006/main" xmlns:p="http://schemas.openxmlformats.org/presentationml/2006/main" xmlns:r="http://schemas.openxmlformats.org/officeDocument/2006/relationships">
+<p:sld xmlns:a="http://schemas.openxmlformats.org/drawingml/2006/main" xmlns:r="http://schemas.openxmlformats.org/officeDocument/2006/relationships" xmlns:p="http://schemas.openxmlformats.org/presentationml/2006/main">
   <p:cSld>
     <p:spTree>
       <p:nvGrpSpPr>
@@ -4147,40 +4126,16 @@
         <p:nvPr/>
       </p:nvGrpSpPr>
       <p:grpSpPr/>
-      <p:pic>
-        <p:nvPicPr>
-          <p:cNvPr id="2" name="Picture 1" descr="UCC_Logo.png"/>
-          <p:cNvPicPr>
-            <a:picLocks noChangeAspect="1"/>
-          </p:cNvPicPr>
-          <p:nvPr/>
-        </p:nvPicPr>
-        <p:blipFill>
-          <a:blip r:embed="rId2"/>
-          <a:stretch>
-            <a:fillRect/>
-          </a:stretch>
-        </p:blipFill>
-        <p:spPr>
-          <a:xfrm>
-            <a:off x="8046720" y="182880"/>
-            <a:ext cx="640784" cy="731520"/>
-          </a:xfrm>
-          <a:prstGeom prst="rect">
-            <a:avLst/>
-          </a:prstGeom>
-        </p:spPr>
-      </p:pic>
-      <p:sp>
-        <p:nvSpPr>
-          <p:cNvPr id="3" name="TextBox 2"/>
+      <p:sp>
+        <p:nvSpPr>
+          <p:cNvPr id="2" name="TextBox 1"/>
           <p:cNvSpPr txBox="1"/>
           <p:nvPr/>
         </p:nvSpPr>
         <p:spPr>
           <a:xfrm>
             <a:off x="914400" y="457200"/>
-            <a:ext cx="7315200" cy="1097280"/>
+            <a:ext cx="7315200" cy="1045210"/>
           </a:xfrm>
           <a:prstGeom prst="rect">
             <a:avLst/>
@@ -4209,7 +4164,11 @@
               <a:defRPr sz="1400"/>
             </a:pPr>
             <a:r>
-              <a:t>School of Development Studies</a:t>
+              <a:t>School of </a:t>
+            </a:r>
+            <a:r>
+              <a:rPr lang="en-US"/>
+              <a:t>Economics</a:t>
             </a:r>
           </a:p>
           <a:p>
@@ -4232,7 +4191,7 @@
       </p:sp>
       <p:sp>
         <p:nvSpPr>
-          <p:cNvPr id="4" name="TextBox 3"/>
+          <p:cNvPr id="3" name="TextBox 2"/>
           <p:cNvSpPr txBox="1"/>
           <p:nvPr/>
         </p:nvSpPr>
@@ -4267,7 +4226,7 @@
       </p:sp>
       <p:sp>
         <p:nvSpPr>
-          <p:cNvPr id="5" name="TextBox 4"/>
+          <p:cNvPr id="4" name="TextBox 3"/>
           <p:cNvSpPr txBox="1"/>
           <p:nvPr/>
         </p:nvSpPr>
@@ -4302,14 +4261,14 @@
       </p:sp>
       <p:sp>
         <p:nvSpPr>
-          <p:cNvPr id="6" name="TextBox 5"/>
+          <p:cNvPr id="5" name="TextBox 4"/>
           <p:cNvSpPr txBox="1"/>
           <p:nvPr/>
         </p:nvSpPr>
         <p:spPr>
           <a:xfrm>
             <a:off x="457200" y="3383280"/>
-            <a:ext cx="8229600" cy="548640"/>
+            <a:ext cx="8229600" cy="398780"/>
           </a:xfrm>
           <a:prstGeom prst="rect">
             <a:avLst/>
@@ -4330,14 +4289,16 @@
               </a:defRPr>
             </a:pPr>
             <a:r>
+              <a:rPr b="1"/>
               <a:t>Patterns, Quality, and Global Scientific Response (2020-2024)</a:t>
             </a:r>
-          </a:p>
-        </p:txBody>
-      </p:sp>
-      <p:sp>
-        <p:nvSpPr>
-          <p:cNvPr id="7" name="TextBox 6"/>
+            <a:endParaRPr b="1"/>
+          </a:p>
+        </p:txBody>
+      </p:sp>
+      <p:sp>
+        <p:nvSpPr>
+          <p:cNvPr id="6" name="TextBox 5"/>
           <p:cNvSpPr txBox="1"/>
           <p:nvPr/>
         </p:nvSpPr>
@@ -4392,7 +4353,7 @@
       </p:sp>
       <p:sp>
         <p:nvSpPr>
-          <p:cNvPr id="8" name="TextBox 7"/>
+          <p:cNvPr id="7" name="TextBox 6"/>
           <p:cNvSpPr txBox="1"/>
           <p:nvPr/>
         </p:nvSpPr>
@@ -4423,7 +4384,7 @@
       </p:sp>
       <p:sp>
         <p:nvSpPr>
-          <p:cNvPr id="9" name="TextBox 8"/>
+          <p:cNvPr id="8" name="TextBox 7"/>
           <p:cNvSpPr txBox="1"/>
           <p:nvPr/>
         </p:nvSpPr>
@@ -4452,6 +4413,30 @@
           </a:p>
         </p:txBody>
       </p:sp>
+      <p:pic>
+        <p:nvPicPr>
+          <p:cNvPr id="9" name="Picture 8" descr="UCC_Logo.png"/>
+          <p:cNvPicPr>
+            <a:picLocks noChangeAspect="1"/>
+          </p:cNvPicPr>
+          <p:nvPr/>
+        </p:nvPicPr>
+        <p:blipFill>
+          <a:blip r:embed="rId1"/>
+          <a:stretch>
+            <a:fillRect/>
+          </a:stretch>
+        </p:blipFill>
+        <p:spPr>
+          <a:xfrm>
+            <a:off x="8206105" y="182880"/>
+            <a:ext cx="481330" cy="549275"/>
+          </a:xfrm>
+          <a:prstGeom prst="rect">
+            <a:avLst/>
+          </a:prstGeom>
+        </p:spPr>
+      </p:pic>
     </p:spTree>
   </p:cSld>
   <p:clrMapOvr>
@@ -4461,7 +4446,7 @@
 </file>
 
 <file path=ppt/slides/slide10.xml><?xml version="1.0" encoding="utf-8"?>
-<p:sld xmlns:a="http://schemas.openxmlformats.org/drawingml/2006/main" xmlns:p="http://schemas.openxmlformats.org/presentationml/2006/main" xmlns:r="http://schemas.openxmlformats.org/officeDocument/2006/relationships">
+<p:sld xmlns:a="http://schemas.openxmlformats.org/drawingml/2006/main" xmlns:r="http://schemas.openxmlformats.org/officeDocument/2006/relationships" xmlns:p="http://schemas.openxmlformats.org/presentationml/2006/main">
   <p:cSld>
     <p:spTree>
       <p:nvGrpSpPr>
@@ -4470,33 +4455,9 @@
         <p:nvPr/>
       </p:nvGrpSpPr>
       <p:grpSpPr/>
-      <p:pic>
-        <p:nvPicPr>
-          <p:cNvPr id="2" name="Picture 1" descr="UCC_Logo.png"/>
-          <p:cNvPicPr>
-            <a:picLocks noChangeAspect="1"/>
-          </p:cNvPicPr>
-          <p:nvPr/>
-        </p:nvPicPr>
-        <p:blipFill>
-          <a:blip r:embed="rId2"/>
-          <a:stretch>
-            <a:fillRect/>
-          </a:stretch>
-        </p:blipFill>
-        <p:spPr>
-          <a:xfrm>
-            <a:off x="8046720" y="182880"/>
-            <a:ext cx="640784" cy="731520"/>
-          </a:xfrm>
-          <a:prstGeom prst="rect">
-            <a:avLst/>
-          </a:prstGeom>
-        </p:spPr>
-      </p:pic>
-      <p:sp>
-        <p:nvSpPr>
-          <p:cNvPr id="3" name="TextBox 2"/>
+      <p:sp>
+        <p:nvSpPr>
+          <p:cNvPr id="2" name="TextBox 1"/>
           <p:cNvSpPr txBox="1"/>
           <p:nvPr/>
         </p:nvSpPr>
@@ -4531,7 +4492,7 @@
       </p:sp>
       <p:sp>
         <p:nvSpPr>
-          <p:cNvPr id="4" name="TextBox 3"/>
+          <p:cNvPr id="3" name="TextBox 2"/>
           <p:cNvSpPr txBox="1"/>
           <p:nvPr/>
         </p:nvSpPr>
@@ -4566,7 +4527,7 @@
       </p:sp>
       <p:sp>
         <p:nvSpPr>
-          <p:cNvPr id="5" name="TextBox 4"/>
+          <p:cNvPr id="4" name="TextBox 3"/>
           <p:cNvSpPr txBox="1"/>
           <p:nvPr/>
         </p:nvSpPr>
@@ -4621,7 +4582,7 @@
       </p:sp>
       <p:sp>
         <p:nvSpPr>
-          <p:cNvPr id="6" name="TextBox 5"/>
+          <p:cNvPr id="5" name="TextBox 4"/>
           <p:cNvSpPr txBox="1"/>
           <p:nvPr/>
         </p:nvSpPr>
@@ -4666,6 +4627,30 @@
           </a:p>
         </p:txBody>
       </p:sp>
+      <p:pic>
+        <p:nvPicPr>
+          <p:cNvPr id="6" name="Picture 5" descr="UCC_Logo.png"/>
+          <p:cNvPicPr>
+            <a:picLocks noChangeAspect="1"/>
+          </p:cNvPicPr>
+          <p:nvPr/>
+        </p:nvPicPr>
+        <p:blipFill>
+          <a:blip r:embed="rId1"/>
+          <a:stretch>
+            <a:fillRect/>
+          </a:stretch>
+        </p:blipFill>
+        <p:spPr>
+          <a:xfrm>
+            <a:off x="8206105" y="182880"/>
+            <a:ext cx="481330" cy="549275"/>
+          </a:xfrm>
+          <a:prstGeom prst="rect">
+            <a:avLst/>
+          </a:prstGeom>
+        </p:spPr>
+      </p:pic>
     </p:spTree>
   </p:cSld>
   <p:clrMapOvr>
@@ -4675,7 +4660,7 @@
 </file>
 
 <file path=ppt/slides/slide2.xml><?xml version="1.0" encoding="utf-8"?>
-<p:sld xmlns:a="http://schemas.openxmlformats.org/drawingml/2006/main" xmlns:p="http://schemas.openxmlformats.org/presentationml/2006/main" xmlns:r="http://schemas.openxmlformats.org/officeDocument/2006/relationships">
+<p:sld xmlns:a="http://schemas.openxmlformats.org/drawingml/2006/main" xmlns:r="http://schemas.openxmlformats.org/officeDocument/2006/relationships" xmlns:p="http://schemas.openxmlformats.org/presentationml/2006/main">
   <p:cSld>
     <p:spTree>
       <p:nvGrpSpPr>
@@ -4684,33 +4669,9 @@
         <p:nvPr/>
       </p:nvGrpSpPr>
       <p:grpSpPr/>
-      <p:pic>
-        <p:nvPicPr>
-          <p:cNvPr id="2" name="Picture 1" descr="UCC_Logo.png"/>
-          <p:cNvPicPr>
-            <a:picLocks noChangeAspect="1"/>
-          </p:cNvPicPr>
-          <p:nvPr/>
-        </p:nvPicPr>
-        <p:blipFill>
-          <a:blip r:embed="rId2"/>
-          <a:stretch>
-            <a:fillRect/>
-          </a:stretch>
-        </p:blipFill>
-        <p:spPr>
-          <a:xfrm>
-            <a:off x="8046720" y="182880"/>
-            <a:ext cx="640784" cy="731520"/>
-          </a:xfrm>
-          <a:prstGeom prst="rect">
-            <a:avLst/>
-          </a:prstGeom>
-        </p:spPr>
-      </p:pic>
-      <p:sp>
-        <p:nvSpPr>
-          <p:cNvPr id="3" name="TextBox 2"/>
+      <p:sp>
+        <p:nvSpPr>
+          <p:cNvPr id="2" name="TextBox 1"/>
           <p:cNvSpPr txBox="1"/>
           <p:nvPr/>
         </p:nvSpPr>
@@ -4745,7 +4706,204 @@
       </p:sp>
       <p:sp>
         <p:nvSpPr>
-          <p:cNvPr id="4" name="TextBox 3"/>
+          <p:cNvPr id="3" name="TextBox 2"/>
+          <p:cNvSpPr txBox="1"/>
+          <p:nvPr/>
+        </p:nvSpPr>
+        <p:spPr>
+          <a:xfrm>
+            <a:off x="457200" y="767080"/>
+            <a:ext cx="8229600" cy="5303520"/>
+          </a:xfrm>
+          <a:prstGeom prst="rect">
+            <a:avLst/>
+          </a:prstGeom>
+          <a:noFill/>
+        </p:spPr>
+        <p:txBody>
+          <a:bodyPr wrap="square">
+            <a:normAutofit/>
+          </a:bodyPr>
+          <a:lstStyle/>
+          <a:p/>
+          <a:p>
+            <a:pPr>
+              <a:spcBef>
+                <a:spcPts val="600"/>
+              </a:spcBef>
+              <a:defRPr sz="1800"/>
+            </a:pPr>
+            <a:r>
+              <a:t>472 peer-reviewed publications (2020-2024)</a:t>
+            </a:r>
+          </a:p>
+          <a:p>
+            <a:pPr>
+              <a:spcBef>
+                <a:spcPts val="600"/>
+              </a:spcBef>
+              <a:defRPr sz="1800"/>
+            </a:pPr>
+            <a:r>
+              <a:t>281 unique journals - remarkable disciplinary diversity</a:t>
+            </a:r>
+          </a:p>
+          <a:p>
+            <a:pPr>
+              <a:spcBef>
+                <a:spcPts val="600"/>
+              </a:spcBef>
+              <a:defRPr sz="1800"/>
+            </a:pPr>
+            <a:r>
+              <a:t>Mean quality score: 97.52/100 (SD = 1.32)</a:t>
+            </a:r>
+          </a:p>
+          <a:p>
+            <a:pPr>
+              <a:spcBef>
+                <a:spcPts val="600"/>
+              </a:spcBef>
+              <a:defRPr sz="1800"/>
+            </a:pPr>
+          </a:p>
+          <a:p>
+            <a:pPr>
+              <a:spcBef>
+                <a:spcPts val="600"/>
+              </a:spcBef>
+              <a:defRPr sz="1800"/>
+            </a:pPr>
+            <a:r>
+              <a:t>Four Research Objectives:</a:t>
+            </a:r>
+          </a:p>
+          <a:p>
+            <a:pPr lvl="1">
+              <a:spcBef>
+                <a:spcPts val="600"/>
+              </a:spcBef>
+              <a:defRPr sz="1800"/>
+            </a:pPr>
+            <a:r>
+              <a:t>  1. Characterize temporal evolution of COVID-19 publications</a:t>
+            </a:r>
+          </a:p>
+          <a:p>
+            <a:pPr lvl="1">
+              <a:spcBef>
+                <a:spcPts val="600"/>
+              </a:spcBef>
+              <a:defRPr sz="1800"/>
+            </a:pPr>
+            <a:r>
+              <a:t>  2. Systematically assess research quality using 100-point scoring</a:t>
+            </a:r>
+          </a:p>
+          <a:p>
+            <a:pPr lvl="1">
+              <a:spcBef>
+                <a:spcPts val="600"/>
+              </a:spcBef>
+              <a:defRPr sz="1800"/>
+            </a:pPr>
+            <a:r>
+              <a:t>  3. Analyze publication patterns across journals and disciplines</a:t>
+            </a:r>
+          </a:p>
+          <a:p>
+            <a:pPr lvl="1">
+              <a:spcBef>
+                <a:spcPts val="600"/>
+              </a:spcBef>
+              <a:defRPr sz="1800"/>
+            </a:pPr>
+            <a:r>
+              <a:t>  4. Identify temporal trends in methodological sophistication</a:t>
+            </a:r>
+          </a:p>
+        </p:txBody>
+      </p:sp>
+      <p:pic>
+        <p:nvPicPr>
+          <p:cNvPr id="4" name="Picture 3" descr="UCC_Logo.png"/>
+          <p:cNvPicPr>
+            <a:picLocks noChangeAspect="1"/>
+          </p:cNvPicPr>
+          <p:nvPr/>
+        </p:nvPicPr>
+        <p:blipFill>
+          <a:blip r:embed="rId1"/>
+          <a:stretch>
+            <a:fillRect/>
+          </a:stretch>
+        </p:blipFill>
+        <p:spPr>
+          <a:xfrm>
+            <a:off x="8206105" y="182880"/>
+            <a:ext cx="481330" cy="549275"/>
+          </a:xfrm>
+          <a:prstGeom prst="rect">
+            <a:avLst/>
+          </a:prstGeom>
+        </p:spPr>
+      </p:pic>
+    </p:spTree>
+  </p:cSld>
+  <p:clrMapOvr>
+    <a:masterClrMapping/>
+  </p:clrMapOvr>
+</p:sld>
+</file>
+
+<file path=ppt/slides/slide3.xml><?xml version="1.0" encoding="utf-8"?>
+<p:sld xmlns:a="http://schemas.openxmlformats.org/drawingml/2006/main" xmlns:r="http://schemas.openxmlformats.org/officeDocument/2006/relationships" xmlns:p="http://schemas.openxmlformats.org/presentationml/2006/main">
+  <p:cSld>
+    <p:spTree>
+      <p:nvGrpSpPr>
+        <p:cNvPr id="1" name=""/>
+        <p:cNvGrpSpPr/>
+        <p:nvPr/>
+      </p:nvGrpSpPr>
+      <p:grpSpPr/>
+      <p:sp>
+        <p:nvSpPr>
+          <p:cNvPr id="2" name="TextBox 1"/>
+          <p:cNvSpPr txBox="1"/>
+          <p:nvPr/>
+        </p:nvSpPr>
+        <p:spPr>
+          <a:xfrm>
+            <a:off x="457200" y="274320"/>
+            <a:ext cx="8229600" cy="548640"/>
+          </a:xfrm>
+          <a:prstGeom prst="rect">
+            <a:avLst/>
+          </a:prstGeom>
+          <a:noFill/>
+        </p:spPr>
+        <p:txBody>
+          <a:bodyPr wrap="none">
+            <a:spAutoFit/>
+          </a:bodyPr>
+          <a:lstStyle/>
+          <a:p>
+            <a:pPr>
+              <a:defRPr sz="3200" b="1">
+                <a:solidFill>
+                  <a:srgbClr val="1E3A8A"/>
+                </a:solidFill>
+              </a:defRPr>
+            </a:pPr>
+            <a:r>
+              <a:t>Research Questions</a:t>
+            </a:r>
+          </a:p>
+        </p:txBody>
+      </p:sp>
+      <p:sp>
+        <p:nvSpPr>
+          <p:cNvPr id="3" name="TextBox 2"/>
           <p:cNvSpPr txBox="1"/>
           <p:nvPr/>
         </p:nvSpPr>
@@ -4764,16 +4922,20 @@
             <a:normAutofit/>
           </a:bodyPr>
           <a:lstStyle/>
-          <a:p/>
-          <a:p>
-            <a:pPr>
+          <a:p>
+            <a:r>
+              <a:t>1. How did publication volumes fluctuate across pandemic phases?</a:t>
+            </a:r>
+          </a:p>
+          <a:p>
+            <a:pPr lvl="1">
               <a:spcBef>
                 <a:spcPts val="600"/>
               </a:spcBef>
               <a:defRPr sz="1800"/>
             </a:pPr>
             <a:r>
-              <a:t>472 peer-reviewed publications (2020-2024)</a:t>
+              <a:t>   Temporal patterns from 2020 acute crisis → 2024 endemic transition</a:t>
             </a:r>
           </a:p>
           <a:p>
@@ -4783,9 +4945,6 @@
               </a:spcBef>
               <a:defRPr sz="1800"/>
             </a:pPr>
-            <a:r>
-              <a:t>281 unique journals - remarkable disciplinary diversity</a:t>
-            </a:r>
           </a:p>
           <a:p>
             <a:pPr>
@@ -4795,16 +4954,19 @@
               <a:defRPr sz="1800"/>
             </a:pPr>
             <a:r>
-              <a:t>Mean quality score: 97.52/100 (SD = 1.32)</a:t>
-            </a:r>
-          </a:p>
-          <a:p>
-            <a:pPr>
+              <a:t>2. Did research quality remain consistent throughout?</a:t>
+            </a:r>
+          </a:p>
+          <a:p>
+            <a:pPr lvl="1">
               <a:spcBef>
                 <a:spcPts val="600"/>
               </a:spcBef>
               <a:defRPr sz="1800"/>
             </a:pPr>
+            <a:r>
+              <a:t>   100-point multidimensional scoring system evaluation</a:t>
+            </a:r>
           </a:p>
           <a:p>
             <a:pPr>
@@ -4813,8 +4975,16 @@
               </a:spcBef>
               <a:defRPr sz="1800"/>
             </a:pPr>
-            <a:r>
-              <a:t>Four Research Objectives:</a:t>
+          </a:p>
+          <a:p>
+            <a:pPr>
+              <a:spcBef>
+                <a:spcPts val="600"/>
+              </a:spcBef>
+              <a:defRPr sz="1800"/>
+            </a:pPr>
+            <a:r>
+              <a:t>3. Which journals and disciplines led COVID-19 research?</a:t>
             </a:r>
           </a:p>
           <a:p>
@@ -4825,7 +4995,26 @@
               <a:defRPr sz="1800"/>
             </a:pPr>
             <a:r>
-              <a:t>  1. Characterize temporal evolution of COVID-19 publications</a:t>
+              <a:t>   Distribution patterns across 281 unique journals</a:t>
+            </a:r>
+          </a:p>
+          <a:p>
+            <a:pPr>
+              <a:spcBef>
+                <a:spcPts val="600"/>
+              </a:spcBef>
+              <a:defRPr sz="1800"/>
+            </a:pPr>
+          </a:p>
+          <a:p>
+            <a:pPr>
+              <a:spcBef>
+                <a:spcPts val="600"/>
+              </a:spcBef>
+              <a:defRPr sz="1800"/>
+            </a:pPr>
+            <a:r>
+              <a:t>4. What implications for future health emergencies?</a:t>
             </a:r>
           </a:p>
           <a:p>
@@ -4836,33 +5025,35 @@
               <a:defRPr sz="1800"/>
             </a:pPr>
             <a:r>
-              <a:t>  2. Systematically assess research quality using 100-point scoring</a:t>
-            </a:r>
-          </a:p>
-          <a:p>
-            <a:pPr lvl="1">
-              <a:spcBef>
-                <a:spcPts val="600"/>
-              </a:spcBef>
-              <a:defRPr sz="1800"/>
-            </a:pPr>
-            <a:r>
-              <a:t>  3. Analyze publication patterns across journals and disciplines</a:t>
-            </a:r>
-          </a:p>
-          <a:p>
-            <a:pPr lvl="1">
-              <a:spcBef>
-                <a:spcPts val="600"/>
-              </a:spcBef>
-              <a:defRPr sz="1800"/>
-            </a:pPr>
-            <a:r>
-              <a:t>  4. Identify temporal trends in methodological sophistication</a:t>
-            </a:r>
-          </a:p>
-        </p:txBody>
-      </p:sp>
+              <a:t>   Evidence-based insights for policy and funding allocation</a:t>
+            </a:r>
+          </a:p>
+        </p:txBody>
+      </p:sp>
+      <p:pic>
+        <p:nvPicPr>
+          <p:cNvPr id="4" name="Picture 3" descr="UCC_Logo.png"/>
+          <p:cNvPicPr>
+            <a:picLocks noChangeAspect="1"/>
+          </p:cNvPicPr>
+          <p:nvPr/>
+        </p:nvPicPr>
+        <p:blipFill>
+          <a:blip r:embed="rId1"/>
+          <a:stretch>
+            <a:fillRect/>
+          </a:stretch>
+        </p:blipFill>
+        <p:spPr>
+          <a:xfrm>
+            <a:off x="8206105" y="182880"/>
+            <a:ext cx="481330" cy="549275"/>
+          </a:xfrm>
+          <a:prstGeom prst="rect">
+            <a:avLst/>
+          </a:prstGeom>
+        </p:spPr>
+      </p:pic>
     </p:spTree>
   </p:cSld>
   <p:clrMapOvr>
@@ -4871,8 +5062,8 @@
 </p:sld>
 </file>
 
-<file path=ppt/slides/slide3.xml><?xml version="1.0" encoding="utf-8"?>
-<p:sld xmlns:a="http://schemas.openxmlformats.org/drawingml/2006/main" xmlns:p="http://schemas.openxmlformats.org/presentationml/2006/main" xmlns:r="http://schemas.openxmlformats.org/officeDocument/2006/relationships">
+<file path=ppt/slides/slide4.xml><?xml version="1.0" encoding="utf-8"?>
+<p:sld xmlns:a="http://schemas.openxmlformats.org/drawingml/2006/main" xmlns:r="http://schemas.openxmlformats.org/officeDocument/2006/relationships" xmlns:p="http://schemas.openxmlformats.org/presentationml/2006/main">
   <p:cSld>
     <p:spTree>
       <p:nvGrpSpPr>
@@ -4881,33 +5072,9 @@
         <p:nvPr/>
       </p:nvGrpSpPr>
       <p:grpSpPr/>
-      <p:pic>
-        <p:nvPicPr>
-          <p:cNvPr id="2" name="Picture 1" descr="UCC_Logo.png"/>
-          <p:cNvPicPr>
-            <a:picLocks noChangeAspect="1"/>
-          </p:cNvPicPr>
-          <p:nvPr/>
-        </p:nvPicPr>
-        <p:blipFill>
-          <a:blip r:embed="rId2"/>
-          <a:stretch>
-            <a:fillRect/>
-          </a:stretch>
-        </p:blipFill>
-        <p:spPr>
-          <a:xfrm>
-            <a:off x="8046720" y="182880"/>
-            <a:ext cx="640784" cy="731520"/>
-          </a:xfrm>
-          <a:prstGeom prst="rect">
-            <a:avLst/>
-          </a:prstGeom>
-        </p:spPr>
-      </p:pic>
-      <p:sp>
-        <p:nvSpPr>
-          <p:cNvPr id="3" name="TextBox 2"/>
+      <p:sp>
+        <p:nvSpPr>
+          <p:cNvPr id="2" name="TextBox 1"/>
           <p:cNvSpPr txBox="1"/>
           <p:nvPr/>
         </p:nvSpPr>
@@ -4935,21 +5102,21 @@
               </a:defRPr>
             </a:pPr>
             <a:r>
-              <a:t>Research Questions</a:t>
-            </a:r>
-          </a:p>
-        </p:txBody>
-      </p:sp>
-      <p:sp>
-        <p:nvSpPr>
-          <p:cNvPr id="4" name="TextBox 3"/>
+              <a:t>Methodology</a:t>
+            </a:r>
+          </a:p>
+        </p:txBody>
+      </p:sp>
+      <p:sp>
+        <p:nvSpPr>
+          <p:cNvPr id="3" name="TextBox 2"/>
           <p:cNvSpPr txBox="1"/>
           <p:nvPr/>
         </p:nvSpPr>
         <p:spPr>
           <a:xfrm>
             <a:off x="457200" y="1097280"/>
-            <a:ext cx="8229600" cy="5303520"/>
+            <a:ext cx="4114800" cy="5303520"/>
           </a:xfrm>
           <a:prstGeom prst="rect">
             <a:avLst/>
@@ -4965,117 +5132,331 @@
           <a:p>
             <a:pPr>
               <a:spcBef>
-                <a:spcPts val="600"/>
-              </a:spcBef>
-              <a:defRPr sz="1800"/>
-            </a:pPr>
-            <a:r>
-              <a:t>1. How did publication volumes fluctuate across pandemic phases?</a:t>
-            </a:r>
-          </a:p>
-          <a:p>
-            <a:pPr lvl="1">
-              <a:spcBef>
-                <a:spcPts val="600"/>
-              </a:spcBef>
-              <a:defRPr sz="1800"/>
-            </a:pPr>
-            <a:r>
-              <a:t>   Temporal patterns from 2020 acute crisis → 2024 endemic transition</a:t>
-            </a:r>
-          </a:p>
-          <a:p>
-            <a:pPr>
-              <a:spcBef>
-                <a:spcPts val="600"/>
-              </a:spcBef>
-              <a:defRPr sz="1800"/>
-            </a:pPr>
-          </a:p>
-          <a:p>
-            <a:pPr>
-              <a:spcBef>
-                <a:spcPts val="600"/>
-              </a:spcBef>
-              <a:defRPr sz="1800"/>
-            </a:pPr>
-            <a:r>
-              <a:t>2. Did research quality remain consistent throughout?</a:t>
-            </a:r>
-          </a:p>
-          <a:p>
-            <a:pPr lvl="1">
-              <a:spcBef>
-                <a:spcPts val="600"/>
-              </a:spcBef>
-              <a:defRPr sz="1800"/>
-            </a:pPr>
-            <a:r>
-              <a:t>   100-point multidimensional scoring system evaluation</a:t>
-            </a:r>
-          </a:p>
-          <a:p>
-            <a:pPr>
-              <a:spcBef>
-                <a:spcPts val="600"/>
-              </a:spcBef>
-              <a:defRPr sz="1800"/>
-            </a:pPr>
-          </a:p>
-          <a:p>
-            <a:pPr>
-              <a:spcBef>
-                <a:spcPts val="600"/>
-              </a:spcBef>
-              <a:defRPr sz="1800"/>
-            </a:pPr>
-            <a:r>
-              <a:t>3. Which journals and disciplines led COVID-19 research?</a:t>
-            </a:r>
-          </a:p>
-          <a:p>
-            <a:pPr lvl="1">
-              <a:spcBef>
-                <a:spcPts val="600"/>
-              </a:spcBef>
-              <a:defRPr sz="1800"/>
-            </a:pPr>
-            <a:r>
-              <a:t>   Distribution patterns across 281 unique journals</a:t>
-            </a:r>
-          </a:p>
-          <a:p>
-            <a:pPr>
-              <a:spcBef>
-                <a:spcPts val="600"/>
-              </a:spcBef>
-              <a:defRPr sz="1800"/>
-            </a:pPr>
-          </a:p>
-          <a:p>
-            <a:pPr>
-              <a:spcBef>
-                <a:spcPts val="600"/>
-              </a:spcBef>
-              <a:defRPr sz="1800"/>
-            </a:pPr>
-            <a:r>
-              <a:t>4. What implications for future health emergencies?</a:t>
-            </a:r>
-          </a:p>
-          <a:p>
-            <a:pPr lvl="1">
-              <a:spcBef>
-                <a:spcPts val="600"/>
-              </a:spcBef>
-              <a:defRPr sz="1800"/>
-            </a:pPr>
-            <a:r>
-              <a:t>   Evidence-based insights for policy and funding allocation</a:t>
-            </a:r>
-          </a:p>
-        </p:txBody>
-      </p:sp>
+                <a:spcPts val="400"/>
+              </a:spcBef>
+              <a:defRPr sz="1600"/>
+            </a:pPr>
+            <a:r>
+              <a:t>Quality Assessment Framework:</a:t>
+            </a:r>
+          </a:p>
+          <a:p>
+            <a:pPr>
+              <a:spcBef>
+                <a:spcPts val="400"/>
+              </a:spcBef>
+              <a:defRPr sz="1600"/>
+            </a:pPr>
+          </a:p>
+          <a:p>
+            <a:pPr>
+              <a:spcBef>
+                <a:spcPts val="400"/>
+              </a:spcBef>
+              <a:defRPr sz="1600"/>
+            </a:pPr>
+            <a:r>
+              <a:t>• Methodological Rigor (</a:t>
+            </a:r>
+            <a:r>
+              <a:rPr b="1"/>
+              <a:t>30%</a:t>
+            </a:r>
+            <a:r>
+              <a:t>)</a:t>
+            </a:r>
+          </a:p>
+          <a:p>
+            <a:pPr>
+              <a:spcBef>
+                <a:spcPts val="400"/>
+              </a:spcBef>
+              <a:defRPr sz="1600"/>
+            </a:pPr>
+            <a:r>
+              <a:t>• Reproducibility (</a:t>
+            </a:r>
+            <a:r>
+              <a:rPr b="1"/>
+              <a:t>20%</a:t>
+            </a:r>
+            <a:r>
+              <a:t>)</a:t>
+            </a:r>
+          </a:p>
+          <a:p>
+            <a:pPr>
+              <a:spcBef>
+                <a:spcPts val="400"/>
+              </a:spcBef>
+              <a:defRPr sz="1600"/>
+            </a:pPr>
+            <a:r>
+              <a:t>• Scientific Contribution (</a:t>
+            </a:r>
+            <a:r>
+              <a:rPr b="1"/>
+              <a:t>25%</a:t>
+            </a:r>
+            <a:r>
+              <a:t>)</a:t>
+            </a:r>
+          </a:p>
+          <a:p>
+            <a:pPr>
+              <a:spcBef>
+                <a:spcPts val="400"/>
+              </a:spcBef>
+              <a:defRPr sz="1600"/>
+            </a:pPr>
+            <a:r>
+              <a:t>• Reporting Quality (</a:t>
+            </a:r>
+            <a:r>
+              <a:rPr b="1"/>
+              <a:t>15%</a:t>
+            </a:r>
+            <a:r>
+              <a:t>)</a:t>
+            </a:r>
+          </a:p>
+          <a:p>
+            <a:pPr>
+              <a:spcBef>
+                <a:spcPts val="400"/>
+              </a:spcBef>
+              <a:defRPr sz="1600"/>
+            </a:pPr>
+            <a:r>
+              <a:t>• Journal Standing (</a:t>
+            </a:r>
+            <a:r>
+              <a:rPr b="1"/>
+              <a:t>10%</a:t>
+            </a:r>
+            <a:r>
+              <a:t>)</a:t>
+            </a:r>
+          </a:p>
+          <a:p>
+            <a:pPr>
+              <a:spcBef>
+                <a:spcPts val="400"/>
+              </a:spcBef>
+              <a:defRPr sz="1600"/>
+            </a:pPr>
+          </a:p>
+          <a:p>
+            <a:pPr>
+              <a:spcBef>
+                <a:spcPts val="400"/>
+              </a:spcBef>
+              <a:defRPr sz="1600"/>
+            </a:pPr>
+            <a:r>
+              <a:t>100-point scoring system</a:t>
+            </a:r>
+          </a:p>
+          <a:p>
+            <a:pPr>
+              <a:spcBef>
+                <a:spcPts val="400"/>
+              </a:spcBef>
+              <a:defRPr sz="1600"/>
+            </a:pPr>
+            <a:r>
+              <a:t>Categories: Exceptional, Excellent,</a:t>
+            </a:r>
+          </a:p>
+          <a:p>
+            <a:pPr>
+              <a:spcBef>
+                <a:spcPts val="400"/>
+              </a:spcBef>
+              <a:defRPr sz="1600"/>
+            </a:pPr>
+            <a:r>
+              <a:t>Very Good, Good</a:t>
+            </a:r>
+          </a:p>
+        </p:txBody>
+      </p:sp>
+      <p:sp>
+        <p:nvSpPr>
+          <p:cNvPr id="4" name="TextBox 3"/>
+          <p:cNvSpPr txBox="1"/>
+          <p:nvPr/>
+        </p:nvSpPr>
+        <p:spPr>
+          <a:xfrm>
+            <a:off x="4754880" y="1097280"/>
+            <a:ext cx="3931920" cy="5303520"/>
+          </a:xfrm>
+          <a:prstGeom prst="rect">
+            <a:avLst/>
+          </a:prstGeom>
+          <a:noFill/>
+        </p:spPr>
+        <p:txBody>
+          <a:bodyPr wrap="square">
+            <a:normAutofit/>
+          </a:bodyPr>
+          <a:lstStyle/>
+          <a:p/>
+          <a:p>
+            <a:pPr>
+              <a:spcBef>
+                <a:spcPts val="400"/>
+              </a:spcBef>
+              <a:defRPr sz="1600"/>
+            </a:pPr>
+            <a:r>
+              <a:t>Dataset Characteristics:</a:t>
+            </a:r>
+          </a:p>
+          <a:p>
+            <a:pPr>
+              <a:spcBef>
+                <a:spcPts val="400"/>
+              </a:spcBef>
+              <a:defRPr sz="1600"/>
+            </a:pPr>
+          </a:p>
+          <a:p>
+            <a:pPr>
+              <a:spcBef>
+                <a:spcPts val="400"/>
+              </a:spcBef>
+              <a:defRPr sz="1600"/>
+            </a:pPr>
+            <a:r>
+              <a:t>• Total Publications: 472</a:t>
+            </a:r>
+          </a:p>
+          <a:p>
+            <a:pPr>
+              <a:spcBef>
+                <a:spcPts val="400"/>
+              </a:spcBef>
+              <a:defRPr sz="1600"/>
+            </a:pPr>
+            <a:r>
+              <a:t>• COVID-era: 450 (95.3%)</a:t>
+            </a:r>
+          </a:p>
+          <a:p>
+            <a:pPr>
+              <a:spcBef>
+                <a:spcPts val="400"/>
+              </a:spcBef>
+              <a:defRPr sz="1600"/>
+            </a:pPr>
+            <a:r>
+              <a:t>• PubMed IDs: 429 (90.9%)</a:t>
+            </a:r>
+          </a:p>
+          <a:p>
+            <a:pPr>
+              <a:spcBef>
+                <a:spcPts val="400"/>
+              </a:spcBef>
+              <a:defRPr sz="1600"/>
+            </a:pPr>
+            <a:r>
+              <a:t>• DOIs: 157 (33.3%)</a:t>
+            </a:r>
+          </a:p>
+          <a:p>
+            <a:pPr>
+              <a:spcBef>
+                <a:spcPts val="400"/>
+              </a:spcBef>
+              <a:defRPr sz="1600"/>
+            </a:pPr>
+            <a:r>
+              <a:t>• With Abstracts: 322 (68.2%)</a:t>
+            </a:r>
+          </a:p>
+          <a:p>
+            <a:pPr>
+              <a:spcBef>
+                <a:spcPts val="400"/>
+              </a:spcBef>
+              <a:defRPr sz="1600"/>
+            </a:pPr>
+            <a:r>
+              <a:t>• Unique Journals: 281</a:t>
+            </a:r>
+          </a:p>
+          <a:p>
+            <a:pPr>
+              <a:spcBef>
+                <a:spcPts val="400"/>
+              </a:spcBef>
+              <a:defRPr sz="1600"/>
+            </a:pPr>
+            <a:r>
+              <a:t>• Author Groups: 351</a:t>
+            </a:r>
+          </a:p>
+          <a:p>
+            <a:pPr>
+              <a:spcBef>
+                <a:spcPts val="400"/>
+              </a:spcBef>
+              <a:defRPr sz="1600"/>
+            </a:pPr>
+          </a:p>
+          <a:p>
+            <a:pPr>
+              <a:spcBef>
+                <a:spcPts val="400"/>
+              </a:spcBef>
+              <a:defRPr sz="1600"/>
+            </a:pPr>
+            <a:r>
+              <a:t>Quality Score Range:</a:t>
+            </a:r>
+          </a:p>
+          <a:p>
+            <a:pPr>
+              <a:spcBef>
+                <a:spcPts val="400"/>
+              </a:spcBef>
+              <a:defRPr sz="1600"/>
+            </a:pPr>
+            <a:r>
+              <a:rPr b="1"/>
+              <a:t>94.75 - 100.0</a:t>
+            </a:r>
+            <a:endParaRPr b="1"/>
+          </a:p>
+        </p:txBody>
+      </p:sp>
+      <p:pic>
+        <p:nvPicPr>
+          <p:cNvPr id="5" name="Picture 4" descr="UCC_Logo.png"/>
+          <p:cNvPicPr>
+            <a:picLocks noChangeAspect="1"/>
+          </p:cNvPicPr>
+          <p:nvPr/>
+        </p:nvPicPr>
+        <p:blipFill>
+          <a:blip r:embed="rId1"/>
+          <a:stretch>
+            <a:fillRect/>
+          </a:stretch>
+        </p:blipFill>
+        <p:spPr>
+          <a:xfrm>
+            <a:off x="8206105" y="182880"/>
+            <a:ext cx="481330" cy="549275"/>
+          </a:xfrm>
+          <a:prstGeom prst="rect">
+            <a:avLst/>
+          </a:prstGeom>
+        </p:spPr>
+      </p:pic>
     </p:spTree>
   </p:cSld>
   <p:clrMapOvr>
@@ -5084,8 +5465,8 @@
 </p:sld>
 </file>
 
-<file path=ppt/slides/slide4.xml><?xml version="1.0" encoding="utf-8"?>
-<p:sld xmlns:a="http://schemas.openxmlformats.org/drawingml/2006/main" xmlns:p="http://schemas.openxmlformats.org/presentationml/2006/main" xmlns:r="http://schemas.openxmlformats.org/officeDocument/2006/relationships">
+<file path=ppt/slides/slide5.xml><?xml version="1.0" encoding="utf-8"?>
+<p:sld xmlns:a="http://schemas.openxmlformats.org/drawingml/2006/main" xmlns:r="http://schemas.openxmlformats.org/officeDocument/2006/relationships" xmlns:p="http://schemas.openxmlformats.org/presentationml/2006/main">
   <p:cSld>
     <p:spTree>
       <p:nvGrpSpPr>
@@ -5094,33 +5475,9 @@
         <p:nvPr/>
       </p:nvGrpSpPr>
       <p:grpSpPr/>
-      <p:pic>
-        <p:nvPicPr>
-          <p:cNvPr id="2" name="Picture 1" descr="UCC_Logo.png"/>
-          <p:cNvPicPr>
-            <a:picLocks noChangeAspect="1"/>
-          </p:cNvPicPr>
-          <p:nvPr/>
-        </p:nvPicPr>
-        <p:blipFill>
-          <a:blip r:embed="rId2"/>
-          <a:stretch>
-            <a:fillRect/>
-          </a:stretch>
-        </p:blipFill>
-        <p:spPr>
-          <a:xfrm>
-            <a:off x="8046720" y="182880"/>
-            <a:ext cx="640784" cy="731520"/>
-          </a:xfrm>
-          <a:prstGeom prst="rect">
-            <a:avLst/>
-          </a:prstGeom>
-        </p:spPr>
-      </p:pic>
-      <p:sp>
-        <p:nvSpPr>
-          <p:cNvPr id="3" name="TextBox 2"/>
+      <p:sp>
+        <p:nvSpPr>
+          <p:cNvPr id="2" name="TextBox 1"/>
           <p:cNvSpPr txBox="1"/>
           <p:nvPr/>
         </p:nvSpPr>
@@ -5148,387 +5505,21 @@
               </a:defRPr>
             </a:pPr>
             <a:r>
-              <a:t>Methodology</a:t>
-            </a:r>
-          </a:p>
-        </p:txBody>
-      </p:sp>
-      <p:sp>
-        <p:nvSpPr>
-          <p:cNvPr id="4" name="TextBox 3"/>
-          <p:cNvSpPr txBox="1"/>
-          <p:nvPr/>
-        </p:nvSpPr>
-        <p:spPr>
-          <a:xfrm>
-            <a:off x="457200" y="1097280"/>
-            <a:ext cx="4114800" cy="5303520"/>
-          </a:xfrm>
-          <a:prstGeom prst="rect">
-            <a:avLst/>
-          </a:prstGeom>
-          <a:noFill/>
-        </p:spPr>
-        <p:txBody>
-          <a:bodyPr wrap="square">
-            <a:normAutofit/>
-          </a:bodyPr>
-          <a:lstStyle/>
-          <a:p/>
-          <a:p>
-            <a:pPr>
-              <a:spcBef>
-                <a:spcPts val="400"/>
-              </a:spcBef>
-              <a:defRPr sz="1600"/>
-            </a:pPr>
-            <a:r>
-              <a:t>Quality Assessment Framework:</a:t>
-            </a:r>
-          </a:p>
-          <a:p>
-            <a:pPr>
-              <a:spcBef>
-                <a:spcPts val="400"/>
-              </a:spcBef>
-              <a:defRPr sz="1600"/>
-            </a:pPr>
-          </a:p>
-          <a:p>
-            <a:pPr>
-              <a:spcBef>
-                <a:spcPts val="400"/>
-              </a:spcBef>
-              <a:defRPr sz="1600"/>
-            </a:pPr>
-            <a:r>
-              <a:t>• Methodological Rigor (30%)</a:t>
-            </a:r>
-          </a:p>
-          <a:p>
-            <a:pPr>
-              <a:spcBef>
-                <a:spcPts val="400"/>
-              </a:spcBef>
-              <a:defRPr sz="1600"/>
-            </a:pPr>
-            <a:r>
-              <a:t>• Reproducibility (20%)</a:t>
-            </a:r>
-          </a:p>
-          <a:p>
-            <a:pPr>
-              <a:spcBef>
-                <a:spcPts val="400"/>
-              </a:spcBef>
-              <a:defRPr sz="1600"/>
-            </a:pPr>
-            <a:r>
-              <a:t>• Scientific Contribution (25%)</a:t>
-            </a:r>
-          </a:p>
-          <a:p>
-            <a:pPr>
-              <a:spcBef>
-                <a:spcPts val="400"/>
-              </a:spcBef>
-              <a:defRPr sz="1600"/>
-            </a:pPr>
-            <a:r>
-              <a:t>• Reporting Quality (15%)</a:t>
-            </a:r>
-          </a:p>
-          <a:p>
-            <a:pPr>
-              <a:spcBef>
-                <a:spcPts val="400"/>
-              </a:spcBef>
-              <a:defRPr sz="1600"/>
-            </a:pPr>
-            <a:r>
-              <a:t>• Journal Standing (10%)</a:t>
-            </a:r>
-          </a:p>
-          <a:p>
-            <a:pPr>
-              <a:spcBef>
-                <a:spcPts val="400"/>
-              </a:spcBef>
-              <a:defRPr sz="1600"/>
-            </a:pPr>
-          </a:p>
-          <a:p>
-            <a:pPr>
-              <a:spcBef>
-                <a:spcPts val="400"/>
-              </a:spcBef>
-              <a:defRPr sz="1600"/>
-            </a:pPr>
-            <a:r>
-              <a:t>100-point scoring system</a:t>
-            </a:r>
-          </a:p>
-          <a:p>
-            <a:pPr>
-              <a:spcBef>
-                <a:spcPts val="400"/>
-              </a:spcBef>
-              <a:defRPr sz="1600"/>
-            </a:pPr>
-            <a:r>
-              <a:t>Categories: Exceptional, Excellent,</a:t>
-            </a:r>
-          </a:p>
-          <a:p>
-            <a:pPr>
-              <a:spcBef>
-                <a:spcPts val="400"/>
-              </a:spcBef>
-              <a:defRPr sz="1600"/>
-            </a:pPr>
-            <a:r>
-              <a:t>Very Good, Good</a:t>
-            </a:r>
-          </a:p>
-        </p:txBody>
-      </p:sp>
-      <p:sp>
-        <p:nvSpPr>
-          <p:cNvPr id="5" name="TextBox 4"/>
-          <p:cNvSpPr txBox="1"/>
-          <p:nvPr/>
-        </p:nvSpPr>
-        <p:spPr>
-          <a:xfrm>
-            <a:off x="4754880" y="1097280"/>
-            <a:ext cx="3931920" cy="5303520"/>
-          </a:xfrm>
-          <a:prstGeom prst="rect">
-            <a:avLst/>
-          </a:prstGeom>
-          <a:noFill/>
-        </p:spPr>
-        <p:txBody>
-          <a:bodyPr wrap="square">
-            <a:normAutofit/>
-          </a:bodyPr>
-          <a:lstStyle/>
-          <a:p/>
-          <a:p>
-            <a:pPr>
-              <a:spcBef>
-                <a:spcPts val="400"/>
-              </a:spcBef>
-              <a:defRPr sz="1600"/>
-            </a:pPr>
-            <a:r>
-              <a:t>Dataset Characteristics:</a:t>
-            </a:r>
-          </a:p>
-          <a:p>
-            <a:pPr>
-              <a:spcBef>
-                <a:spcPts val="400"/>
-              </a:spcBef>
-              <a:defRPr sz="1600"/>
-            </a:pPr>
-          </a:p>
-          <a:p>
-            <a:pPr>
-              <a:spcBef>
-                <a:spcPts val="400"/>
-              </a:spcBef>
-              <a:defRPr sz="1600"/>
-            </a:pPr>
-            <a:r>
-              <a:t>• Total Publications: 472</a:t>
-            </a:r>
-          </a:p>
-          <a:p>
-            <a:pPr>
-              <a:spcBef>
-                <a:spcPts val="400"/>
-              </a:spcBef>
-              <a:defRPr sz="1600"/>
-            </a:pPr>
-            <a:r>
-              <a:t>• COVID-era: 450 (95.3%)</a:t>
-            </a:r>
-          </a:p>
-          <a:p>
-            <a:pPr>
-              <a:spcBef>
-                <a:spcPts val="400"/>
-              </a:spcBef>
-              <a:defRPr sz="1600"/>
-            </a:pPr>
-            <a:r>
-              <a:t>• PubMed IDs: 429 (90.9%)</a:t>
-            </a:r>
-          </a:p>
-          <a:p>
-            <a:pPr>
-              <a:spcBef>
-                <a:spcPts val="400"/>
-              </a:spcBef>
-              <a:defRPr sz="1600"/>
-            </a:pPr>
-            <a:r>
-              <a:t>• DOIs: 157 (33.3%)</a:t>
-            </a:r>
-          </a:p>
-          <a:p>
-            <a:pPr>
-              <a:spcBef>
-                <a:spcPts val="400"/>
-              </a:spcBef>
-              <a:defRPr sz="1600"/>
-            </a:pPr>
-            <a:r>
-              <a:t>• With Abstracts: 322 (68.2%)</a:t>
-            </a:r>
-          </a:p>
-          <a:p>
-            <a:pPr>
-              <a:spcBef>
-                <a:spcPts val="400"/>
-              </a:spcBef>
-              <a:defRPr sz="1600"/>
-            </a:pPr>
-            <a:r>
-              <a:t>• Unique Journals: 281</a:t>
-            </a:r>
-          </a:p>
-          <a:p>
-            <a:pPr>
-              <a:spcBef>
-                <a:spcPts val="400"/>
-              </a:spcBef>
-              <a:defRPr sz="1600"/>
-            </a:pPr>
-            <a:r>
-              <a:t>• Author Groups: 351</a:t>
-            </a:r>
-          </a:p>
-          <a:p>
-            <a:pPr>
-              <a:spcBef>
-                <a:spcPts val="400"/>
-              </a:spcBef>
-              <a:defRPr sz="1600"/>
-            </a:pPr>
-          </a:p>
-          <a:p>
-            <a:pPr>
-              <a:spcBef>
-                <a:spcPts val="400"/>
-              </a:spcBef>
-              <a:defRPr sz="1600"/>
-            </a:pPr>
-            <a:r>
-              <a:t>Quality Score Range:</a:t>
-            </a:r>
-          </a:p>
-          <a:p>
-            <a:pPr>
-              <a:spcBef>
-                <a:spcPts val="400"/>
-              </a:spcBef>
-              <a:defRPr sz="1600"/>
-            </a:pPr>
-            <a:r>
-              <a:t>94.75 - 100.0</a:t>
-            </a:r>
-          </a:p>
-        </p:txBody>
-      </p:sp>
-    </p:spTree>
-  </p:cSld>
-  <p:clrMapOvr>
-    <a:masterClrMapping/>
-  </p:clrMapOvr>
-</p:sld>
-</file>
-
-<file path=ppt/slides/slide5.xml><?xml version="1.0" encoding="utf-8"?>
-<p:sld xmlns:a="http://schemas.openxmlformats.org/drawingml/2006/main" xmlns:p="http://schemas.openxmlformats.org/presentationml/2006/main" xmlns:r="http://schemas.openxmlformats.org/officeDocument/2006/relationships">
-  <p:cSld>
-    <p:spTree>
-      <p:nvGrpSpPr>
-        <p:cNvPr id="1" name=""/>
-        <p:cNvGrpSpPr/>
-        <p:nvPr/>
-      </p:nvGrpSpPr>
-      <p:grpSpPr/>
+              <a:t>Quality Assessment Results</a:t>
+            </a:r>
+          </a:p>
+        </p:txBody>
+      </p:sp>
       <p:pic>
         <p:nvPicPr>
-          <p:cNvPr id="2" name="Picture 1" descr="UCC_Logo.png"/>
+          <p:cNvPr id="3" name="Picture 2" descr="image.png"/>
           <p:cNvPicPr>
             <a:picLocks noChangeAspect="1"/>
           </p:cNvPicPr>
           <p:nvPr/>
         </p:nvPicPr>
         <p:blipFill>
-          <a:blip r:embed="rId2"/>
-          <a:stretch>
-            <a:fillRect/>
-          </a:stretch>
-        </p:blipFill>
-        <p:spPr>
-          <a:xfrm>
-            <a:off x="8046720" y="182880"/>
-            <a:ext cx="640784" cy="731520"/>
-          </a:xfrm>
-          <a:prstGeom prst="rect">
-            <a:avLst/>
-          </a:prstGeom>
-        </p:spPr>
-      </p:pic>
-      <p:sp>
-        <p:nvSpPr>
-          <p:cNvPr id="3" name="TextBox 2"/>
-          <p:cNvSpPr txBox="1"/>
-          <p:nvPr/>
-        </p:nvSpPr>
-        <p:spPr>
-          <a:xfrm>
-            <a:off x="457200" y="274320"/>
-            <a:ext cx="8229600" cy="548640"/>
-          </a:xfrm>
-          <a:prstGeom prst="rect">
-            <a:avLst/>
-          </a:prstGeom>
-          <a:noFill/>
-        </p:spPr>
-        <p:txBody>
-          <a:bodyPr wrap="none">
-            <a:spAutoFit/>
-          </a:bodyPr>
-          <a:lstStyle/>
-          <a:p>
-            <a:pPr>
-              <a:defRPr sz="3200" b="1">
-                <a:solidFill>
-                  <a:srgbClr val="1E3A8A"/>
-                </a:solidFill>
-              </a:defRPr>
-            </a:pPr>
-            <a:r>
-              <a:t>Quality Assessment Results</a:t>
-            </a:r>
-          </a:p>
-        </p:txBody>
-      </p:sp>
-      <p:pic>
-        <p:nvPicPr>
-          <p:cNvPr id="4" name="Picture 3" descr="image.png"/>
-          <p:cNvPicPr>
-            <a:picLocks noChangeAspect="1"/>
-          </p:cNvPicPr>
-          <p:nvPr/>
-        </p:nvPicPr>
-        <p:blipFill>
-          <a:blip r:embed="rId3"/>
+          <a:blip r:embed="rId1"/>
           <a:stretch>
             <a:fillRect/>
           </a:stretch>
@@ -5545,14 +5536,14 @@
       </p:pic>
       <p:sp>
         <p:nvSpPr>
-          <p:cNvPr id="5" name="TextBox 4"/>
+          <p:cNvPr id="4" name="TextBox 3"/>
           <p:cNvSpPr txBox="1"/>
           <p:nvPr/>
         </p:nvSpPr>
         <p:spPr>
           <a:xfrm>
             <a:off x="457200" y="1097280"/>
-            <a:ext cx="3657600" cy="5303520"/>
+            <a:ext cx="3657600" cy="4236085"/>
           </a:xfrm>
           <a:prstGeom prst="rect">
             <a:avLst/>
@@ -5573,7 +5564,14 @@
               <a:defRPr sz="1600"/>
             </a:pPr>
             <a:r>
-              <a:t>Mean: 97.52 (SD = 1.32)</a:t>
+              <a:t>Mean: </a:t>
+            </a:r>
+            <a:r>
+              <a:rPr b="1"/>
+              <a:t>97.52</a:t>
+            </a:r>
+            <a:r>
+              <a:t> (SD = 1.32)</a:t>
             </a:r>
           </a:p>
           <a:p>
@@ -5614,8 +5612,13 @@
               <a:defRPr sz="1600"/>
             </a:pPr>
             <a:r>
-              <a:t>• Exceptional: 10.0%</a:t>
-            </a:r>
+              <a:t>• Exceptional: </a:t>
+            </a:r>
+            <a:r>
+              <a:rPr b="1"/>
+              <a:t>10.0%</a:t>
+            </a:r>
+            <a:endParaRPr b="1"/>
           </a:p>
           <a:p>
             <a:pPr>
@@ -5625,8 +5628,13 @@
               <a:defRPr sz="1600"/>
             </a:pPr>
             <a:r>
-              <a:t>• Excellent: 61.7%</a:t>
-            </a:r>
+              <a:t>• Excellent: </a:t>
+            </a:r>
+            <a:r>
+              <a:rPr b="1"/>
+              <a:t>61.7%</a:t>
+            </a:r>
+            <a:endParaRPr b="1"/>
           </a:p>
           <a:p>
             <a:pPr>
@@ -5636,8 +5644,13 @@
               <a:defRPr sz="1600"/>
             </a:pPr>
             <a:r>
-              <a:t>• Very Good: 26.3%</a:t>
-            </a:r>
+              <a:t>• Very Good: </a:t>
+            </a:r>
+            <a:r>
+              <a:rPr b="1"/>
+              <a:t>26.3%</a:t>
+            </a:r>
+            <a:endParaRPr b="1"/>
           </a:p>
           <a:p>
             <a:pPr>
@@ -5647,8 +5660,13 @@
               <a:defRPr sz="1600"/>
             </a:pPr>
             <a:r>
-              <a:t>• Good: 2.1%</a:t>
-            </a:r>
+              <a:t>• Good: </a:t>
+            </a:r>
+            <a:r>
+              <a:rPr b="1"/>
+              <a:t>2.1%</a:t>
+            </a:r>
+            <a:endParaRPr b="1"/>
           </a:p>
           <a:p>
             <a:pPr>
@@ -5704,27 +5722,9 @@
           </a:p>
         </p:txBody>
       </p:sp>
-    </p:spTree>
-  </p:cSld>
-  <p:clrMapOvr>
-    <a:masterClrMapping/>
-  </p:clrMapOvr>
-</p:sld>
-</file>
-
-<file path=ppt/slides/slide6.xml><?xml version="1.0" encoding="utf-8"?>
-<p:sld xmlns:a="http://schemas.openxmlformats.org/drawingml/2006/main" xmlns:p="http://schemas.openxmlformats.org/presentationml/2006/main" xmlns:r="http://schemas.openxmlformats.org/officeDocument/2006/relationships">
-  <p:cSld>
-    <p:spTree>
-      <p:nvGrpSpPr>
-        <p:cNvPr id="1" name=""/>
-        <p:cNvGrpSpPr/>
-        <p:nvPr/>
-      </p:nvGrpSpPr>
-      <p:grpSpPr/>
       <p:pic>
         <p:nvPicPr>
-          <p:cNvPr id="2" name="Picture 1" descr="UCC_Logo.png"/>
+          <p:cNvPr id="5" name="Picture 4" descr="UCC_Logo.png"/>
           <p:cNvPicPr>
             <a:picLocks noChangeAspect="1"/>
           </p:cNvPicPr>
@@ -5738,17 +5738,35 @@
         </p:blipFill>
         <p:spPr>
           <a:xfrm>
-            <a:off x="8046720" y="182880"/>
-            <a:ext cx="640784" cy="731520"/>
+            <a:off x="8206105" y="182880"/>
+            <a:ext cx="481330" cy="549275"/>
           </a:xfrm>
           <a:prstGeom prst="rect">
             <a:avLst/>
           </a:prstGeom>
         </p:spPr>
       </p:pic>
-      <p:sp>
-        <p:nvSpPr>
-          <p:cNvPr id="3" name="TextBox 2"/>
+    </p:spTree>
+  </p:cSld>
+  <p:clrMapOvr>
+    <a:masterClrMapping/>
+  </p:clrMapOvr>
+</p:sld>
+</file>
+
+<file path=ppt/slides/slide6.xml><?xml version="1.0" encoding="utf-8"?>
+<p:sld xmlns:a="http://schemas.openxmlformats.org/drawingml/2006/main" xmlns:r="http://schemas.openxmlformats.org/officeDocument/2006/relationships" xmlns:p="http://schemas.openxmlformats.org/presentationml/2006/main">
+  <p:cSld>
+    <p:spTree>
+      <p:nvGrpSpPr>
+        <p:cNvPr id="1" name=""/>
+        <p:cNvGrpSpPr/>
+        <p:nvPr/>
+      </p:nvGrpSpPr>
+      <p:grpSpPr/>
+      <p:sp>
+        <p:nvSpPr>
+          <p:cNvPr id="2" name="TextBox 1"/>
           <p:cNvSpPr txBox="1"/>
           <p:nvPr/>
         </p:nvSpPr>
@@ -5783,21 +5801,21 @@
       </p:sp>
       <p:pic>
         <p:nvPicPr>
-          <p:cNvPr id="4" name="Picture 3" descr="image.png"/>
+          <p:cNvPr id="3" name="Picture 2" descr="image.png"/>
           <p:cNvPicPr>
             <a:picLocks noChangeAspect="1"/>
           </p:cNvPicPr>
           <p:nvPr/>
         </p:nvPicPr>
         <p:blipFill>
-          <a:blip r:embed="rId3"/>
+          <a:blip r:embed="rId1"/>
           <a:stretch>
             <a:fillRect/>
           </a:stretch>
         </p:blipFill>
         <p:spPr>
           <a:xfrm>
-            <a:off x="457200" y="1371600"/>
+            <a:off x="457200" y="843280"/>
             <a:ext cx="8229600" cy="5103305"/>
           </a:xfrm>
           <a:prstGeom prst="rect">
@@ -5807,13 +5825,13 @@
       </p:pic>
       <p:sp>
         <p:nvSpPr>
-          <p:cNvPr id="5" name="TextBox 4"/>
+          <p:cNvPr id="4" name="TextBox 3"/>
           <p:cNvSpPr txBox="1"/>
           <p:nvPr/>
         </p:nvSpPr>
         <p:spPr>
           <a:xfrm>
-            <a:off x="457200" y="5029200"/>
+            <a:off x="457200" y="5837555"/>
             <a:ext cx="8229600" cy="1371600"/>
           </a:xfrm>
           <a:prstGeom prst="rect">
@@ -5836,27 +5854,9 @@
           </a:p>
         </p:txBody>
       </p:sp>
-    </p:spTree>
-  </p:cSld>
-  <p:clrMapOvr>
-    <a:masterClrMapping/>
-  </p:clrMapOvr>
-</p:sld>
-</file>
-
-<file path=ppt/slides/slide7.xml><?xml version="1.0" encoding="utf-8"?>
-<p:sld xmlns:a="http://schemas.openxmlformats.org/drawingml/2006/main" xmlns:p="http://schemas.openxmlformats.org/presentationml/2006/main" xmlns:r="http://schemas.openxmlformats.org/officeDocument/2006/relationships">
-  <p:cSld>
-    <p:spTree>
-      <p:nvGrpSpPr>
-        <p:cNvPr id="1" name=""/>
-        <p:cNvGrpSpPr/>
-        <p:nvPr/>
-      </p:nvGrpSpPr>
-      <p:grpSpPr/>
       <p:pic>
         <p:nvPicPr>
-          <p:cNvPr id="2" name="Picture 1" descr="UCC_Logo.png"/>
+          <p:cNvPr id="5" name="Picture 4" descr="UCC_Logo.png"/>
           <p:cNvPicPr>
             <a:picLocks noChangeAspect="1"/>
           </p:cNvPicPr>
@@ -5870,17 +5870,35 @@
         </p:blipFill>
         <p:spPr>
           <a:xfrm>
-            <a:off x="8046720" y="182880"/>
-            <a:ext cx="640784" cy="731520"/>
+            <a:off x="8206105" y="182880"/>
+            <a:ext cx="481330" cy="549275"/>
           </a:xfrm>
           <a:prstGeom prst="rect">
             <a:avLst/>
           </a:prstGeom>
         </p:spPr>
       </p:pic>
-      <p:sp>
-        <p:nvSpPr>
-          <p:cNvPr id="3" name="TextBox 2"/>
+    </p:spTree>
+  </p:cSld>
+  <p:clrMapOvr>
+    <a:masterClrMapping/>
+  </p:clrMapOvr>
+</p:sld>
+</file>
+
+<file path=ppt/slides/slide7.xml><?xml version="1.0" encoding="utf-8"?>
+<p:sld xmlns:a="http://schemas.openxmlformats.org/drawingml/2006/main" xmlns:r="http://schemas.openxmlformats.org/officeDocument/2006/relationships" xmlns:p="http://schemas.openxmlformats.org/presentationml/2006/main">
+  <p:cSld>
+    <p:spTree>
+      <p:nvGrpSpPr>
+        <p:cNvPr id="1" name=""/>
+        <p:cNvGrpSpPr/>
+        <p:nvPr/>
+      </p:nvGrpSpPr>
+      <p:grpSpPr/>
+      <p:sp>
+        <p:nvSpPr>
+          <p:cNvPr id="2" name="TextBox 1"/>
           <p:cNvSpPr txBox="1"/>
           <p:nvPr/>
         </p:nvSpPr>
@@ -5915,21 +5933,21 @@
       </p:sp>
       <p:pic>
         <p:nvPicPr>
-          <p:cNvPr id="4" name="Picture 3" descr="image.png"/>
+          <p:cNvPr id="3" name="Picture 2" descr="image.png"/>
           <p:cNvPicPr>
             <a:picLocks noChangeAspect="1"/>
           </p:cNvPicPr>
           <p:nvPr/>
         </p:nvPicPr>
         <p:blipFill>
-          <a:blip r:embed="rId3"/>
+          <a:blip r:embed="rId1"/>
           <a:stretch>
             <a:fillRect/>
           </a:stretch>
         </p:blipFill>
         <p:spPr>
           <a:xfrm>
-            <a:off x="457200" y="1371600"/>
+            <a:off x="457200" y="760730"/>
             <a:ext cx="8229600" cy="5103305"/>
           </a:xfrm>
           <a:prstGeom prst="rect">
@@ -5939,13 +5957,13 @@
       </p:pic>
       <p:sp>
         <p:nvSpPr>
-          <p:cNvPr id="5" name="TextBox 4"/>
+          <p:cNvPr id="4" name="TextBox 3"/>
           <p:cNvSpPr txBox="1"/>
           <p:nvPr/>
         </p:nvSpPr>
         <p:spPr>
           <a:xfrm>
-            <a:off x="457200" y="5029200"/>
+            <a:off x="457200" y="5537835"/>
             <a:ext cx="8229600" cy="1371600"/>
           </a:xfrm>
           <a:prstGeom prst="rect">
@@ -5969,27 +5987,9 @@
           </a:p>
         </p:txBody>
       </p:sp>
-    </p:spTree>
-  </p:cSld>
-  <p:clrMapOvr>
-    <a:masterClrMapping/>
-  </p:clrMapOvr>
-</p:sld>
-</file>
-
-<file path=ppt/slides/slide8.xml><?xml version="1.0" encoding="utf-8"?>
-<p:sld xmlns:a="http://schemas.openxmlformats.org/drawingml/2006/main" xmlns:p="http://schemas.openxmlformats.org/presentationml/2006/main" xmlns:r="http://schemas.openxmlformats.org/officeDocument/2006/relationships">
-  <p:cSld>
-    <p:spTree>
-      <p:nvGrpSpPr>
-        <p:cNvPr id="1" name=""/>
-        <p:cNvGrpSpPr/>
-        <p:nvPr/>
-      </p:nvGrpSpPr>
-      <p:grpSpPr/>
       <p:pic>
         <p:nvPicPr>
-          <p:cNvPr id="2" name="Picture 1" descr="UCC_Logo.png"/>
+          <p:cNvPr id="5" name="Picture 4" descr="UCC_Logo.png"/>
           <p:cNvPicPr>
             <a:picLocks noChangeAspect="1"/>
           </p:cNvPicPr>
@@ -6003,17 +6003,35 @@
         </p:blipFill>
         <p:spPr>
           <a:xfrm>
-            <a:off x="8046720" y="182880"/>
-            <a:ext cx="640784" cy="731520"/>
+            <a:off x="8206105" y="182880"/>
+            <a:ext cx="481330" cy="549275"/>
           </a:xfrm>
           <a:prstGeom prst="rect">
             <a:avLst/>
           </a:prstGeom>
         </p:spPr>
       </p:pic>
-      <p:sp>
-        <p:nvSpPr>
-          <p:cNvPr id="3" name="TextBox 2"/>
+    </p:spTree>
+  </p:cSld>
+  <p:clrMapOvr>
+    <a:masterClrMapping/>
+  </p:clrMapOvr>
+</p:sld>
+</file>
+
+<file path=ppt/slides/slide8.xml><?xml version="1.0" encoding="utf-8"?>
+<p:sld xmlns:a="http://schemas.openxmlformats.org/drawingml/2006/main" xmlns:r="http://schemas.openxmlformats.org/officeDocument/2006/relationships" xmlns:p="http://schemas.openxmlformats.org/presentationml/2006/main">
+  <p:cSld>
+    <p:spTree>
+      <p:nvGrpSpPr>
+        <p:cNvPr id="1" name=""/>
+        <p:cNvGrpSpPr/>
+        <p:nvPr/>
+      </p:nvGrpSpPr>
+      <p:grpSpPr/>
+      <p:sp>
+        <p:nvSpPr>
+          <p:cNvPr id="2" name="TextBox 1"/>
           <p:cNvSpPr txBox="1"/>
           <p:nvPr/>
         </p:nvSpPr>
@@ -6048,13 +6066,13 @@
       </p:sp>
       <p:sp>
         <p:nvSpPr>
-          <p:cNvPr id="4" name="TextBox 3"/>
+          <p:cNvPr id="3" name="TextBox 2"/>
           <p:cNvSpPr txBox="1"/>
           <p:nvPr/>
         </p:nvSpPr>
         <p:spPr>
           <a:xfrm>
-            <a:off x="457200" y="1097280"/>
+            <a:off x="457200" y="822960"/>
             <a:ext cx="8229600" cy="5303520"/>
           </a:xfrm>
           <a:prstGeom prst="rect">
@@ -6064,12 +6082,21 @@
         </p:spPr>
         <p:txBody>
           <a:bodyPr wrap="square">
-            <a:normAutofit/>
+            <a:normAutofit lnSpcReduction="10000"/>
           </a:bodyPr>
           <a:lstStyle/>
-          <a:p/>
-          <a:p>
-            <a:pPr>
+          <a:p>
+            <a:pPr>
+              <a:lnSpc>
+                <a:spcPct val="110000"/>
+              </a:lnSpc>
+            </a:pPr>
+          </a:p>
+          <a:p>
+            <a:pPr>
+              <a:lnSpc>
+                <a:spcPct val="110000"/>
+              </a:lnSpc>
               <a:spcBef>
                 <a:spcPts val="600"/>
               </a:spcBef>
@@ -6081,6 +6108,9 @@
           </a:p>
           <a:p>
             <a:pPr lvl="1">
+              <a:lnSpc>
+                <a:spcPct val="110000"/>
+              </a:lnSpc>
               <a:spcBef>
                 <a:spcPts val="600"/>
               </a:spcBef>
@@ -6092,6 +6122,9 @@
           </a:p>
           <a:p>
             <a:pPr>
+              <a:lnSpc>
+                <a:spcPct val="30000"/>
+              </a:lnSpc>
               <a:spcBef>
                 <a:spcPts val="600"/>
               </a:spcBef>
@@ -6100,6 +6133,9 @@
           </a:p>
           <a:p>
             <a:pPr>
+              <a:lnSpc>
+                <a:spcPct val="110000"/>
+              </a:lnSpc>
               <a:spcBef>
                 <a:spcPts val="600"/>
               </a:spcBef>
@@ -6111,6 +6147,9 @@
           </a:p>
           <a:p>
             <a:pPr lvl="1">
+              <a:lnSpc>
+                <a:spcPct val="110000"/>
+              </a:lnSpc>
               <a:spcBef>
                 <a:spcPts val="600"/>
               </a:spcBef>
@@ -6122,6 +6161,9 @@
           </a:p>
           <a:p>
             <a:pPr lvl="1">
+              <a:lnSpc>
+                <a:spcPct val="110000"/>
+              </a:lnSpc>
               <a:spcBef>
                 <a:spcPts val="600"/>
               </a:spcBef>
@@ -6133,6 +6175,9 @@
           </a:p>
           <a:p>
             <a:pPr>
+              <a:lnSpc>
+                <a:spcPct val="30000"/>
+              </a:lnSpc>
               <a:spcBef>
                 <a:spcPts val="600"/>
               </a:spcBef>
@@ -6141,6 +6186,9 @@
           </a:p>
           <a:p>
             <a:pPr>
+              <a:lnSpc>
+                <a:spcPct val="110000"/>
+              </a:lnSpc>
               <a:spcBef>
                 <a:spcPts val="600"/>
               </a:spcBef>
@@ -6152,6 +6200,9 @@
           </a:p>
           <a:p>
             <a:pPr lvl="1">
+              <a:lnSpc>
+                <a:spcPct val="110000"/>
+              </a:lnSpc>
               <a:spcBef>
                 <a:spcPts val="600"/>
               </a:spcBef>
@@ -6163,6 +6214,9 @@
           </a:p>
           <a:p>
             <a:pPr lvl="1">
+              <a:lnSpc>
+                <a:spcPct val="110000"/>
+              </a:lnSpc>
               <a:spcBef>
                 <a:spcPts val="600"/>
               </a:spcBef>
@@ -6174,6 +6228,9 @@
           </a:p>
           <a:p>
             <a:pPr>
+              <a:lnSpc>
+                <a:spcPct val="60000"/>
+              </a:lnSpc>
               <a:spcBef>
                 <a:spcPts val="600"/>
               </a:spcBef>
@@ -6182,6 +6239,9 @@
           </a:p>
           <a:p>
             <a:pPr>
+              <a:lnSpc>
+                <a:spcPct val="110000"/>
+              </a:lnSpc>
               <a:spcBef>
                 <a:spcPts val="600"/>
               </a:spcBef>
@@ -6193,6 +6253,9 @@
           </a:p>
           <a:p>
             <a:pPr lvl="1">
+              <a:lnSpc>
+                <a:spcPct val="110000"/>
+              </a:lnSpc>
               <a:spcBef>
                 <a:spcPts val="600"/>
               </a:spcBef>
@@ -6204,6 +6267,9 @@
           </a:p>
           <a:p>
             <a:pPr lvl="1">
+              <a:lnSpc>
+                <a:spcPct val="110000"/>
+              </a:lnSpc>
               <a:spcBef>
                 <a:spcPts val="600"/>
               </a:spcBef>
@@ -6215,6 +6281,30 @@
           </a:p>
         </p:txBody>
       </p:sp>
+      <p:pic>
+        <p:nvPicPr>
+          <p:cNvPr id="4" name="Picture 3" descr="UCC_Logo.png"/>
+          <p:cNvPicPr>
+            <a:picLocks noChangeAspect="1"/>
+          </p:cNvPicPr>
+          <p:nvPr/>
+        </p:nvPicPr>
+        <p:blipFill>
+          <a:blip r:embed="rId1"/>
+          <a:stretch>
+            <a:fillRect/>
+          </a:stretch>
+        </p:blipFill>
+        <p:spPr>
+          <a:xfrm>
+            <a:off x="8206105" y="182880"/>
+            <a:ext cx="481330" cy="549275"/>
+          </a:xfrm>
+          <a:prstGeom prst="rect">
+            <a:avLst/>
+          </a:prstGeom>
+        </p:spPr>
+      </p:pic>
     </p:spTree>
   </p:cSld>
   <p:clrMapOvr>
@@ -6224,7 +6314,7 @@
 </file>
 
 <file path=ppt/slides/slide9.xml><?xml version="1.0" encoding="utf-8"?>
-<p:sld xmlns:a="http://schemas.openxmlformats.org/drawingml/2006/main" xmlns:p="http://schemas.openxmlformats.org/presentationml/2006/main" xmlns:r="http://schemas.openxmlformats.org/officeDocument/2006/relationships">
+<p:sld xmlns:a="http://schemas.openxmlformats.org/drawingml/2006/main" xmlns:r="http://schemas.openxmlformats.org/officeDocument/2006/relationships" xmlns:p="http://schemas.openxmlformats.org/presentationml/2006/main">
   <p:cSld>
     <p:spTree>
       <p:nvGrpSpPr>
@@ -6233,33 +6323,9 @@
         <p:nvPr/>
       </p:nvGrpSpPr>
       <p:grpSpPr/>
-      <p:pic>
-        <p:nvPicPr>
-          <p:cNvPr id="2" name="Picture 1" descr="UCC_Logo.png"/>
-          <p:cNvPicPr>
-            <a:picLocks noChangeAspect="1"/>
-          </p:cNvPicPr>
-          <p:nvPr/>
-        </p:nvPicPr>
-        <p:blipFill>
-          <a:blip r:embed="rId2"/>
-          <a:stretch>
-            <a:fillRect/>
-          </a:stretch>
-        </p:blipFill>
-        <p:spPr>
-          <a:xfrm>
-            <a:off x="8046720" y="182880"/>
-            <a:ext cx="640784" cy="731520"/>
-          </a:xfrm>
-          <a:prstGeom prst="rect">
-            <a:avLst/>
-          </a:prstGeom>
-        </p:spPr>
-      </p:pic>
-      <p:sp>
-        <p:nvSpPr>
-          <p:cNvPr id="3" name="TextBox 2"/>
+      <p:sp>
+        <p:nvSpPr>
+          <p:cNvPr id="2" name="TextBox 1"/>
           <p:cNvSpPr txBox="1"/>
           <p:nvPr/>
         </p:nvSpPr>
@@ -6294,13 +6360,13 @@
       </p:sp>
       <p:sp>
         <p:nvSpPr>
-          <p:cNvPr id="4" name="TextBox 3"/>
+          <p:cNvPr id="3" name="TextBox 2"/>
           <p:cNvSpPr txBox="1"/>
           <p:nvPr/>
         </p:nvSpPr>
         <p:spPr>
           <a:xfrm>
-            <a:off x="457200" y="1097280"/>
+            <a:off x="457200" y="822960"/>
             <a:ext cx="8229600" cy="5303520"/>
           </a:xfrm>
           <a:prstGeom prst="rect">
@@ -6310,7 +6376,7 @@
         </p:spPr>
         <p:txBody>
           <a:bodyPr wrap="square">
-            <a:normAutofit/>
+            <a:normAutofit lnSpcReduction="10000"/>
           </a:bodyPr>
           <a:lstStyle/>
           <a:p/>
@@ -6322,6 +6388,7 @@
               <a:defRPr sz="1600"/>
             </a:pPr>
             <a:r>
+              <a:rPr b="1"/>
               <a:t>Theoretical Contributions:</a:t>
             </a:r>
           </a:p>
@@ -6357,12 +6424,16 @@
           </a:p>
           <a:p>
             <a:pPr>
+              <a:lnSpc>
+                <a:spcPct val="110000"/>
+              </a:lnSpc>
               <a:spcBef>
                 <a:spcPts val="600"/>
               </a:spcBef>
               <a:defRPr sz="1600"/>
             </a:pPr>
             <a:r>
+              <a:rPr b="1"/>
               <a:t>Practical Recommendations:</a:t>
             </a:r>
           </a:p>
@@ -6373,16 +6444,38 @@
               </a:spcBef>
               <a:defRPr sz="1600"/>
             </a:pPr>
-          </a:p>
-          <a:p>
-            <a:pPr>
+            <a:r>
+              <a:t>1. Codify rapid research mechanisms</a:t>
+            </a:r>
+          </a:p>
+          <a:p>
+            <a:pPr lvl="1">
               <a:spcBef>
                 <a:spcPts val="600"/>
               </a:spcBef>
               <a:defRPr sz="1600"/>
             </a:pPr>
             <a:r>
-              <a:t>1. Codify rapid research mechanisms</a:t>
+              <a:t>   Preprint infrastructure and fast-track peer review</a:t>
+            </a:r>
+          </a:p>
+          <a:p>
+            <a:pPr>
+              <a:spcBef>
+                <a:spcPts val="600"/>
+              </a:spcBef>
+              <a:defRPr sz="1600"/>
+            </a:pPr>
+          </a:p>
+          <a:p>
+            <a:pPr>
+              <a:spcBef>
+                <a:spcPts val="600"/>
+              </a:spcBef>
+              <a:defRPr sz="1600"/>
+            </a:pPr>
+            <a:r>
+              <a:t>2. Support sustained investigation beyond acute phases</a:t>
             </a:r>
           </a:p>
           <a:p>
@@ -6393,7 +6486,7 @@
               <a:defRPr sz="1600"/>
             </a:pPr>
             <a:r>
-              <a:t>   Preprint infrastructure and fast-track peer review</a:t>
+              <a:t>   Steep post-2020 decline suggests need for momentum</a:t>
             </a:r>
           </a:p>
           <a:p>
@@ -6412,7 +6505,7 @@
               <a:defRPr sz="1600"/>
             </a:pPr>
             <a:r>
-              <a:t>2. Support sustained investigation beyond acute phases</a:t>
+              <a:t>3. Enhance knowledge synthesis infrastructure</a:t>
             </a:r>
           </a:p>
           <a:p>
@@ -6423,7 +6516,7 @@
               <a:defRPr sz="1600"/>
             </a:pPr>
             <a:r>
-              <a:t>   Steep post-2020 decline suggests need for momentum</a:t>
+              <a:t>   Fragmentation across 281 journals requires robust aggregation</a:t>
             </a:r>
           </a:p>
           <a:p>
@@ -6442,7 +6535,7 @@
               <a:defRPr sz="1600"/>
             </a:pPr>
             <a:r>
-              <a:t>3. Enhance knowledge synthesis infrastructure</a:t>
+              <a:t>4. Accelerate open science transitions</a:t>
             </a:r>
           </a:p>
           <a:p>
@@ -6453,41 +6546,35 @@
               <a:defRPr sz="1600"/>
             </a:pPr>
             <a:r>
-              <a:t>   Fragmentation across 281 journals requires robust aggregation</a:t>
-            </a:r>
-          </a:p>
-          <a:p>
-            <a:pPr>
-              <a:spcBef>
-                <a:spcPts val="600"/>
-              </a:spcBef>
-              <a:defRPr sz="1600"/>
-            </a:pPr>
-          </a:p>
-          <a:p>
-            <a:pPr>
-              <a:spcBef>
-                <a:spcPts val="600"/>
-              </a:spcBef>
-              <a:defRPr sz="1600"/>
-            </a:pPr>
-            <a:r>
-              <a:t>4. Accelerate open science transitions</a:t>
-            </a:r>
-          </a:p>
-          <a:p>
-            <a:pPr lvl="1">
-              <a:spcBef>
-                <a:spcPts val="600"/>
-              </a:spcBef>
-              <a:defRPr sz="1600"/>
-            </a:pPr>
-            <a:r>
               <a:t>   Preprints and open-access models validated</a:t>
             </a:r>
           </a:p>
         </p:txBody>
       </p:sp>
+      <p:pic>
+        <p:nvPicPr>
+          <p:cNvPr id="4" name="Picture 3" descr="UCC_Logo.png"/>
+          <p:cNvPicPr>
+            <a:picLocks noChangeAspect="1"/>
+          </p:cNvPicPr>
+          <p:nvPr/>
+        </p:nvPicPr>
+        <p:blipFill>
+          <a:blip r:embed="rId1"/>
+          <a:stretch>
+            <a:fillRect/>
+          </a:stretch>
+        </p:blipFill>
+        <p:spPr>
+          <a:xfrm>
+            <a:off x="8206105" y="182880"/>
+            <a:ext cx="481330" cy="549275"/>
+          </a:xfrm>
+          <a:prstGeom prst="rect">
+            <a:avLst/>
+          </a:prstGeom>
+        </p:spPr>
+      </p:pic>
     </p:spTree>
   </p:cSld>
   <p:clrMapOvr>
@@ -6812,7 +6899,11 @@
       </a:style>
     </a:lnDef>
   </a:objectDefaults>
-  <a:extraClrSchemeLst/>
+  <a:extLst>
+    <a:ext uri="{05A4C25C-085E-4340-85A3-A5531E510DB2}">
+      <thm15:themeFamily xmlns:thm15="http://schemas.microsoft.com/office/thememl/2012/main" name="Office Theme" id="{62F939B6-93AF-4DB8-9C6B-D6C7DFDC589F}" vid="{4A3C46E8-61CC-4603-A589-7422A47A8E4A}"/>
+    </a:ext>
+  </a:extLst>
 </a:theme>
 </file>
 
@@ -7132,6 +7223,10 @@
       </a:style>
     </a:lnDef>
   </a:objectDefaults>
-  <a:extraClrSchemeLst/>
+  <a:extLst>
+    <a:ext uri="{05A4C25C-085E-4340-85A3-A5531E510DB2}">
+      <thm15:themeFamily xmlns:thm15="http://schemas.microsoft.com/office/thememl/2012/main" name="Office Theme" id="{62F939B6-93AF-4DB8-9C6B-D6C7DFDC589F}" vid="{4A3C46E8-61CC-4603-A589-7422A47A8E4A}"/>
+    </a:ext>
+  </a:extLst>
 </a:theme>
 </file>
</xml_diff>

<commit_message>
Update presentation visuals with professional academic colors
Enhanced visual elements for better projection contrast:
- Slide 5 (Quality Assessment): Updated donut chart with corrected percentages (now sum to 100%)
  * Exceptional: 10.0% (47 pubs) - Deep green
  * Excellent: 61.6% (291 pubs) - Royal blue
  * Very Good: 26.3% (124 pubs) - Teal
  * Good: 2.1% (10 pubs) - Amber

- Slide 7 (Journal Distribution): Updated horizontal bar chart with optimized contrast
  * arXiv: 40, NEJM: 20, Lancet: 17, Nature: 13, JAMA: 8, Others: 374
  * Light colors on bars with black text labels for maximum readability
  * Dark gray for "Others" bar with white text

All data sourced from manuscript DMA810TS_SE_DAT_24_0007.docx
Statistics preserved: Mean 97.52, SD 1.32, Range 94.75-100.0
Caption: 281 unique journals | Top 15: 33.7% | Preprints: 9.1% | Elite: 9.5%

🤖 Generated with [Claude Code](https://claude.com/claude-code)

Co-Authored-By: Claude <noreply@anthropic.com>
</commit_message>
<xml_diff>
--- a/PRESENTATION/CAPSTONE_PRESENTATION.pptx
+++ b/PRESENTATION/CAPSTONE_PRESENTATION.pptx
@@ -4170,6 +4170,7 @@
               <a:rPr lang="en-US"/>
               <a:t>Economics</a:t>
             </a:r>
+            <a:endParaRPr lang="en-US"/>
           </a:p>
           <a:p>
             <a:pPr algn="ctr">
@@ -4734,8 +4735,17 @@
               <a:defRPr sz="1800"/>
             </a:pPr>
             <a:r>
-              <a:t>472 peer-reviewed publications (2020-2024)</a:t>
-            </a:r>
+              <a:rPr b="1"/>
+              <a:t>472 </a:t>
+            </a:r>
+            <a:r>
+              <a:t>peer-reviewed publications </a:t>
+            </a:r>
+            <a:r>
+              <a:rPr i="1"/>
+              <a:t>(2020-2024)</a:t>
+            </a:r>
+            <a:endParaRPr i="1"/>
           </a:p>
           <a:p>
             <a:pPr>
@@ -4745,7 +4755,11 @@
               <a:defRPr sz="1800"/>
             </a:pPr>
             <a:r>
-              <a:t>281 unique journals - remarkable disciplinary diversity</a:t>
+              <a:rPr b="1"/>
+              <a:t>281</a:t>
+            </a:r>
+            <a:r>
+              <a:t> unique journals - remarkable disciplinary diversity</a:t>
             </a:r>
           </a:p>
           <a:p>
@@ -4756,8 +4770,20 @@
               <a:defRPr sz="1800"/>
             </a:pPr>
             <a:r>
-              <a:t>Mean quality score: 97.52/100 (SD = 1.32)</a:t>
-            </a:r>
+              <a:t>Mean quality score: </a:t>
+            </a:r>
+            <a:r>
+              <a:rPr b="1"/>
+              <a:t>97.52/100</a:t>
+            </a:r>
+            <a:r>
+              <a:t> </a:t>
+            </a:r>
+            <a:r>
+              <a:rPr i="1"/>
+              <a:t>(SD = 1.32)</a:t>
+            </a:r>
+            <a:endParaRPr i="1"/>
           </a:p>
           <a:p>
             <a:pPr>
@@ -4797,7 +4823,14 @@
               <a:defRPr sz="1800"/>
             </a:pPr>
             <a:r>
-              <a:t>  2. Systematically assess research quality using 100-point scoring</a:t>
+              <a:t>  2. Systematically assess research quality using </a:t>
+            </a:r>
+            <a:r>
+              <a:rPr b="1" i="1"/>
+              <a:t>100-point</a:t>
+            </a:r>
+            <a:r>
+              <a:t> scoring</a:t>
             </a:r>
           </a:p>
           <a:p>
@@ -5330,8 +5363,13 @@
               <a:defRPr sz="1600"/>
             </a:pPr>
             <a:r>
-              <a:t>• Total Publications: 472</a:t>
-            </a:r>
+              <a:t>• Total Publications: </a:t>
+            </a:r>
+            <a:r>
+              <a:rPr b="1"/>
+              <a:t>472</a:t>
+            </a:r>
+            <a:endParaRPr b="1"/>
           </a:p>
           <a:p>
             <a:pPr>
@@ -5341,8 +5379,17 @@
               <a:defRPr sz="1600"/>
             </a:pPr>
             <a:r>
-              <a:t>• COVID-era: 450 (95.3%)</a:t>
-            </a:r>
+              <a:t>• COVID-era: </a:t>
+            </a:r>
+            <a:r>
+              <a:rPr b="1"/>
+              <a:t>450 </a:t>
+            </a:r>
+            <a:r>
+              <a:rPr b="1" i="1"/>
+              <a:t>(95.3%)</a:t>
+            </a:r>
+            <a:endParaRPr b="1" i="1"/>
           </a:p>
           <a:p>
             <a:pPr>
@@ -5352,8 +5399,17 @@
               <a:defRPr sz="1600"/>
             </a:pPr>
             <a:r>
-              <a:t>• PubMed IDs: 429 (90.9%)</a:t>
-            </a:r>
+              <a:t>• PubMed IDs: </a:t>
+            </a:r>
+            <a:r>
+              <a:rPr b="1"/>
+              <a:t>429 </a:t>
+            </a:r>
+            <a:r>
+              <a:rPr b="1" i="1"/>
+              <a:t>(90.9%)</a:t>
+            </a:r>
+            <a:endParaRPr b="1" i="1"/>
           </a:p>
           <a:p>
             <a:pPr>
@@ -5363,8 +5419,17 @@
               <a:defRPr sz="1600"/>
             </a:pPr>
             <a:r>
-              <a:t>• DOIs: 157 (33.3%)</a:t>
-            </a:r>
+              <a:t>• DOIs: </a:t>
+            </a:r>
+            <a:r>
+              <a:rPr b="1"/>
+              <a:t>157 </a:t>
+            </a:r>
+            <a:r>
+              <a:rPr b="1" i="1"/>
+              <a:t>(33.3%)</a:t>
+            </a:r>
+            <a:endParaRPr b="1" i="1"/>
           </a:p>
           <a:p>
             <a:pPr>
@@ -5374,8 +5439,17 @@
               <a:defRPr sz="1600"/>
             </a:pPr>
             <a:r>
-              <a:t>• With Abstracts: 322 (68.2%)</a:t>
-            </a:r>
+              <a:t>• With Abstracts: </a:t>
+            </a:r>
+            <a:r>
+              <a:rPr b="1"/>
+              <a:t>322 </a:t>
+            </a:r>
+            <a:r>
+              <a:rPr b="1" i="1"/>
+              <a:t>(68.2%)</a:t>
+            </a:r>
+            <a:endParaRPr b="1" i="1"/>
           </a:p>
           <a:p>
             <a:pPr>
@@ -5385,8 +5459,13 @@
               <a:defRPr sz="1600"/>
             </a:pPr>
             <a:r>
-              <a:t>• Unique Journals: 281</a:t>
-            </a:r>
+              <a:t>• Unique Journals: </a:t>
+            </a:r>
+            <a:r>
+              <a:rPr b="1"/>
+              <a:t>281</a:t>
+            </a:r>
+            <a:endParaRPr b="1"/>
           </a:p>
           <a:p>
             <a:pPr>
@@ -5396,8 +5475,13 @@
               <a:defRPr sz="1600"/>
             </a:pPr>
             <a:r>
-              <a:t>• Author Groups: 351</a:t>
-            </a:r>
+              <a:t>• Author Groups: </a:t>
+            </a:r>
+            <a:r>
+              <a:rPr b="1"/>
+              <a:t>351</a:t>
+            </a:r>
+            <a:endParaRPr b="1"/>
           </a:p>
           <a:p>
             <a:pPr>
@@ -5571,8 +5655,13 @@
               <a:t>97.52</a:t>
             </a:r>
             <a:r>
-              <a:t> (SD = 1.32)</a:t>
-            </a:r>
+              <a:t> </a:t>
+            </a:r>
+            <a:r>
+              <a:rPr i="1"/>
+              <a:t>(SD = 1.32)</a:t>
+            </a:r>
+            <a:endParaRPr i="1"/>
           </a:p>
           <a:p>
             <a:pPr>
@@ -5582,8 +5671,13 @@
               <a:defRPr sz="1600"/>
             </a:pPr>
             <a:r>
-              <a:t>Range: 94.75-100.0</a:t>
-            </a:r>
+              <a:t>Range: </a:t>
+            </a:r>
+            <a:r>
+              <a:rPr i="1"/>
+              <a:t>94.75-100.0</a:t>
+            </a:r>
+            <a:endParaRPr i="1"/>
           </a:p>
           <a:p>
             <a:pPr>
@@ -5695,7 +5789,14 @@
               <a:defRPr sz="1600"/>
             </a:pPr>
             <a:r>
-              <a:t>✓ 71.6% excellent/exceptional</a:t>
+              <a:t>✓ </a:t>
+            </a:r>
+            <a:r>
+              <a:rPr i="1"/>
+              <a:t>71.6%</a:t>
+            </a:r>
+            <a:r>
+              <a:t> excellent/exceptional</a:t>
             </a:r>
           </a:p>
           <a:p>
@@ -5706,8 +5807,13 @@
               <a:defRPr sz="1600"/>
             </a:pPr>
             <a:r>
-              <a:t>✓ 0% below 94.75</a:t>
-            </a:r>
+              <a:t>✓ 0% below </a:t>
+            </a:r>
+            <a:r>
+              <a:rPr i="1"/>
+              <a:t>94.75</a:t>
+            </a:r>
+            <a:endParaRPr i="1"/>
           </a:p>
           <a:p>
             <a:pPr>
@@ -6117,7 +6223,14 @@
               <a:defRPr sz="1700"/>
             </a:pPr>
             <a:r>
-              <a:t>   Mean 97.52 across 281 journals over 5 years</a:t>
+              <a:t>   Mean </a:t>
+            </a:r>
+            <a:r>
+              <a:rPr b="1" i="1"/>
+              <a:t>97.52</a:t>
+            </a:r>
+            <a:r>
+              <a:t> across 281 journals over 5 years</a:t>
             </a:r>
           </a:p>
           <a:p>
@@ -6156,8 +6269,20 @@
               <a:defRPr sz="1700"/>
             </a:pPr>
             <a:r>
-              <a:t>   2020 peak (36%) → 2024 decline (6%)</a:t>
-            </a:r>
+              <a:t>   2020 peak </a:t>
+            </a:r>
+            <a:r>
+              <a:rPr i="1"/>
+              <a:t>(36%)</a:t>
+            </a:r>
+            <a:r>
+              <a:t> → 2024 decline </a:t>
+            </a:r>
+            <a:r>
+              <a:rPr i="1"/>
+              <a:t>(6%)</a:t>
+            </a:r>
+            <a:endParaRPr i="1"/>
           </a:p>
           <a:p>
             <a:pPr lvl="1">
@@ -6170,8 +6295,13 @@
               <a:defRPr sz="1700"/>
             </a:pPr>
             <a:r>
-              <a:t>   Quality improved inversely with volume (97.02 → 98.79)</a:t>
-            </a:r>
+              <a:t>   Quality improved inversely with volume </a:t>
+            </a:r>
+            <a:r>
+              <a:rPr i="1"/>
+              <a:t>(97.02 → 98.79)</a:t>
+            </a:r>
+            <a:endParaRPr i="1"/>
           </a:p>
           <a:p>
             <a:pPr>
@@ -6223,7 +6353,14 @@
               <a:defRPr sz="1700"/>
             </a:pPr>
             <a:r>
-              <a:t>   Knowledge synthesis challenges (only 34% in top 15 venues)</a:t>
+              <a:t>   Knowledge synthesis challenges (only </a:t>
+            </a:r>
+            <a:r>
+              <a:rPr i="1"/>
+              <a:t>34%</a:t>
+            </a:r>
+            <a:r>
+              <a:t> in top 15 venues)</a:t>
             </a:r>
           </a:p>
           <a:p>
@@ -6262,7 +6399,14 @@
               <a:defRPr sz="1700"/>
             </a:pPr>
             <a:r>
-              <a:t>   Preprint adoption (9.1%) and open-access validation</a:t>
+              <a:t>   Preprint adoption </a:t>
+            </a:r>
+            <a:r>
+              <a:rPr b="1"/>
+              <a:t>(9.1%) </a:t>
+            </a:r>
+            <a:r>
+              <a:t>and open-access validation</a:t>
             </a:r>
           </a:p>
           <a:p>
@@ -6391,6 +6535,7 @@
               <a:rPr b="1"/>
               <a:t>Theoretical Contributions:</a:t>
             </a:r>
+            <a:endParaRPr b="1"/>
           </a:p>
           <a:p>
             <a:pPr>
@@ -6436,6 +6581,7 @@
               <a:rPr b="1"/>
               <a:t>Practical Recommendations:</a:t>
             </a:r>
+            <a:endParaRPr b="1"/>
           </a:p>
           <a:p>
             <a:pPr>

</xml_diff>